<commit_message>
inicio do artefato 17 falta numeração dos eventos
</commit_message>
<xml_diff>
--- a/Artefatos/16-DFD Essencial para cada capacidade.pptx
+++ b/Artefatos/16-DFD Essencial para cada capacidade.pptx
@@ -69,7 +69,7 @@
         <p:spPr>
           <a:xfrm>
             <a:off x="692640" y="375480"/>
-            <a:ext cx="8691840" cy="946800"/>
+            <a:ext cx="8691480" cy="946800"/>
           </a:xfrm>
           <a:prstGeom prst="rect">
             <a:avLst/>
@@ -182,7 +182,7 @@
         <p:spPr>
           <a:xfrm>
             <a:off x="692640" y="375480"/>
-            <a:ext cx="8691840" cy="946800"/>
+            <a:ext cx="8691480" cy="946800"/>
           </a:xfrm>
           <a:prstGeom prst="rect">
             <a:avLst/>
@@ -355,7 +355,7 @@
         <p:spPr>
           <a:xfrm>
             <a:off x="692640" y="375480"/>
-            <a:ext cx="8691840" cy="946800"/>
+            <a:ext cx="8691480" cy="946800"/>
           </a:xfrm>
           <a:prstGeom prst="rect">
             <a:avLst/>
@@ -588,7 +588,7 @@
         <p:spPr>
           <a:xfrm>
             <a:off x="692640" y="375480"/>
-            <a:ext cx="8691840" cy="946800"/>
+            <a:ext cx="8691480" cy="946800"/>
           </a:xfrm>
           <a:prstGeom prst="rect">
             <a:avLst/>
@@ -672,7 +672,7 @@
         <p:spPr>
           <a:xfrm>
             <a:off x="692640" y="375480"/>
-            <a:ext cx="8691840" cy="946800"/>
+            <a:ext cx="8691480" cy="946800"/>
           </a:xfrm>
           <a:prstGeom prst="rect">
             <a:avLst/>
@@ -755,7 +755,7 @@
         <p:spPr>
           <a:xfrm>
             <a:off x="692640" y="375480"/>
-            <a:ext cx="8691840" cy="946800"/>
+            <a:ext cx="8691480" cy="946800"/>
           </a:xfrm>
           <a:prstGeom prst="rect">
             <a:avLst/>
@@ -868,7 +868,7 @@
         <p:spPr>
           <a:xfrm>
             <a:off x="692640" y="375480"/>
-            <a:ext cx="8691840" cy="946800"/>
+            <a:ext cx="8691480" cy="946800"/>
           </a:xfrm>
           <a:prstGeom prst="rect">
             <a:avLst/>
@@ -921,7 +921,7 @@
         <p:spPr>
           <a:xfrm>
             <a:off x="692640" y="375480"/>
-            <a:ext cx="8691840" cy="4390200"/>
+            <a:ext cx="8691480" cy="4390200"/>
           </a:xfrm>
           <a:prstGeom prst="rect">
             <a:avLst/>
@@ -974,7 +974,7 @@
         <p:spPr>
           <a:xfrm>
             <a:off x="692640" y="375480"/>
-            <a:ext cx="8691840" cy="946800"/>
+            <a:ext cx="8691480" cy="946800"/>
           </a:xfrm>
           <a:prstGeom prst="rect">
             <a:avLst/>
@@ -1117,7 +1117,7 @@
         <p:spPr>
           <a:xfrm>
             <a:off x="692640" y="375480"/>
-            <a:ext cx="8691840" cy="946800"/>
+            <a:ext cx="8691480" cy="946800"/>
           </a:xfrm>
           <a:prstGeom prst="rect">
             <a:avLst/>
@@ -1260,7 +1260,7 @@
         <p:spPr>
           <a:xfrm>
             <a:off x="692640" y="375480"/>
-            <a:ext cx="8691840" cy="946800"/>
+            <a:ext cx="8691480" cy="946800"/>
           </a:xfrm>
           <a:prstGeom prst="rect">
             <a:avLst/>
@@ -1410,7 +1410,7 @@
         <p:spPr>
           <a:xfrm>
             <a:off x="692640" y="375480"/>
-            <a:ext cx="8691840" cy="946800"/>
+            <a:ext cx="8691480" cy="946800"/>
           </a:xfrm>
           <a:prstGeom prst="rect">
             <a:avLst/>
@@ -1658,7 +1658,7 @@
         <p:spPr>
           <a:xfrm>
             <a:off x="471960" y="226440"/>
-            <a:ext cx="952920" cy="761040"/>
+            <a:ext cx="952560" cy="760680"/>
           </a:xfrm>
           <a:prstGeom prst="rect">
             <a:avLst/>
@@ -1732,7 +1732,7 @@
         <p:spPr>
           <a:xfrm>
             <a:off x="557640" y="1729440"/>
-            <a:ext cx="1130040" cy="1062360"/>
+            <a:ext cx="1129680" cy="1062000"/>
           </a:xfrm>
           <a:prstGeom prst="ellipse">
             <a:avLst/>
@@ -1792,7 +1792,7 @@
         <p:spPr>
           <a:xfrm>
             <a:off x="948960" y="988200"/>
-            <a:ext cx="173880" cy="740520"/>
+            <a:ext cx="173520" cy="740160"/>
           </a:xfrm>
           <a:custGeom>
             <a:avLst/>
@@ -1840,7 +1840,7 @@
         <p:spPr>
           <a:xfrm>
             <a:off x="-67680" y="1195920"/>
-            <a:ext cx="1363680" cy="394560"/>
+            <a:ext cx="1363320" cy="394200"/>
           </a:xfrm>
           <a:prstGeom prst="rect">
             <a:avLst/>
@@ -1924,7 +1924,7 @@
         <p:spPr>
           <a:xfrm>
             <a:off x="1123200" y="2792520"/>
-            <a:ext cx="360" cy="662760"/>
+            <a:ext cx="360" cy="662400"/>
           </a:xfrm>
           <a:custGeom>
             <a:avLst/>
@@ -1972,7 +1972,7 @@
         <p:spPr>
           <a:xfrm>
             <a:off x="324360" y="3565080"/>
-            <a:ext cx="1673280" cy="454680"/>
+            <a:ext cx="1672920" cy="454680"/>
           </a:xfrm>
           <a:prstGeom prst="rect">
             <a:avLst/>
@@ -2036,14 +2036,14 @@
       </p:sp>
       <p:sp>
         <p:nvSpPr>
-          <p:cNvPr id="45" name="TextShape 8"/>
-          <p:cNvSpPr txBox="1"/>
+          <p:cNvPr id="45" name="CustomShape 8"/>
+          <p:cNvSpPr/>
           <p:nvPr/>
         </p:nvSpPr>
         <p:spPr>
           <a:xfrm>
             <a:off x="6912000" y="85680"/>
-            <a:ext cx="2808000" cy="602280"/>
+            <a:ext cx="2807640" cy="638280"/>
           </a:xfrm>
           <a:prstGeom prst="rect">
             <a:avLst/>
@@ -2053,11 +2053,22 @@
             <a:noFill/>
           </a:ln>
         </p:spPr>
+        <p:style>
+          <a:lnRef idx="0"/>
+          <a:fillRef idx="0"/>
+          <a:effectRef idx="0"/>
+          <a:fontRef idx="minor"/>
+        </p:style>
         <p:txBody>
           <a:bodyPr lIns="90000" rIns="90000" tIns="45000" bIns="45000">
             <a:spAutoFit/>
           </a:bodyPr>
           <a:p>
+            <a:pPr>
+              <a:lnSpc>
+                <a:spcPct val="100000"/>
+              </a:lnSpc>
+            </a:pPr>
             <a:r>
               <a:rPr b="0" lang="pt-BR" sz="1800" spc="-1" strike="noStrike">
                 <a:latin typeface="Arial"/>
@@ -2112,7 +2123,7 @@
         <p:spPr>
           <a:xfrm>
             <a:off x="2541960" y="1656000"/>
-            <a:ext cx="1130040" cy="1080000"/>
+            <a:ext cx="1129680" cy="1079640"/>
           </a:xfrm>
           <a:prstGeom prst="ellipse">
             <a:avLst/>
@@ -2171,8 +2182,8 @@
         </p:nvSpPr>
         <p:spPr>
           <a:xfrm flipH="1">
-            <a:off x="1590480" y="2592000"/>
-            <a:ext cx="1145520" cy="847800"/>
+            <a:off x="1589760" y="2592000"/>
+            <a:ext cx="1145160" cy="847440"/>
           </a:xfrm>
           <a:custGeom>
             <a:avLst/>
@@ -2221,7 +2232,7 @@
         <p:spPr>
           <a:xfrm>
             <a:off x="2088000" y="1056960"/>
-            <a:ext cx="842400" cy="455040"/>
+            <a:ext cx="842040" cy="454680"/>
           </a:xfrm>
           <a:prstGeom prst="rect">
             <a:avLst/>
@@ -2272,7 +2283,7 @@
         <p:spPr>
           <a:xfrm>
             <a:off x="2808000" y="360000"/>
-            <a:ext cx="842400" cy="792000"/>
+            <a:ext cx="842040" cy="791640"/>
           </a:xfrm>
           <a:prstGeom prst="rect">
             <a:avLst/>
@@ -2345,8 +2356,8 @@
         </p:nvSpPr>
         <p:spPr>
           <a:xfrm flipV="1">
-            <a:off x="3108960" y="1152000"/>
-            <a:ext cx="131040" cy="504000"/>
+            <a:off x="3108960" y="1151280"/>
+            <a:ext cx="130680" cy="503640"/>
           </a:xfrm>
           <a:custGeom>
             <a:avLst/>
@@ -2460,7 +2471,7 @@
         <p:spPr>
           <a:xfrm>
             <a:off x="2160000" y="3576960"/>
-            <a:ext cx="1673280" cy="272880"/>
+            <a:ext cx="1672920" cy="272520"/>
           </a:xfrm>
           <a:prstGeom prst="rect">
             <a:avLst/>
@@ -2510,8 +2521,8 @@
         </p:nvSpPr>
         <p:spPr>
           <a:xfrm flipH="1" flipV="1">
-            <a:off x="3023280" y="2736000"/>
-            <a:ext cx="360" cy="792000"/>
+            <a:off x="3022560" y="2735280"/>
+            <a:ext cx="360" cy="791640"/>
           </a:xfrm>
           <a:custGeom>
             <a:avLst/>
@@ -2626,7 +2637,7 @@
         <p:spPr>
           <a:xfrm>
             <a:off x="3833280" y="3600000"/>
-            <a:ext cx="1275840" cy="393480"/>
+            <a:ext cx="1275480" cy="394200"/>
           </a:xfrm>
           <a:prstGeom prst="rect">
             <a:avLst/>
@@ -2676,8 +2687,8 @@
         </p:nvSpPr>
         <p:spPr>
           <a:xfrm flipH="1" flipV="1">
-            <a:off x="3528000" y="2520000"/>
-            <a:ext cx="936000" cy="936000"/>
+            <a:off x="3527280" y="2519280"/>
+            <a:ext cx="935640" cy="935640"/>
           </a:xfrm>
           <a:custGeom>
             <a:avLst/>
@@ -2726,7 +2737,7 @@
         <p:spPr>
           <a:xfrm>
             <a:off x="5112000" y="1800000"/>
-            <a:ext cx="1130040" cy="1080000"/>
+            <a:ext cx="1129680" cy="1079640"/>
           </a:xfrm>
           <a:prstGeom prst="ellipse">
             <a:avLst/>
@@ -2785,8 +2796,8 @@
         </p:nvSpPr>
         <p:spPr>
           <a:xfrm flipV="1">
-            <a:off x="4536000" y="2663640"/>
-            <a:ext cx="720000" cy="864000"/>
+            <a:off x="4536000" y="2662560"/>
+            <a:ext cx="719640" cy="863640"/>
           </a:xfrm>
           <a:custGeom>
             <a:avLst/>
@@ -2934,7 +2945,7 @@
         <p:spPr>
           <a:xfrm>
             <a:off x="5184000" y="3600000"/>
-            <a:ext cx="1275840" cy="393480"/>
+            <a:ext cx="1275480" cy="394200"/>
           </a:xfrm>
           <a:prstGeom prst="rect">
             <a:avLst/>
@@ -2984,8 +2995,8 @@
         </p:nvSpPr>
         <p:spPr>
           <a:xfrm flipH="1" flipV="1">
-            <a:off x="5759640" y="2880000"/>
-            <a:ext cx="93960" cy="576000"/>
+            <a:off x="5759640" y="2879280"/>
+            <a:ext cx="93600" cy="575640"/>
           </a:xfrm>
           <a:custGeom>
             <a:avLst/>
@@ -3024,6 +3035,179 @@
           </a:effectRef>
           <a:fontRef idx="minor"/>
         </p:style>
+      </p:sp>
+      <p:sp>
+        <p:nvSpPr>
+          <p:cNvPr id="67" name="CustomShape 30"/>
+          <p:cNvSpPr/>
+          <p:nvPr/>
+        </p:nvSpPr>
+        <p:spPr>
+          <a:xfrm>
+            <a:off x="5277960" y="432000"/>
+            <a:ext cx="842040" cy="791640"/>
+          </a:xfrm>
+          <a:prstGeom prst="rect">
+            <a:avLst/>
+          </a:prstGeom>
+          <a:gradFill rotWithShape="0">
+            <a:gsLst>
+              <a:gs pos="0">
+                <a:srgbClr val="d0d0d0"/>
+              </a:gs>
+              <a:gs pos="100000">
+                <a:srgbClr val="ededed">
+                  <a:alpha val="0"/>
+                </a:srgbClr>
+              </a:gs>
+            </a:gsLst>
+            <a:lin ang="16200000"/>
+          </a:gradFill>
+          <a:ln/>
+          <a:effectLst>
+            <a:outerShdw blurRad="40000" dir="5400000" dist="20160" rotWithShape="0">
+              <a:srgbClr val="000000">
+                <a:alpha val="38000"/>
+              </a:srgbClr>
+            </a:outerShdw>
+          </a:effectLst>
+        </p:spPr>
+        <p:style>
+          <a:lnRef idx="1">
+            <a:schemeClr val="dk1"/>
+          </a:lnRef>
+          <a:fillRef idx="2">
+            <a:schemeClr val="dk1"/>
+          </a:fillRef>
+          <a:effectRef idx="1">
+            <a:schemeClr val="dk1"/>
+          </a:effectRef>
+          <a:fontRef idx="minor"/>
+        </p:style>
+        <p:txBody>
+          <a:bodyPr lIns="90000" rIns="90000" tIns="45000" bIns="45000" anchor="ctr">
+            <a:noAutofit/>
+          </a:bodyPr>
+          <a:p>
+            <a:pPr algn="ctr">
+              <a:lnSpc>
+                <a:spcPct val="100000"/>
+              </a:lnSpc>
+            </a:pPr>
+            <a:r>
+              <a:rPr b="0" lang="pt-BR" sz="1050" spc="-1" strike="noStrike">
+                <a:solidFill>
+                  <a:srgbClr val="000000"/>
+                </a:solidFill>
+                <a:latin typeface="Arial"/>
+                <a:ea typeface="DejaVu Sans"/>
+              </a:rPr>
+              <a:t>Gerencia</a:t>
+            </a:r>
+            <a:endParaRPr b="0" lang="pt-BR" sz="1050" spc="-1" strike="noStrike">
+              <a:latin typeface="Arial"/>
+            </a:endParaRPr>
+          </a:p>
+        </p:txBody>
+      </p:sp>
+      <p:sp>
+        <p:nvSpPr>
+          <p:cNvPr id="68" name="CustomShape 31"/>
+          <p:cNvSpPr/>
+          <p:nvPr/>
+        </p:nvSpPr>
+        <p:spPr>
+          <a:xfrm flipV="1">
+            <a:off x="5687640" y="1224000"/>
+            <a:ext cx="360" cy="575640"/>
+          </a:xfrm>
+          <a:custGeom>
+            <a:avLst/>
+            <a:gdLst/>
+            <a:ahLst/>
+            <a:rect l="l" t="t" r="r" b="b"/>
+            <a:pathLst>
+              <a:path w="21600" h="21600">
+                <a:moveTo>
+                  <a:pt x="0" y="0"/>
+                </a:moveTo>
+                <a:lnTo>
+                  <a:pt x="21600" y="21600"/>
+                </a:lnTo>
+              </a:path>
+            </a:pathLst>
+          </a:custGeom>
+          <a:noFill/>
+          <a:ln>
+            <a:solidFill>
+              <a:schemeClr val="tx1"/>
+            </a:solidFill>
+            <a:tailEnd len="med" type="triangle" w="med"/>
+          </a:ln>
+        </p:spPr>
+        <p:style>
+          <a:lnRef idx="1">
+            <a:schemeClr val="accent1"/>
+          </a:lnRef>
+          <a:fillRef idx="0">
+            <a:schemeClr val="accent1"/>
+          </a:fillRef>
+          <a:effectRef idx="0">
+            <a:schemeClr val="accent1"/>
+          </a:effectRef>
+          <a:fontRef idx="minor"/>
+        </p:style>
+      </p:sp>
+      <p:sp>
+        <p:nvSpPr>
+          <p:cNvPr id="69" name="CustomShape 32"/>
+          <p:cNvSpPr/>
+          <p:nvPr/>
+        </p:nvSpPr>
+        <p:spPr>
+          <a:xfrm>
+            <a:off x="4824000" y="1322280"/>
+            <a:ext cx="842040" cy="333720"/>
+          </a:xfrm>
+          <a:prstGeom prst="rect">
+            <a:avLst/>
+          </a:prstGeom>
+          <a:noFill/>
+          <a:ln>
+            <a:noFill/>
+          </a:ln>
+        </p:spPr>
+        <p:style>
+          <a:lnRef idx="0"/>
+          <a:fillRef idx="0"/>
+          <a:effectRef idx="0"/>
+          <a:fontRef idx="minor"/>
+        </p:style>
+        <p:txBody>
+          <a:bodyPr lIns="90000" rIns="90000" tIns="45000" bIns="45000">
+            <a:spAutoFit/>
+          </a:bodyPr>
+          <a:p>
+            <a:pPr>
+              <a:lnSpc>
+                <a:spcPct val="100000"/>
+              </a:lnSpc>
+            </a:pPr>
+            <a:r>
+              <a:rPr b="0" lang="pt-BR" sz="800" spc="-1" strike="noStrike">
+                <a:solidFill>
+                  <a:srgbClr val="000000"/>
+                </a:solidFill>
+                <a:latin typeface="Arial"/>
+                <a:ea typeface="DejaVu Sans"/>
+              </a:rPr>
+              <a:t>Ordem  de produção</a:t>
+            </a:r>
+            <a:endParaRPr b="0" lang="pt-BR" sz="800" spc="-1" strike="noStrike">
+              <a:latin typeface="Arial"/>
+            </a:endParaRPr>
+          </a:p>
+        </p:txBody>
       </p:sp>
     </p:spTree>
   </p:cSld>
@@ -3057,14 +3241,14 @@
       </p:grpSpPr>
       <p:sp>
         <p:nvSpPr>
-          <p:cNvPr id="67" name="TextShape 1"/>
-          <p:cNvSpPr txBox="1"/>
+          <p:cNvPr id="70" name="CustomShape 1"/>
+          <p:cNvSpPr/>
           <p:nvPr/>
         </p:nvSpPr>
         <p:spPr>
           <a:xfrm>
             <a:off x="6912000" y="85680"/>
-            <a:ext cx="2808000" cy="602280"/>
+            <a:ext cx="2807640" cy="638280"/>
           </a:xfrm>
           <a:prstGeom prst="rect">
             <a:avLst/>
@@ -3074,11 +3258,22 @@
             <a:noFill/>
           </a:ln>
         </p:spPr>
+        <p:style>
+          <a:lnRef idx="0"/>
+          <a:fillRef idx="0"/>
+          <a:effectRef idx="0"/>
+          <a:fontRef idx="minor"/>
+        </p:style>
         <p:txBody>
           <a:bodyPr lIns="90000" rIns="90000" tIns="45000" bIns="45000">
             <a:spAutoFit/>
           </a:bodyPr>
           <a:p>
+            <a:pPr>
+              <a:lnSpc>
+                <a:spcPct val="100000"/>
+              </a:lnSpc>
+            </a:pPr>
             <a:r>
               <a:rPr b="0" lang="pt-BR" sz="1800" spc="-1" strike="noStrike">
                 <a:latin typeface="Arial"/>
@@ -3093,14 +3288,14 @@
       </p:sp>
       <p:sp>
         <p:nvSpPr>
-          <p:cNvPr id="68" name="CustomShape 2"/>
+          <p:cNvPr id="71" name="CustomShape 2"/>
           <p:cNvSpPr/>
           <p:nvPr/>
         </p:nvSpPr>
         <p:spPr>
           <a:xfrm>
             <a:off x="471960" y="236520"/>
-            <a:ext cx="952920" cy="761040"/>
+            <a:ext cx="952560" cy="760680"/>
           </a:xfrm>
           <a:prstGeom prst="rect">
             <a:avLst/>
@@ -3167,14 +3362,14 @@
       </p:sp>
       <p:sp>
         <p:nvSpPr>
-          <p:cNvPr id="69" name="CustomShape 3"/>
+          <p:cNvPr id="72" name="CustomShape 3"/>
           <p:cNvSpPr/>
           <p:nvPr/>
         </p:nvSpPr>
         <p:spPr>
           <a:xfrm>
             <a:off x="956520" y="997560"/>
-            <a:ext cx="173880" cy="740520"/>
+            <a:ext cx="173520" cy="740160"/>
           </a:xfrm>
           <a:custGeom>
             <a:avLst/>
@@ -3215,14 +3410,14 @@
       </p:sp>
       <p:sp>
         <p:nvSpPr>
-          <p:cNvPr id="70" name="CustomShape 4"/>
+          <p:cNvPr id="73" name="CustomShape 4"/>
           <p:cNvSpPr/>
           <p:nvPr/>
         </p:nvSpPr>
         <p:spPr>
           <a:xfrm>
             <a:off x="76320" y="1109880"/>
-            <a:ext cx="787680" cy="394920"/>
+            <a:ext cx="787320" cy="394560"/>
           </a:xfrm>
           <a:prstGeom prst="rect">
             <a:avLst/>
@@ -3266,14 +3461,14 @@
       </p:sp>
       <p:sp>
         <p:nvSpPr>
-          <p:cNvPr id="71" name="CustomShape 5"/>
+          <p:cNvPr id="74" name="CustomShape 5"/>
           <p:cNvSpPr/>
           <p:nvPr/>
         </p:nvSpPr>
         <p:spPr>
           <a:xfrm>
             <a:off x="576000" y="1745640"/>
-            <a:ext cx="1130040" cy="1062360"/>
+            <a:ext cx="1129680" cy="1062000"/>
           </a:xfrm>
           <a:prstGeom prst="ellipse">
             <a:avLst/>
@@ -3326,7 +3521,7 @@
       </p:sp>
       <p:sp>
         <p:nvSpPr>
-          <p:cNvPr id="72" name="Line 6"/>
+          <p:cNvPr id="75" name="Line 6"/>
           <p:cNvSpPr/>
           <p:nvPr/>
         </p:nvSpPr>
@@ -3359,14 +3554,14 @@
       </p:sp>
       <p:sp>
         <p:nvSpPr>
-          <p:cNvPr id="73" name="CustomShape 7"/>
+          <p:cNvPr id="76" name="CustomShape 7"/>
           <p:cNvSpPr/>
           <p:nvPr/>
         </p:nvSpPr>
         <p:spPr>
           <a:xfrm>
             <a:off x="324360" y="3565080"/>
-            <a:ext cx="1673280" cy="272880"/>
+            <a:ext cx="1672920" cy="272520"/>
           </a:xfrm>
           <a:prstGeom prst="rect">
             <a:avLst/>
@@ -3410,7 +3605,7 @@
       </p:sp>
       <p:sp>
         <p:nvSpPr>
-          <p:cNvPr id="74" name="Line 8"/>
+          <p:cNvPr id="77" name="Line 8"/>
           <p:cNvSpPr/>
           <p:nvPr/>
         </p:nvSpPr>
@@ -3443,14 +3638,14 @@
       </p:sp>
       <p:sp>
         <p:nvSpPr>
-          <p:cNvPr id="75" name="CustomShape 9"/>
+          <p:cNvPr id="78" name="CustomShape 9"/>
           <p:cNvSpPr/>
           <p:nvPr/>
         </p:nvSpPr>
         <p:spPr>
           <a:xfrm>
             <a:off x="1123560" y="2880000"/>
-            <a:ext cx="360" cy="574920"/>
+            <a:ext cx="360" cy="574560"/>
           </a:xfrm>
           <a:custGeom>
             <a:avLst/>
@@ -3491,14 +3686,14 @@
       </p:sp>
       <p:sp>
         <p:nvSpPr>
-          <p:cNvPr id="76" name="CustomShape 10"/>
+          <p:cNvPr id="79" name="CustomShape 10"/>
           <p:cNvSpPr/>
           <p:nvPr/>
         </p:nvSpPr>
         <p:spPr>
           <a:xfrm>
             <a:off x="2088000" y="1800000"/>
-            <a:ext cx="1130040" cy="1062360"/>
+            <a:ext cx="1129680" cy="1062000"/>
           </a:xfrm>
           <a:prstGeom prst="ellipse">
             <a:avLst/>
@@ -3551,14 +3746,14 @@
       </p:sp>
       <p:sp>
         <p:nvSpPr>
-          <p:cNvPr id="77" name="CustomShape 11"/>
+          <p:cNvPr id="80" name="CustomShape 11"/>
           <p:cNvSpPr/>
           <p:nvPr/>
         </p:nvSpPr>
         <p:spPr>
           <a:xfrm flipH="1">
-            <a:off x="1590480" y="2808000"/>
-            <a:ext cx="713520" cy="631800"/>
+            <a:off x="1589760" y="2808000"/>
+            <a:ext cx="713160" cy="631440"/>
           </a:xfrm>
           <a:custGeom>
             <a:avLst/>
@@ -3600,7 +3795,7 @@
       </p:sp>
       <p:sp>
         <p:nvSpPr>
-          <p:cNvPr id="78" name="Line 12"/>
+          <p:cNvPr id="81" name="Line 12"/>
           <p:cNvSpPr/>
           <p:nvPr/>
         </p:nvSpPr>
@@ -3633,7 +3828,7 @@
       </p:sp>
       <p:sp>
         <p:nvSpPr>
-          <p:cNvPr id="79" name="Line 13"/>
+          <p:cNvPr id="82" name="Line 13"/>
           <p:cNvSpPr/>
           <p:nvPr/>
         </p:nvSpPr>
@@ -3666,14 +3861,14 @@
       </p:sp>
       <p:sp>
         <p:nvSpPr>
-          <p:cNvPr id="80" name="CustomShape 14"/>
+          <p:cNvPr id="83" name="CustomShape 14"/>
           <p:cNvSpPr/>
           <p:nvPr/>
         </p:nvSpPr>
         <p:spPr>
           <a:xfrm>
             <a:off x="1872000" y="3565080"/>
-            <a:ext cx="1673280" cy="272880"/>
+            <a:ext cx="1672920" cy="272520"/>
           </a:xfrm>
           <a:prstGeom prst="rect">
             <a:avLst/>
@@ -3692,14 +3887,14 @@
       </p:sp>
       <p:sp>
         <p:nvSpPr>
-          <p:cNvPr id="81" name="CustomShape 15"/>
+          <p:cNvPr id="84" name="CustomShape 15"/>
           <p:cNvSpPr/>
           <p:nvPr/>
         </p:nvSpPr>
         <p:spPr>
           <a:xfrm>
             <a:off x="1926720" y="3565080"/>
-            <a:ext cx="1673280" cy="272880"/>
+            <a:ext cx="1672920" cy="272520"/>
           </a:xfrm>
           <a:prstGeom prst="rect">
             <a:avLst/>
@@ -3718,14 +3913,14 @@
       </p:sp>
       <p:sp>
         <p:nvSpPr>
-          <p:cNvPr id="82" name="TextShape 16"/>
-          <p:cNvSpPr txBox="1"/>
+          <p:cNvPr id="85" name="CustomShape 16"/>
+          <p:cNvSpPr/>
           <p:nvPr/>
         </p:nvSpPr>
         <p:spPr>
           <a:xfrm>
             <a:off x="2079720" y="3528360"/>
-            <a:ext cx="1232280" cy="431640"/>
+            <a:ext cx="1231920" cy="454680"/>
           </a:xfrm>
           <a:prstGeom prst="rect">
             <a:avLst/>
@@ -3735,11 +3930,22 @@
             <a:noFill/>
           </a:ln>
         </p:spPr>
+        <p:style>
+          <a:lnRef idx="0"/>
+          <a:fillRef idx="0"/>
+          <a:effectRef idx="0"/>
+          <a:fontRef idx="minor"/>
+        </p:style>
         <p:txBody>
           <a:bodyPr lIns="90000" rIns="90000" tIns="45000" bIns="45000">
             <a:spAutoFit/>
           </a:bodyPr>
           <a:p>
+            <a:pPr>
+              <a:lnSpc>
+                <a:spcPct val="100000"/>
+              </a:lnSpc>
+            </a:pPr>
             <a:r>
               <a:rPr b="0" lang="pt-BR" sz="1200" spc="-1" strike="noStrike">
                 <a:solidFill>
@@ -3758,14 +3964,14 @@
       </p:sp>
       <p:sp>
         <p:nvSpPr>
-          <p:cNvPr id="83" name="CustomShape 17"/>
+          <p:cNvPr id="86" name="CustomShape 17"/>
           <p:cNvSpPr/>
           <p:nvPr/>
         </p:nvSpPr>
         <p:spPr>
           <a:xfrm flipH="1">
-            <a:off x="2526480" y="2862360"/>
-            <a:ext cx="137520" cy="577440"/>
+            <a:off x="2525760" y="2862360"/>
+            <a:ext cx="137160" cy="577080"/>
           </a:xfrm>
           <a:custGeom>
             <a:avLst/>
@@ -3807,14 +4013,14 @@
       </p:sp>
       <p:sp>
         <p:nvSpPr>
-          <p:cNvPr id="84" name="CustomShape 18"/>
+          <p:cNvPr id="87" name="CustomShape 18"/>
           <p:cNvSpPr/>
           <p:nvPr/>
         </p:nvSpPr>
         <p:spPr>
           <a:xfrm>
             <a:off x="3693960" y="1872000"/>
-            <a:ext cx="1130040" cy="1062360"/>
+            <a:ext cx="1129680" cy="1062000"/>
           </a:xfrm>
           <a:prstGeom prst="ellipse">
             <a:avLst/>
@@ -3867,14 +4073,14 @@
       </p:sp>
       <p:sp>
         <p:nvSpPr>
-          <p:cNvPr id="85" name="CustomShape 19"/>
+          <p:cNvPr id="88" name="CustomShape 19"/>
           <p:cNvSpPr/>
           <p:nvPr/>
         </p:nvSpPr>
         <p:spPr>
           <a:xfrm>
             <a:off x="5205960" y="1944000"/>
-            <a:ext cx="1130040" cy="1062360"/>
+            <a:ext cx="1129680" cy="1062000"/>
           </a:xfrm>
           <a:prstGeom prst="ellipse">
             <a:avLst/>
@@ -3927,7 +4133,7 @@
       </p:sp>
       <p:sp>
         <p:nvSpPr>
-          <p:cNvPr id="86" name="Line 20"/>
+          <p:cNvPr id="89" name="Line 20"/>
           <p:cNvSpPr/>
           <p:nvPr/>
         </p:nvSpPr>
@@ -3960,7 +4166,7 @@
       </p:sp>
       <p:sp>
         <p:nvSpPr>
-          <p:cNvPr id="87" name="Line 21"/>
+          <p:cNvPr id="90" name="Line 21"/>
           <p:cNvSpPr/>
           <p:nvPr/>
         </p:nvSpPr>
@@ -3993,7 +4199,7 @@
       </p:sp>
       <p:sp>
         <p:nvSpPr>
-          <p:cNvPr id="88" name="Line 22"/>
+          <p:cNvPr id="91" name="Line 22"/>
           <p:cNvSpPr/>
           <p:nvPr/>
         </p:nvSpPr>
@@ -4026,7 +4232,7 @@
       </p:sp>
       <p:sp>
         <p:nvSpPr>
-          <p:cNvPr id="89" name="Line 23"/>
+          <p:cNvPr id="92" name="Line 23"/>
           <p:cNvSpPr/>
           <p:nvPr/>
         </p:nvSpPr>
@@ -4059,14 +4265,14 @@
       </p:sp>
       <p:sp>
         <p:nvSpPr>
-          <p:cNvPr id="90" name="TextShape 24"/>
-          <p:cNvSpPr txBox="1"/>
+          <p:cNvPr id="93" name="CustomShape 24"/>
+          <p:cNvSpPr/>
           <p:nvPr/>
         </p:nvSpPr>
         <p:spPr>
           <a:xfrm>
             <a:off x="5823720" y="3672360"/>
-            <a:ext cx="1232280" cy="431640"/>
+            <a:ext cx="1231920" cy="454680"/>
           </a:xfrm>
           <a:prstGeom prst="rect">
             <a:avLst/>
@@ -4076,11 +4282,22 @@
             <a:noFill/>
           </a:ln>
         </p:spPr>
+        <p:style>
+          <a:lnRef idx="0"/>
+          <a:fillRef idx="0"/>
+          <a:effectRef idx="0"/>
+          <a:fontRef idx="minor"/>
+        </p:style>
         <p:txBody>
           <a:bodyPr lIns="90000" rIns="90000" tIns="45000" bIns="45000">
             <a:spAutoFit/>
           </a:bodyPr>
           <a:p>
+            <a:pPr>
+              <a:lnSpc>
+                <a:spcPct val="100000"/>
+              </a:lnSpc>
+            </a:pPr>
             <a:r>
               <a:rPr b="0" lang="pt-BR" sz="1200" spc="-1" strike="noStrike">
                 <a:solidFill>
@@ -4099,14 +4316,14 @@
       </p:sp>
       <p:sp>
         <p:nvSpPr>
-          <p:cNvPr id="91" name="CustomShape 25"/>
+          <p:cNvPr id="94" name="CustomShape 25"/>
           <p:cNvSpPr/>
           <p:nvPr/>
         </p:nvSpPr>
         <p:spPr>
           <a:xfrm>
             <a:off x="7437960" y="1728000"/>
-            <a:ext cx="1418040" cy="1224000"/>
+            <a:ext cx="1417680" cy="1223640"/>
           </a:xfrm>
           <a:prstGeom prst="ellipse">
             <a:avLst/>
@@ -4159,14 +4376,14 @@
       </p:sp>
       <p:sp>
         <p:nvSpPr>
-          <p:cNvPr id="92" name="CustomShape 26"/>
+          <p:cNvPr id="95" name="CustomShape 26"/>
           <p:cNvSpPr/>
           <p:nvPr/>
         </p:nvSpPr>
         <p:spPr>
           <a:xfrm flipH="1">
-            <a:off x="6552000" y="2736000"/>
-            <a:ext cx="1008000" cy="792000"/>
+            <a:off x="6551280" y="2736000"/>
+            <a:ext cx="1007640" cy="791640"/>
           </a:xfrm>
           <a:custGeom>
             <a:avLst/>
@@ -4208,7 +4425,7 @@
       </p:sp>
       <p:sp>
         <p:nvSpPr>
-          <p:cNvPr id="93" name="Line 27"/>
+          <p:cNvPr id="96" name="Line 27"/>
           <p:cNvSpPr/>
           <p:nvPr/>
         </p:nvSpPr>
@@ -4241,7 +4458,7 @@
       </p:sp>
       <p:sp>
         <p:nvSpPr>
-          <p:cNvPr id="94" name="Line 28"/>
+          <p:cNvPr id="97" name="Line 28"/>
           <p:cNvSpPr/>
           <p:nvPr/>
         </p:nvSpPr>
@@ -4274,14 +4491,14 @@
       </p:sp>
       <p:sp>
         <p:nvSpPr>
-          <p:cNvPr id="95" name="TextShape 29"/>
-          <p:cNvSpPr txBox="1"/>
+          <p:cNvPr id="98" name="CustomShape 29"/>
+          <p:cNvSpPr/>
           <p:nvPr/>
         </p:nvSpPr>
         <p:spPr>
           <a:xfrm>
             <a:off x="7632000" y="3600000"/>
-            <a:ext cx="1296000" cy="576000"/>
+            <a:ext cx="1295640" cy="455400"/>
           </a:xfrm>
           <a:prstGeom prst="rect">
             <a:avLst/>
@@ -4291,11 +4508,22 @@
             <a:noFill/>
           </a:ln>
         </p:spPr>
+        <p:style>
+          <a:lnRef idx="0"/>
+          <a:fillRef idx="0"/>
+          <a:effectRef idx="0"/>
+          <a:fontRef idx="minor"/>
+        </p:style>
         <p:txBody>
           <a:bodyPr lIns="90000" rIns="90000" tIns="45000" bIns="45000">
             <a:spAutoFit/>
           </a:bodyPr>
           <a:p>
+            <a:pPr>
+              <a:lnSpc>
+                <a:spcPct val="100000"/>
+              </a:lnSpc>
+            </a:pPr>
             <a:r>
               <a:rPr b="0" lang="pt-BR" sz="1200" spc="-1" strike="noStrike">
                 <a:solidFill>
@@ -4314,14 +4542,14 @@
       </p:sp>
       <p:sp>
         <p:nvSpPr>
-          <p:cNvPr id="96" name="CustomShape 30"/>
+          <p:cNvPr id="99" name="CustomShape 30"/>
           <p:cNvSpPr/>
           <p:nvPr/>
         </p:nvSpPr>
         <p:spPr>
           <a:xfrm>
             <a:off x="8352000" y="2952000"/>
-            <a:ext cx="216000" cy="648000"/>
+            <a:ext cx="215640" cy="647640"/>
           </a:xfrm>
           <a:custGeom>
             <a:avLst/>
@@ -4363,7 +4591,7 @@
       </p:sp>
       <p:sp>
         <p:nvSpPr>
-          <p:cNvPr id="97" name="Line 31"/>
+          <p:cNvPr id="100" name="Line 31"/>
           <p:cNvSpPr/>
           <p:nvPr/>
         </p:nvSpPr>
@@ -4396,14 +4624,14 @@
       </p:sp>
       <p:sp>
         <p:nvSpPr>
-          <p:cNvPr id="98" name="TextShape 32"/>
-          <p:cNvSpPr txBox="1"/>
+          <p:cNvPr id="101" name="CustomShape 32"/>
+          <p:cNvSpPr/>
           <p:nvPr/>
         </p:nvSpPr>
         <p:spPr>
           <a:xfrm>
             <a:off x="3796200" y="3567600"/>
-            <a:ext cx="1232280" cy="431640"/>
+            <a:ext cx="1231920" cy="454680"/>
           </a:xfrm>
           <a:prstGeom prst="rect">
             <a:avLst/>
@@ -4413,11 +4641,22 @@
             <a:noFill/>
           </a:ln>
         </p:spPr>
+        <p:style>
+          <a:lnRef idx="0"/>
+          <a:fillRef idx="0"/>
+          <a:effectRef idx="0"/>
+          <a:fontRef idx="minor"/>
+        </p:style>
         <p:txBody>
           <a:bodyPr lIns="90000" rIns="90000" tIns="45000" bIns="45000">
             <a:spAutoFit/>
           </a:bodyPr>
           <a:p>
+            <a:pPr>
+              <a:lnSpc>
+                <a:spcPct val="100000"/>
+              </a:lnSpc>
+            </a:pPr>
             <a:r>
               <a:rPr b="0" lang="pt-BR" sz="1200" spc="-1" strike="noStrike">
                 <a:solidFill>
@@ -4436,7 +4675,7 @@
       </p:sp>
       <p:sp>
         <p:nvSpPr>
-          <p:cNvPr id="99" name="Line 33"/>
+          <p:cNvPr id="102" name="Line 33"/>
           <p:cNvSpPr/>
           <p:nvPr/>
         </p:nvSpPr>
@@ -4469,14 +4708,14 @@
       </p:sp>
       <p:sp>
         <p:nvSpPr>
-          <p:cNvPr id="100" name="CustomShape 34"/>
+          <p:cNvPr id="103" name="CustomShape 34"/>
           <p:cNvSpPr/>
           <p:nvPr/>
         </p:nvSpPr>
         <p:spPr>
           <a:xfrm flipH="1">
-            <a:off x="4248000" y="2934360"/>
-            <a:ext cx="137520" cy="577440"/>
+            <a:off x="4247280" y="2934360"/>
+            <a:ext cx="137160" cy="577080"/>
           </a:xfrm>
           <a:custGeom>
             <a:avLst/>
@@ -4518,14 +4757,14 @@
       </p:sp>
       <p:sp>
         <p:nvSpPr>
-          <p:cNvPr id="101" name="CustomShape 35"/>
+          <p:cNvPr id="104" name="CustomShape 35"/>
           <p:cNvSpPr/>
           <p:nvPr/>
         </p:nvSpPr>
         <p:spPr>
           <a:xfrm flipH="1">
-            <a:off x="4968000" y="2952000"/>
-            <a:ext cx="432000" cy="505440"/>
+            <a:off x="4967280" y="2952000"/>
+            <a:ext cx="431640" cy="505080"/>
           </a:xfrm>
           <a:custGeom>
             <a:avLst/>
@@ -4567,14 +4806,14 @@
       </p:sp>
       <p:sp>
         <p:nvSpPr>
-          <p:cNvPr id="102" name="CustomShape 36"/>
+          <p:cNvPr id="105" name="CustomShape 36"/>
           <p:cNvSpPr/>
           <p:nvPr/>
         </p:nvSpPr>
         <p:spPr>
           <a:xfrm flipH="1">
-            <a:off x="5975640" y="3006360"/>
-            <a:ext cx="360" cy="595440"/>
+            <a:off x="5974920" y="3006360"/>
+            <a:ext cx="360" cy="595080"/>
           </a:xfrm>
           <a:custGeom>
             <a:avLst/>
@@ -4616,14 +4855,14 @@
       </p:sp>
       <p:sp>
         <p:nvSpPr>
-          <p:cNvPr id="103" name="CustomShape 37"/>
+          <p:cNvPr id="106" name="CustomShape 37"/>
           <p:cNvSpPr/>
           <p:nvPr/>
         </p:nvSpPr>
         <p:spPr>
           <a:xfrm flipH="1">
             <a:off x="3080160" y="2808000"/>
-            <a:ext cx="735480" cy="631800"/>
+            <a:ext cx="735120" cy="631440"/>
           </a:xfrm>
           <a:custGeom>
             <a:avLst/>
@@ -4695,14 +4934,14 @@
       </p:grpSpPr>
       <p:sp>
         <p:nvSpPr>
-          <p:cNvPr id="104" name="TextShape 1"/>
-          <p:cNvSpPr txBox="1"/>
+          <p:cNvPr id="107" name="CustomShape 1"/>
+          <p:cNvSpPr/>
           <p:nvPr/>
         </p:nvSpPr>
         <p:spPr>
           <a:xfrm>
             <a:off x="6912000" y="85680"/>
-            <a:ext cx="2808000" cy="602280"/>
+            <a:ext cx="2807640" cy="638280"/>
           </a:xfrm>
           <a:prstGeom prst="rect">
             <a:avLst/>
@@ -4712,11 +4951,22 @@
             <a:noFill/>
           </a:ln>
         </p:spPr>
+        <p:style>
+          <a:lnRef idx="0"/>
+          <a:fillRef idx="0"/>
+          <a:effectRef idx="0"/>
+          <a:fontRef idx="minor"/>
+        </p:style>
         <p:txBody>
           <a:bodyPr lIns="90000" rIns="90000" tIns="45000" bIns="45000">
             <a:spAutoFit/>
           </a:bodyPr>
           <a:p>
+            <a:pPr>
+              <a:lnSpc>
+                <a:spcPct val="100000"/>
+              </a:lnSpc>
+            </a:pPr>
             <a:r>
               <a:rPr b="0" lang="pt-BR" sz="1800" spc="-1" strike="noStrike">
                 <a:latin typeface="Arial"/>
@@ -4731,14 +4981,14 @@
       </p:sp>
       <p:sp>
         <p:nvSpPr>
-          <p:cNvPr id="105" name="CustomShape 2"/>
+          <p:cNvPr id="108" name="CustomShape 2"/>
           <p:cNvSpPr/>
           <p:nvPr/>
         </p:nvSpPr>
         <p:spPr>
           <a:xfrm>
             <a:off x="471960" y="246600"/>
-            <a:ext cx="952920" cy="761040"/>
+            <a:ext cx="952560" cy="760680"/>
           </a:xfrm>
           <a:prstGeom prst="rect">
             <a:avLst/>
@@ -4805,14 +5055,14 @@
       </p:sp>
       <p:sp>
         <p:nvSpPr>
-          <p:cNvPr id="106" name="CustomShape 3"/>
+          <p:cNvPr id="109" name="CustomShape 3"/>
           <p:cNvSpPr/>
           <p:nvPr/>
         </p:nvSpPr>
         <p:spPr>
           <a:xfrm>
             <a:off x="432000" y="1584000"/>
-            <a:ext cx="1368000" cy="936000"/>
+            <a:ext cx="1367640" cy="935640"/>
           </a:xfrm>
           <a:prstGeom prst="ellipse">
             <a:avLst/>
@@ -4865,14 +5115,14 @@
       </p:sp>
       <p:sp>
         <p:nvSpPr>
-          <p:cNvPr id="107" name="CustomShape 4"/>
+          <p:cNvPr id="110" name="CustomShape 4"/>
           <p:cNvSpPr/>
           <p:nvPr/>
         </p:nvSpPr>
         <p:spPr>
           <a:xfrm>
             <a:off x="964080" y="997200"/>
-            <a:ext cx="115920" cy="586800"/>
+            <a:ext cx="115560" cy="586440"/>
           </a:xfrm>
           <a:custGeom>
             <a:avLst/>
@@ -4913,14 +5163,14 @@
       </p:sp>
       <p:sp>
         <p:nvSpPr>
-          <p:cNvPr id="108" name="CustomShape 5"/>
+          <p:cNvPr id="111" name="CustomShape 5"/>
           <p:cNvSpPr/>
           <p:nvPr/>
         </p:nvSpPr>
         <p:spPr>
           <a:xfrm>
             <a:off x="1156320" y="1126080"/>
-            <a:ext cx="1219680" cy="241920"/>
+            <a:ext cx="1219320" cy="241920"/>
           </a:xfrm>
           <a:prstGeom prst="rect">
             <a:avLst/>
@@ -4974,7 +5224,7 @@
       </p:sp>
       <p:sp>
         <p:nvSpPr>
-          <p:cNvPr id="109" name="Line 6"/>
+          <p:cNvPr id="112" name="Line 6"/>
           <p:cNvSpPr/>
           <p:nvPr/>
         </p:nvSpPr>
@@ -5007,7 +5257,7 @@
       </p:sp>
       <p:sp>
         <p:nvSpPr>
-          <p:cNvPr id="110" name="Line 7"/>
+          <p:cNvPr id="113" name="Line 7"/>
           <p:cNvSpPr/>
           <p:nvPr/>
         </p:nvSpPr>
@@ -5040,14 +5290,14 @@
       </p:sp>
       <p:sp>
         <p:nvSpPr>
-          <p:cNvPr id="111" name="TextShape 8"/>
-          <p:cNvSpPr txBox="1"/>
+          <p:cNvPr id="114" name="CustomShape 8"/>
+          <p:cNvSpPr/>
           <p:nvPr/>
         </p:nvSpPr>
         <p:spPr>
           <a:xfrm>
             <a:off x="576000" y="2952000"/>
-            <a:ext cx="1296000" cy="576000"/>
+            <a:ext cx="1295640" cy="455400"/>
           </a:xfrm>
           <a:prstGeom prst="rect">
             <a:avLst/>
@@ -5057,11 +5307,22 @@
             <a:noFill/>
           </a:ln>
         </p:spPr>
+        <p:style>
+          <a:lnRef idx="0"/>
+          <a:fillRef idx="0"/>
+          <a:effectRef idx="0"/>
+          <a:fontRef idx="minor"/>
+        </p:style>
         <p:txBody>
           <a:bodyPr lIns="90000" rIns="90000" tIns="45000" bIns="45000">
             <a:spAutoFit/>
           </a:bodyPr>
           <a:p>
+            <a:pPr>
+              <a:lnSpc>
+                <a:spcPct val="100000"/>
+              </a:lnSpc>
+            </a:pPr>
             <a:r>
               <a:rPr b="0" lang="pt-BR" sz="1200" spc="-1" strike="noStrike">
                 <a:solidFill>
@@ -5080,14 +5341,14 @@
       </p:sp>
       <p:sp>
         <p:nvSpPr>
-          <p:cNvPr id="112" name="CustomShape 9"/>
+          <p:cNvPr id="115" name="CustomShape 9"/>
           <p:cNvSpPr/>
           <p:nvPr/>
         </p:nvSpPr>
         <p:spPr>
           <a:xfrm>
             <a:off x="1123920" y="2520000"/>
-            <a:ext cx="28080" cy="432000"/>
+            <a:ext cx="27720" cy="431640"/>
           </a:xfrm>
           <a:custGeom>
             <a:avLst/>
@@ -5128,14 +5389,14 @@
       </p:sp>
       <p:sp>
         <p:nvSpPr>
-          <p:cNvPr id="113" name="CustomShape 10"/>
+          <p:cNvPr id="116" name="CustomShape 10"/>
           <p:cNvSpPr/>
           <p:nvPr/>
         </p:nvSpPr>
         <p:spPr>
           <a:xfrm>
             <a:off x="2253960" y="1440000"/>
-            <a:ext cx="1130040" cy="1062360"/>
+            <a:ext cx="1129680" cy="1062000"/>
           </a:xfrm>
           <a:prstGeom prst="ellipse">
             <a:avLst/>
@@ -5188,14 +5449,14 @@
       </p:sp>
       <p:sp>
         <p:nvSpPr>
-          <p:cNvPr id="114" name="CustomShape 11"/>
+          <p:cNvPr id="117" name="CustomShape 11"/>
           <p:cNvSpPr/>
           <p:nvPr/>
         </p:nvSpPr>
         <p:spPr>
           <a:xfrm flipH="1">
-            <a:off x="1584000" y="2304000"/>
-            <a:ext cx="792000" cy="648000"/>
+            <a:off x="1583280" y="2304000"/>
+            <a:ext cx="791640" cy="647640"/>
           </a:xfrm>
           <a:custGeom>
             <a:avLst/>
@@ -5237,14 +5498,14 @@
       </p:sp>
       <p:sp>
         <p:nvSpPr>
-          <p:cNvPr id="115" name="TextShape 12"/>
-          <p:cNvSpPr txBox="1"/>
+          <p:cNvPr id="118" name="CustomShape 12"/>
+          <p:cNvSpPr/>
           <p:nvPr/>
         </p:nvSpPr>
         <p:spPr>
           <a:xfrm>
             <a:off x="2232000" y="2952000"/>
-            <a:ext cx="1296000" cy="576000"/>
+            <a:ext cx="1295640" cy="455400"/>
           </a:xfrm>
           <a:prstGeom prst="rect">
             <a:avLst/>
@@ -5254,11 +5515,22 @@
             <a:noFill/>
           </a:ln>
         </p:spPr>
+        <p:style>
+          <a:lnRef idx="0"/>
+          <a:fillRef idx="0"/>
+          <a:effectRef idx="0"/>
+          <a:fontRef idx="minor"/>
+        </p:style>
         <p:txBody>
           <a:bodyPr lIns="90000" rIns="90000" tIns="45000" bIns="45000">
             <a:spAutoFit/>
           </a:bodyPr>
           <a:p>
+            <a:pPr>
+              <a:lnSpc>
+                <a:spcPct val="100000"/>
+              </a:lnSpc>
+            </a:pPr>
             <a:r>
               <a:rPr b="0" lang="pt-BR" sz="1200" spc="-1" strike="noStrike">
                 <a:solidFill>
@@ -5277,7 +5549,7 @@
       </p:sp>
       <p:sp>
         <p:nvSpPr>
-          <p:cNvPr id="116" name="Line 13"/>
+          <p:cNvPr id="119" name="Line 13"/>
           <p:cNvSpPr/>
           <p:nvPr/>
         </p:nvSpPr>
@@ -5310,7 +5582,7 @@
       </p:sp>
       <p:sp>
         <p:nvSpPr>
-          <p:cNvPr id="117" name="Line 14"/>
+          <p:cNvPr id="120" name="Line 14"/>
           <p:cNvSpPr/>
           <p:nvPr/>
         </p:nvSpPr>
@@ -5343,14 +5615,14 @@
       </p:sp>
       <p:sp>
         <p:nvSpPr>
-          <p:cNvPr id="118" name="CustomShape 15"/>
+          <p:cNvPr id="121" name="CustomShape 15"/>
           <p:cNvSpPr/>
           <p:nvPr/>
         </p:nvSpPr>
         <p:spPr>
           <a:xfrm>
             <a:off x="2923920" y="2502360"/>
-            <a:ext cx="28080" cy="432000"/>
+            <a:ext cx="27720" cy="431640"/>
           </a:xfrm>
           <a:custGeom>
             <a:avLst/>
@@ -5391,14 +5663,14 @@
       </p:sp>
       <p:sp>
         <p:nvSpPr>
-          <p:cNvPr id="119" name="CustomShape 16"/>
+          <p:cNvPr id="122" name="CustomShape 16"/>
           <p:cNvSpPr/>
           <p:nvPr/>
         </p:nvSpPr>
         <p:spPr>
           <a:xfrm>
             <a:off x="2448000" y="246960"/>
-            <a:ext cx="952920" cy="761040"/>
+            <a:ext cx="952560" cy="760680"/>
           </a:xfrm>
           <a:prstGeom prst="rect">
             <a:avLst/>
@@ -5465,14 +5737,14 @@
       </p:sp>
       <p:sp>
         <p:nvSpPr>
-          <p:cNvPr id="120" name="CustomShape 17"/>
+          <p:cNvPr id="123" name="CustomShape 17"/>
           <p:cNvSpPr/>
           <p:nvPr/>
         </p:nvSpPr>
         <p:spPr>
           <a:xfrm flipV="1">
-            <a:off x="2808000" y="1008000"/>
-            <a:ext cx="131040" cy="432720"/>
+            <a:off x="2808000" y="1007280"/>
+            <a:ext cx="130680" cy="432360"/>
           </a:xfrm>
           <a:custGeom>
             <a:avLst/>
@@ -5513,14 +5785,14 @@
       </p:sp>
       <p:sp>
         <p:nvSpPr>
-          <p:cNvPr id="121" name="CustomShape 18"/>
+          <p:cNvPr id="124" name="CustomShape 18"/>
           <p:cNvSpPr/>
           <p:nvPr/>
         </p:nvSpPr>
         <p:spPr>
           <a:xfrm>
             <a:off x="3096000" y="1080000"/>
-            <a:ext cx="842400" cy="455040"/>
+            <a:ext cx="842040" cy="454680"/>
           </a:xfrm>
           <a:prstGeom prst="rect">
             <a:avLst/>
@@ -5539,14 +5811,14 @@
       </p:sp>
       <p:sp>
         <p:nvSpPr>
-          <p:cNvPr id="122" name="CustomShape 19"/>
+          <p:cNvPr id="125" name="CustomShape 19"/>
           <p:cNvSpPr/>
           <p:nvPr/>
         </p:nvSpPr>
         <p:spPr>
           <a:xfrm>
             <a:off x="3096000" y="1080000"/>
-            <a:ext cx="2016000" cy="250200"/>
+            <a:ext cx="2015640" cy="249840"/>
           </a:xfrm>
           <a:prstGeom prst="rect">
             <a:avLst/>
@@ -5620,14 +5892,14 @@
       </p:grpSpPr>
       <p:sp>
         <p:nvSpPr>
-          <p:cNvPr id="123" name="TextShape 1"/>
-          <p:cNvSpPr txBox="1"/>
+          <p:cNvPr id="126" name="CustomShape 1"/>
+          <p:cNvSpPr/>
           <p:nvPr/>
         </p:nvSpPr>
         <p:spPr>
           <a:xfrm>
             <a:off x="6912000" y="85680"/>
-            <a:ext cx="2808000" cy="602280"/>
+            <a:ext cx="2807640" cy="638280"/>
           </a:xfrm>
           <a:prstGeom prst="rect">
             <a:avLst/>
@@ -5637,11 +5909,22 @@
             <a:noFill/>
           </a:ln>
         </p:spPr>
+        <p:style>
+          <a:lnRef idx="0"/>
+          <a:fillRef idx="0"/>
+          <a:effectRef idx="0"/>
+          <a:fontRef idx="minor"/>
+        </p:style>
         <p:txBody>
           <a:bodyPr lIns="90000" rIns="90000" tIns="45000" bIns="45000">
             <a:spAutoFit/>
           </a:bodyPr>
           <a:p>
+            <a:pPr>
+              <a:lnSpc>
+                <a:spcPct val="100000"/>
+              </a:lnSpc>
+            </a:pPr>
             <a:r>
               <a:rPr b="0" lang="pt-BR" sz="1800" spc="-1" strike="noStrike">
                 <a:latin typeface="Arial"/>
@@ -5657,14 +5940,14 @@
       </p:sp>
       <p:sp>
         <p:nvSpPr>
-          <p:cNvPr id="124" name="CustomShape 2"/>
+          <p:cNvPr id="127" name="CustomShape 2"/>
           <p:cNvSpPr/>
           <p:nvPr/>
         </p:nvSpPr>
         <p:spPr>
           <a:xfrm>
             <a:off x="3096000" y="1080000"/>
-            <a:ext cx="842400" cy="455040"/>
+            <a:ext cx="842040" cy="454680"/>
           </a:xfrm>
           <a:prstGeom prst="rect">
             <a:avLst/>
@@ -5683,14 +5966,14 @@
       </p:sp>
       <p:sp>
         <p:nvSpPr>
-          <p:cNvPr id="125" name="CustomShape 3"/>
+          <p:cNvPr id="128" name="CustomShape 3"/>
           <p:cNvSpPr/>
           <p:nvPr/>
         </p:nvSpPr>
         <p:spPr>
           <a:xfrm>
             <a:off x="504360" y="1512000"/>
-            <a:ext cx="1727640" cy="1511640"/>
+            <a:ext cx="1727280" cy="1511280"/>
           </a:xfrm>
           <a:prstGeom prst="ellipse">
             <a:avLst/>
@@ -5743,14 +6026,14 @@
       </p:sp>
       <p:sp>
         <p:nvSpPr>
-          <p:cNvPr id="126" name="TextShape 4"/>
-          <p:cNvSpPr txBox="1"/>
+          <p:cNvPr id="129" name="CustomShape 4"/>
+          <p:cNvSpPr/>
           <p:nvPr/>
         </p:nvSpPr>
         <p:spPr>
           <a:xfrm>
             <a:off x="720000" y="3816000"/>
-            <a:ext cx="1296000" cy="576000"/>
+            <a:ext cx="1295640" cy="455400"/>
           </a:xfrm>
           <a:prstGeom prst="rect">
             <a:avLst/>
@@ -5760,11 +6043,22 @@
             <a:noFill/>
           </a:ln>
         </p:spPr>
+        <p:style>
+          <a:lnRef idx="0"/>
+          <a:fillRef idx="0"/>
+          <a:effectRef idx="0"/>
+          <a:fontRef idx="minor"/>
+        </p:style>
         <p:txBody>
           <a:bodyPr lIns="90000" rIns="90000" tIns="45000" bIns="45000">
             <a:spAutoFit/>
           </a:bodyPr>
           <a:p>
+            <a:pPr>
+              <a:lnSpc>
+                <a:spcPct val="100000"/>
+              </a:lnSpc>
+            </a:pPr>
             <a:r>
               <a:rPr b="0" lang="pt-BR" sz="1200" spc="-1" strike="noStrike">
                 <a:solidFill>
@@ -5783,7 +6077,7 @@
       </p:sp>
       <p:sp>
         <p:nvSpPr>
-          <p:cNvPr id="127" name="Line 5"/>
+          <p:cNvPr id="130" name="Line 5"/>
           <p:cNvSpPr/>
           <p:nvPr/>
         </p:nvSpPr>
@@ -5816,7 +6110,7 @@
       </p:sp>
       <p:sp>
         <p:nvSpPr>
-          <p:cNvPr id="128" name="Line 6"/>
+          <p:cNvPr id="131" name="Line 6"/>
           <p:cNvSpPr/>
           <p:nvPr/>
         </p:nvSpPr>
@@ -5849,14 +6143,14 @@
       </p:sp>
       <p:sp>
         <p:nvSpPr>
-          <p:cNvPr id="129" name="CustomShape 7"/>
+          <p:cNvPr id="132" name="CustomShape 7"/>
           <p:cNvSpPr/>
           <p:nvPr/>
         </p:nvSpPr>
         <p:spPr>
           <a:xfrm rot="21552600">
-            <a:off x="1368000" y="3023640"/>
-            <a:ext cx="7920" cy="720360"/>
+            <a:off x="1367640" y="3023280"/>
+            <a:ext cx="7560" cy="720000"/>
           </a:xfrm>
           <a:custGeom>
             <a:avLst/>
@@ -5897,14 +6191,14 @@
       </p:sp>
       <p:sp>
         <p:nvSpPr>
-          <p:cNvPr id="130" name="CustomShape 8"/>
+          <p:cNvPr id="133" name="CustomShape 8"/>
           <p:cNvSpPr/>
           <p:nvPr/>
         </p:nvSpPr>
         <p:spPr>
           <a:xfrm>
             <a:off x="2469960" y="1656000"/>
-            <a:ext cx="2066040" cy="1440000"/>
+            <a:ext cx="2065680" cy="1439640"/>
           </a:xfrm>
           <a:prstGeom prst="ellipse">
             <a:avLst/>
@@ -5957,7 +6251,7 @@
       </p:sp>
       <p:sp>
         <p:nvSpPr>
-          <p:cNvPr id="131" name="Line 9"/>
+          <p:cNvPr id="134" name="Line 9"/>
           <p:cNvSpPr/>
           <p:nvPr/>
         </p:nvSpPr>
@@ -5990,7 +6284,7 @@
       </p:sp>
       <p:sp>
         <p:nvSpPr>
-          <p:cNvPr id="132" name="Line 10"/>
+          <p:cNvPr id="135" name="Line 10"/>
           <p:cNvSpPr/>
           <p:nvPr/>
         </p:nvSpPr>
@@ -6023,14 +6317,14 @@
       </p:sp>
       <p:sp>
         <p:nvSpPr>
-          <p:cNvPr id="133" name="CustomShape 11"/>
+          <p:cNvPr id="136" name="CustomShape 11"/>
           <p:cNvSpPr/>
           <p:nvPr/>
         </p:nvSpPr>
         <p:spPr>
           <a:xfrm flipH="1">
-            <a:off x="1800000" y="2880000"/>
-            <a:ext cx="936000" cy="792000"/>
+            <a:off x="1799280" y="2880000"/>
+            <a:ext cx="935640" cy="791640"/>
           </a:xfrm>
           <a:custGeom>
             <a:avLst/>
@@ -6072,14 +6366,14 @@
       </p:sp>
       <p:sp>
         <p:nvSpPr>
-          <p:cNvPr id="134" name="CustomShape 12"/>
+          <p:cNvPr id="137" name="CustomShape 12"/>
           <p:cNvSpPr/>
           <p:nvPr/>
         </p:nvSpPr>
         <p:spPr>
           <a:xfrm>
             <a:off x="3456000" y="3096000"/>
-            <a:ext cx="360" cy="648000"/>
+            <a:ext cx="360" cy="647640"/>
           </a:xfrm>
           <a:custGeom>
             <a:avLst/>
@@ -6120,14 +6414,14 @@
       </p:sp>
       <p:sp>
         <p:nvSpPr>
-          <p:cNvPr id="135" name="CustomShape 13"/>
+          <p:cNvPr id="138" name="CustomShape 13"/>
           <p:cNvSpPr/>
           <p:nvPr/>
         </p:nvSpPr>
         <p:spPr>
           <a:xfrm flipH="1">
-            <a:off x="3966480" y="2952000"/>
-            <a:ext cx="1001520" cy="721440"/>
+            <a:off x="3965760" y="2952000"/>
+            <a:ext cx="1001160" cy="721080"/>
           </a:xfrm>
           <a:custGeom>
             <a:avLst/>
@@ -6169,14 +6463,14 @@
       </p:sp>
       <p:sp>
         <p:nvSpPr>
-          <p:cNvPr id="136" name="TextShape 14"/>
-          <p:cNvSpPr txBox="1"/>
+          <p:cNvPr id="139" name="CustomShape 14"/>
+          <p:cNvSpPr/>
           <p:nvPr/>
         </p:nvSpPr>
         <p:spPr>
           <a:xfrm>
             <a:off x="2520000" y="3744000"/>
-            <a:ext cx="1800000" cy="432000"/>
+            <a:ext cx="1799640" cy="454680"/>
           </a:xfrm>
           <a:prstGeom prst="rect">
             <a:avLst/>
@@ -6186,11 +6480,22 @@
             <a:noFill/>
           </a:ln>
         </p:spPr>
+        <p:style>
+          <a:lnRef idx="0"/>
+          <a:fillRef idx="0"/>
+          <a:effectRef idx="0"/>
+          <a:fontRef idx="minor"/>
+        </p:style>
         <p:txBody>
           <a:bodyPr lIns="90000" rIns="90000" tIns="45000" bIns="45000">
             <a:spAutoFit/>
           </a:bodyPr>
           <a:p>
+            <a:pPr>
+              <a:lnSpc>
+                <a:spcPct val="100000"/>
+              </a:lnSpc>
+            </a:pPr>
             <a:r>
               <a:rPr b="0" lang="pt-BR" sz="1200" spc="-1" strike="noStrike">
                 <a:solidFill>
@@ -6209,14 +6514,14 @@
       </p:sp>
       <p:sp>
         <p:nvSpPr>
-          <p:cNvPr id="137" name="CustomShape 15"/>
+          <p:cNvPr id="140" name="CustomShape 15"/>
           <p:cNvSpPr/>
           <p:nvPr/>
         </p:nvSpPr>
         <p:spPr>
           <a:xfrm>
             <a:off x="4680360" y="1656360"/>
-            <a:ext cx="1727640" cy="1511640"/>
+            <a:ext cx="1727280" cy="1511280"/>
           </a:xfrm>
           <a:prstGeom prst="ellipse">
             <a:avLst/>
@@ -6269,7 +6574,7 @@
       </p:sp>
       <p:sp>
         <p:nvSpPr>
-          <p:cNvPr id="138" name="Line 16"/>
+          <p:cNvPr id="141" name="Line 16"/>
           <p:cNvSpPr/>
           <p:nvPr/>
         </p:nvSpPr>
@@ -6302,7 +6607,7 @@
       </p:sp>
       <p:sp>
         <p:nvSpPr>
-          <p:cNvPr id="139" name="Line 17"/>
+          <p:cNvPr id="142" name="Line 17"/>
           <p:cNvSpPr/>
           <p:nvPr/>
         </p:nvSpPr>
@@ -6335,14 +6640,14 @@
       </p:sp>
       <p:sp>
         <p:nvSpPr>
-          <p:cNvPr id="140" name="TextShape 18"/>
-          <p:cNvSpPr txBox="1"/>
+          <p:cNvPr id="143" name="CustomShape 18"/>
+          <p:cNvSpPr/>
           <p:nvPr/>
         </p:nvSpPr>
         <p:spPr>
           <a:xfrm>
             <a:off x="4752000" y="3816000"/>
-            <a:ext cx="1584000" cy="431640"/>
+            <a:ext cx="1583640" cy="454680"/>
           </a:xfrm>
           <a:prstGeom prst="rect">
             <a:avLst/>
@@ -6352,11 +6657,22 @@
             <a:noFill/>
           </a:ln>
         </p:spPr>
+        <p:style>
+          <a:lnRef idx="0"/>
+          <a:fillRef idx="0"/>
+          <a:effectRef idx="0"/>
+          <a:fontRef idx="minor"/>
+        </p:style>
         <p:txBody>
           <a:bodyPr lIns="90000" rIns="90000" tIns="45000" bIns="45000">
             <a:spAutoFit/>
           </a:bodyPr>
           <a:p>
+            <a:pPr>
+              <a:lnSpc>
+                <a:spcPct val="100000"/>
+              </a:lnSpc>
+            </a:pPr>
             <a:r>
               <a:rPr b="0" lang="pt-BR" sz="1200" spc="-1" strike="noStrike">
                 <a:solidFill>
@@ -6375,14 +6691,14 @@
       </p:sp>
       <p:sp>
         <p:nvSpPr>
-          <p:cNvPr id="141" name="CustomShape 19"/>
+          <p:cNvPr id="144" name="CustomShape 19"/>
           <p:cNvSpPr/>
           <p:nvPr/>
         </p:nvSpPr>
         <p:spPr>
           <a:xfrm rot="21552600">
-            <a:off x="5544000" y="3168000"/>
-            <a:ext cx="7920" cy="504000"/>
+            <a:off x="5543640" y="3167640"/>
+            <a:ext cx="7560" cy="503640"/>
           </a:xfrm>
           <a:custGeom>
             <a:avLst/>
@@ -6423,14 +6739,14 @@
       </p:sp>
       <p:sp>
         <p:nvSpPr>
-          <p:cNvPr id="142" name="CustomShape 20"/>
+          <p:cNvPr id="145" name="CustomShape 20"/>
           <p:cNvSpPr/>
           <p:nvPr/>
         </p:nvSpPr>
         <p:spPr>
           <a:xfrm>
             <a:off x="6912000" y="2232000"/>
-            <a:ext cx="1727640" cy="1511640"/>
+            <a:ext cx="1727280" cy="1511280"/>
           </a:xfrm>
           <a:prstGeom prst="ellipse">
             <a:avLst/>
@@ -6483,14 +6799,14 @@
       </p:sp>
       <p:sp>
         <p:nvSpPr>
-          <p:cNvPr id="143" name="CustomShape 21"/>
+          <p:cNvPr id="146" name="CustomShape 21"/>
           <p:cNvSpPr/>
           <p:nvPr/>
         </p:nvSpPr>
         <p:spPr>
           <a:xfrm>
             <a:off x="7344000" y="864000"/>
-            <a:ext cx="952920" cy="761040"/>
+            <a:ext cx="952560" cy="760680"/>
           </a:xfrm>
           <a:prstGeom prst="rect">
             <a:avLst/>
@@ -6557,14 +6873,14 @@
       </p:sp>
       <p:sp>
         <p:nvSpPr>
-          <p:cNvPr id="144" name="CustomShape 22"/>
+          <p:cNvPr id="147" name="CustomShape 22"/>
           <p:cNvSpPr/>
           <p:nvPr/>
         </p:nvSpPr>
         <p:spPr>
           <a:xfrm flipH="1">
-            <a:off x="5910480" y="2952000"/>
-            <a:ext cx="1001520" cy="721440"/>
+            <a:off x="5909760" y="2952000"/>
+            <a:ext cx="1001160" cy="721080"/>
           </a:xfrm>
           <a:custGeom>
             <a:avLst/>
@@ -6606,14 +6922,14 @@
       </p:sp>
       <p:sp>
         <p:nvSpPr>
-          <p:cNvPr id="145" name="CustomShape 23"/>
+          <p:cNvPr id="148" name="CustomShape 23"/>
           <p:cNvSpPr/>
           <p:nvPr/>
         </p:nvSpPr>
         <p:spPr>
           <a:xfrm flipV="1">
-            <a:off x="7788960" y="1625040"/>
-            <a:ext cx="131040" cy="606960"/>
+            <a:off x="7788960" y="1624320"/>
+            <a:ext cx="130680" cy="606600"/>
           </a:xfrm>
           <a:custGeom>
             <a:avLst/>
@@ -6654,14 +6970,14 @@
       </p:sp>
       <p:sp>
         <p:nvSpPr>
-          <p:cNvPr id="146" name="CustomShape 24"/>
+          <p:cNvPr id="149" name="CustomShape 24"/>
           <p:cNvSpPr/>
           <p:nvPr/>
         </p:nvSpPr>
         <p:spPr>
           <a:xfrm>
             <a:off x="6984000" y="1754280"/>
-            <a:ext cx="842400" cy="333720"/>
+            <a:ext cx="842040" cy="333360"/>
           </a:xfrm>
           <a:prstGeom prst="rect">
             <a:avLst/>
@@ -6735,14 +7051,14 @@
       </p:grpSpPr>
       <p:sp>
         <p:nvSpPr>
-          <p:cNvPr id="147" name="TextShape 1"/>
-          <p:cNvSpPr txBox="1"/>
+          <p:cNvPr id="150" name="CustomShape 1"/>
+          <p:cNvSpPr/>
           <p:nvPr/>
         </p:nvSpPr>
         <p:spPr>
           <a:xfrm>
             <a:off x="6912000" y="85680"/>
-            <a:ext cx="2808000" cy="602280"/>
+            <a:ext cx="2807640" cy="638280"/>
           </a:xfrm>
           <a:prstGeom prst="rect">
             <a:avLst/>
@@ -6752,11 +7068,22 @@
             <a:noFill/>
           </a:ln>
         </p:spPr>
+        <p:style>
+          <a:lnRef idx="0"/>
+          <a:fillRef idx="0"/>
+          <a:effectRef idx="0"/>
+          <a:fontRef idx="minor"/>
+        </p:style>
         <p:txBody>
           <a:bodyPr lIns="90000" rIns="90000" tIns="45000" bIns="45000">
             <a:spAutoFit/>
           </a:bodyPr>
           <a:p>
+            <a:pPr>
+              <a:lnSpc>
+                <a:spcPct val="100000"/>
+              </a:lnSpc>
+            </a:pPr>
             <a:r>
               <a:rPr b="0" lang="pt-BR" sz="1800" spc="-1" strike="noStrike">
                 <a:latin typeface="Arial"/>
@@ -6771,14 +7098,14 @@
       </p:sp>
       <p:sp>
         <p:nvSpPr>
-          <p:cNvPr id="148" name="CustomShape 2"/>
+          <p:cNvPr id="151" name="CustomShape 2"/>
           <p:cNvSpPr/>
           <p:nvPr/>
         </p:nvSpPr>
         <p:spPr>
           <a:xfrm>
             <a:off x="471960" y="246600"/>
-            <a:ext cx="952920" cy="761040"/>
+            <a:ext cx="952560" cy="760680"/>
           </a:xfrm>
           <a:prstGeom prst="rect">
             <a:avLst/>
@@ -6845,14 +7172,14 @@
       </p:sp>
       <p:sp>
         <p:nvSpPr>
-          <p:cNvPr id="149" name="CustomShape 3"/>
+          <p:cNvPr id="152" name="CustomShape 3"/>
           <p:cNvSpPr/>
           <p:nvPr/>
         </p:nvSpPr>
         <p:spPr>
           <a:xfrm>
             <a:off x="964080" y="997200"/>
-            <a:ext cx="115920" cy="586800"/>
+            <a:ext cx="115560" cy="586440"/>
           </a:xfrm>
           <a:custGeom>
             <a:avLst/>
@@ -6893,14 +7220,14 @@
       </p:sp>
       <p:sp>
         <p:nvSpPr>
-          <p:cNvPr id="150" name="CustomShape 4"/>
+          <p:cNvPr id="153" name="CustomShape 4"/>
           <p:cNvSpPr/>
           <p:nvPr/>
         </p:nvSpPr>
         <p:spPr>
           <a:xfrm>
             <a:off x="2448000" y="246960"/>
-            <a:ext cx="952920" cy="761040"/>
+            <a:ext cx="952560" cy="760680"/>
           </a:xfrm>
           <a:prstGeom prst="rect">
             <a:avLst/>
@@ -6967,14 +7294,14 @@
       </p:sp>
       <p:sp>
         <p:nvSpPr>
-          <p:cNvPr id="151" name="CustomShape 5"/>
+          <p:cNvPr id="154" name="CustomShape 5"/>
           <p:cNvSpPr/>
           <p:nvPr/>
         </p:nvSpPr>
         <p:spPr>
           <a:xfrm flipV="1">
-            <a:off x="2808000" y="1008000"/>
-            <a:ext cx="131040" cy="576000"/>
+            <a:off x="2808000" y="1007280"/>
+            <a:ext cx="130680" cy="575640"/>
           </a:xfrm>
           <a:custGeom>
             <a:avLst/>
@@ -7015,14 +7342,14 @@
       </p:sp>
       <p:sp>
         <p:nvSpPr>
-          <p:cNvPr id="152" name="CustomShape 6"/>
+          <p:cNvPr id="155" name="CustomShape 6"/>
           <p:cNvSpPr/>
           <p:nvPr/>
         </p:nvSpPr>
         <p:spPr>
           <a:xfrm>
             <a:off x="3096000" y="1080000"/>
-            <a:ext cx="842400" cy="455040"/>
+            <a:ext cx="842040" cy="454680"/>
           </a:xfrm>
           <a:prstGeom prst="rect">
             <a:avLst/>
@@ -7041,14 +7368,14 @@
       </p:sp>
       <p:sp>
         <p:nvSpPr>
-          <p:cNvPr id="153" name="CustomShape 7"/>
+          <p:cNvPr id="156" name="CustomShape 7"/>
           <p:cNvSpPr/>
           <p:nvPr/>
         </p:nvSpPr>
         <p:spPr>
           <a:xfrm>
             <a:off x="144000" y="1080000"/>
-            <a:ext cx="842400" cy="333000"/>
+            <a:ext cx="842040" cy="333000"/>
           </a:xfrm>
           <a:prstGeom prst="rect">
             <a:avLst/>
@@ -7092,14 +7419,14 @@
       </p:sp>
       <p:sp>
         <p:nvSpPr>
-          <p:cNvPr id="154" name="CustomShape 8"/>
+          <p:cNvPr id="157" name="CustomShape 8"/>
           <p:cNvSpPr/>
           <p:nvPr/>
         </p:nvSpPr>
         <p:spPr>
           <a:xfrm>
             <a:off x="576360" y="1584000"/>
-            <a:ext cx="1151640" cy="1151640"/>
+            <a:ext cx="1151280" cy="1151280"/>
           </a:xfrm>
           <a:prstGeom prst="ellipse">
             <a:avLst/>
@@ -7152,14 +7479,14 @@
       </p:sp>
       <p:sp>
         <p:nvSpPr>
-          <p:cNvPr id="155" name="TextShape 9"/>
-          <p:cNvSpPr txBox="1"/>
+          <p:cNvPr id="158" name="CustomShape 9"/>
+          <p:cNvSpPr/>
           <p:nvPr/>
         </p:nvSpPr>
         <p:spPr>
           <a:xfrm>
             <a:off x="648000" y="3240000"/>
-            <a:ext cx="1296000" cy="576000"/>
+            <a:ext cx="1295640" cy="272880"/>
           </a:xfrm>
           <a:prstGeom prst="rect">
             <a:avLst/>
@@ -7169,11 +7496,22 @@
             <a:noFill/>
           </a:ln>
         </p:spPr>
+        <p:style>
+          <a:lnRef idx="0"/>
+          <a:fillRef idx="0"/>
+          <a:effectRef idx="0"/>
+          <a:fontRef idx="minor"/>
+        </p:style>
         <p:txBody>
           <a:bodyPr lIns="90000" rIns="90000" tIns="45000" bIns="45000">
             <a:spAutoFit/>
           </a:bodyPr>
           <a:p>
+            <a:pPr>
+              <a:lnSpc>
+                <a:spcPct val="100000"/>
+              </a:lnSpc>
+            </a:pPr>
             <a:r>
               <a:rPr b="0" lang="pt-BR" sz="1200" spc="-1" strike="noStrike">
                 <a:solidFill>
@@ -7192,7 +7530,7 @@
       </p:sp>
       <p:sp>
         <p:nvSpPr>
-          <p:cNvPr id="156" name="Line 10"/>
+          <p:cNvPr id="159" name="Line 10"/>
           <p:cNvSpPr/>
           <p:nvPr/>
         </p:nvSpPr>
@@ -7225,7 +7563,7 @@
       </p:sp>
       <p:sp>
         <p:nvSpPr>
-          <p:cNvPr id="157" name="Line 11"/>
+          <p:cNvPr id="160" name="Line 11"/>
           <p:cNvSpPr/>
           <p:nvPr/>
         </p:nvSpPr>
@@ -7258,14 +7596,14 @@
       </p:sp>
       <p:sp>
         <p:nvSpPr>
-          <p:cNvPr id="158" name="CustomShape 12"/>
+          <p:cNvPr id="161" name="CustomShape 12"/>
           <p:cNvSpPr/>
           <p:nvPr/>
         </p:nvSpPr>
         <p:spPr>
           <a:xfrm>
             <a:off x="1224000" y="2735640"/>
-            <a:ext cx="115920" cy="504360"/>
+            <a:ext cx="115560" cy="504000"/>
           </a:xfrm>
           <a:custGeom>
             <a:avLst/>
@@ -7306,14 +7644,14 @@
       </p:sp>
       <p:sp>
         <p:nvSpPr>
-          <p:cNvPr id="159" name="CustomShape 13"/>
+          <p:cNvPr id="162" name="CustomShape 13"/>
           <p:cNvSpPr/>
           <p:nvPr/>
         </p:nvSpPr>
         <p:spPr>
           <a:xfrm>
             <a:off x="2088360" y="1584000"/>
-            <a:ext cx="1295640" cy="1224000"/>
+            <a:ext cx="1295280" cy="1223640"/>
           </a:xfrm>
           <a:prstGeom prst="ellipse">
             <a:avLst/>
@@ -7366,14 +7704,14 @@
       </p:sp>
       <p:sp>
         <p:nvSpPr>
-          <p:cNvPr id="160" name="CustomShape 14"/>
+          <p:cNvPr id="163" name="CustomShape 14"/>
           <p:cNvSpPr/>
           <p:nvPr/>
         </p:nvSpPr>
         <p:spPr>
           <a:xfrm flipH="1">
-            <a:off x="1800000" y="2664000"/>
-            <a:ext cx="569520" cy="576000"/>
+            <a:off x="1799280" y="2664000"/>
+            <a:ext cx="569160" cy="575640"/>
           </a:xfrm>
           <a:custGeom>
             <a:avLst/>
@@ -7415,14 +7753,14 @@
       </p:sp>
       <p:sp>
         <p:nvSpPr>
-          <p:cNvPr id="161" name="CustomShape 15"/>
+          <p:cNvPr id="164" name="CustomShape 15"/>
           <p:cNvSpPr/>
           <p:nvPr/>
         </p:nvSpPr>
         <p:spPr>
           <a:xfrm>
             <a:off x="1872000" y="1107000"/>
-            <a:ext cx="842400" cy="333000"/>
+            <a:ext cx="842040" cy="333000"/>
           </a:xfrm>
           <a:prstGeom prst="rect">
             <a:avLst/>
@@ -7496,14 +7834,14 @@
       </p:grpSpPr>
       <p:sp>
         <p:nvSpPr>
-          <p:cNvPr id="162" name="CustomShape 1"/>
+          <p:cNvPr id="165" name="CustomShape 1"/>
           <p:cNvSpPr/>
           <p:nvPr/>
         </p:nvSpPr>
         <p:spPr>
           <a:xfrm>
             <a:off x="156240" y="91080"/>
-            <a:ext cx="842400" cy="581760"/>
+            <a:ext cx="842040" cy="581400"/>
           </a:xfrm>
           <a:prstGeom prst="rect">
             <a:avLst/>
@@ -7570,14 +7908,14 @@
       </p:sp>
       <p:sp>
         <p:nvSpPr>
-          <p:cNvPr id="163" name="CustomShape 2"/>
+          <p:cNvPr id="166" name="CustomShape 2"/>
           <p:cNvSpPr/>
           <p:nvPr/>
         </p:nvSpPr>
         <p:spPr>
           <a:xfrm>
             <a:off x="270720" y="1271520"/>
-            <a:ext cx="999000" cy="812520"/>
+            <a:ext cx="998640" cy="812160"/>
           </a:xfrm>
           <a:prstGeom prst="ellipse">
             <a:avLst/>
@@ -7626,14 +7964,14 @@
       </p:sp>
       <p:sp>
         <p:nvSpPr>
-          <p:cNvPr id="164" name="CustomShape 3"/>
+          <p:cNvPr id="167" name="CustomShape 3"/>
           <p:cNvSpPr/>
           <p:nvPr/>
         </p:nvSpPr>
         <p:spPr>
           <a:xfrm>
             <a:off x="577800" y="673920"/>
-            <a:ext cx="191880" cy="596880"/>
+            <a:ext cx="191520" cy="596520"/>
           </a:xfrm>
           <a:custGeom>
             <a:avLst/>
@@ -7674,14 +8012,14 @@
       </p:sp>
       <p:sp>
         <p:nvSpPr>
-          <p:cNvPr id="165" name="CustomShape 4"/>
+          <p:cNvPr id="168" name="CustomShape 4"/>
           <p:cNvSpPr/>
           <p:nvPr/>
         </p:nvSpPr>
         <p:spPr>
           <a:xfrm>
             <a:off x="-44640" y="864720"/>
-            <a:ext cx="1363680" cy="211680"/>
+            <a:ext cx="1363320" cy="211320"/>
           </a:xfrm>
           <a:prstGeom prst="rect">
             <a:avLst/>
@@ -7725,7 +8063,7 @@
       </p:sp>
       <p:sp>
         <p:nvSpPr>
-          <p:cNvPr id="166" name="Line 5"/>
+          <p:cNvPr id="169" name="Line 5"/>
           <p:cNvSpPr/>
           <p:nvPr/>
         </p:nvSpPr>
@@ -7758,7 +8096,7 @@
       </p:sp>
       <p:sp>
         <p:nvSpPr>
-          <p:cNvPr id="167" name="Line 6"/>
+          <p:cNvPr id="170" name="Line 6"/>
           <p:cNvSpPr/>
           <p:nvPr/>
         </p:nvSpPr>
@@ -7791,14 +8129,14 @@
       </p:sp>
       <p:sp>
         <p:nvSpPr>
-          <p:cNvPr id="168" name="CustomShape 7"/>
+          <p:cNvPr id="171" name="CustomShape 7"/>
           <p:cNvSpPr/>
           <p:nvPr/>
         </p:nvSpPr>
         <p:spPr>
           <a:xfrm>
             <a:off x="770760" y="2084760"/>
-            <a:ext cx="158760" cy="690840"/>
+            <a:ext cx="158400" cy="690480"/>
           </a:xfrm>
           <a:custGeom>
             <a:avLst/>
@@ -7839,14 +8177,14 @@
       </p:sp>
       <p:sp>
         <p:nvSpPr>
-          <p:cNvPr id="169" name="CustomShape 8"/>
+          <p:cNvPr id="172" name="CustomShape 8"/>
           <p:cNvSpPr/>
           <p:nvPr/>
         </p:nvSpPr>
         <p:spPr>
           <a:xfrm>
             <a:off x="325440" y="2939400"/>
-            <a:ext cx="1315800" cy="211680"/>
+            <a:ext cx="1315440" cy="211320"/>
           </a:xfrm>
           <a:prstGeom prst="rect">
             <a:avLst/>
@@ -7890,7 +8228,7 @@
       </p:sp>
       <p:sp>
         <p:nvSpPr>
-          <p:cNvPr id="170" name="Line 9"/>
+          <p:cNvPr id="173" name="Line 9"/>
           <p:cNvSpPr/>
           <p:nvPr/>
         </p:nvSpPr>
@@ -7923,14 +8261,14 @@
       </p:sp>
       <p:sp>
         <p:nvSpPr>
-          <p:cNvPr id="171" name="CustomShape 10"/>
+          <p:cNvPr id="174" name="CustomShape 10"/>
           <p:cNvSpPr/>
           <p:nvPr/>
         </p:nvSpPr>
         <p:spPr>
           <a:xfrm>
             <a:off x="2090520" y="2924280"/>
-            <a:ext cx="973800" cy="211680"/>
+            <a:ext cx="973440" cy="211320"/>
           </a:xfrm>
           <a:prstGeom prst="rect">
             <a:avLst/>
@@ -7974,14 +8312,14 @@
       </p:sp>
       <p:sp>
         <p:nvSpPr>
-          <p:cNvPr id="172" name="CustomShape 11"/>
+          <p:cNvPr id="175" name="CustomShape 11"/>
           <p:cNvSpPr/>
           <p:nvPr/>
         </p:nvSpPr>
         <p:spPr>
           <a:xfrm>
             <a:off x="3184200" y="177480"/>
-            <a:ext cx="842400" cy="581760"/>
+            <a:ext cx="842040" cy="581400"/>
           </a:xfrm>
           <a:prstGeom prst="rect">
             <a:avLst/>
@@ -8048,14 +8386,14 @@
       </p:sp>
       <p:sp>
         <p:nvSpPr>
-          <p:cNvPr id="173" name="CustomShape 12"/>
+          <p:cNvPr id="176" name="CustomShape 12"/>
           <p:cNvSpPr/>
           <p:nvPr/>
         </p:nvSpPr>
         <p:spPr>
           <a:xfrm>
             <a:off x="2892600" y="1319400"/>
-            <a:ext cx="874080" cy="764640"/>
+            <a:ext cx="873720" cy="764280"/>
           </a:xfrm>
           <a:prstGeom prst="ellipse">
             <a:avLst/>
@@ -8104,14 +8442,14 @@
       </p:sp>
       <p:sp>
         <p:nvSpPr>
-          <p:cNvPr id="174" name="CustomShape 13"/>
+          <p:cNvPr id="177" name="CustomShape 13"/>
           <p:cNvSpPr/>
           <p:nvPr/>
         </p:nvSpPr>
         <p:spPr>
           <a:xfrm flipV="1">
-            <a:off x="3330000" y="759240"/>
-            <a:ext cx="275040" cy="558720"/>
+            <a:off x="3330000" y="758520"/>
+            <a:ext cx="274680" cy="558360"/>
           </a:xfrm>
           <a:custGeom>
             <a:avLst/>
@@ -8152,7 +8490,7 @@
       </p:sp>
       <p:sp>
         <p:nvSpPr>
-          <p:cNvPr id="175" name="Line 14"/>
+          <p:cNvPr id="178" name="Line 14"/>
           <p:cNvSpPr/>
           <p:nvPr/>
         </p:nvSpPr>
@@ -8185,7 +8523,7 @@
       </p:sp>
       <p:sp>
         <p:nvSpPr>
-          <p:cNvPr id="176" name="Line 15"/>
+          <p:cNvPr id="179" name="Line 15"/>
           <p:cNvSpPr/>
           <p:nvPr/>
         </p:nvSpPr>
@@ -8218,14 +8556,14 @@
       </p:sp>
       <p:sp>
         <p:nvSpPr>
-          <p:cNvPr id="177" name="CustomShape 16"/>
+          <p:cNvPr id="180" name="CustomShape 16"/>
           <p:cNvSpPr/>
           <p:nvPr/>
         </p:nvSpPr>
         <p:spPr>
           <a:xfrm>
             <a:off x="4329360" y="2892960"/>
-            <a:ext cx="789120" cy="333360"/>
+            <a:ext cx="788760" cy="333000"/>
           </a:xfrm>
           <a:prstGeom prst="rect">
             <a:avLst/>
@@ -8269,14 +8607,14 @@
       </p:sp>
       <p:sp>
         <p:nvSpPr>
-          <p:cNvPr id="178" name="CustomShape 17"/>
+          <p:cNvPr id="181" name="CustomShape 17"/>
           <p:cNvSpPr/>
           <p:nvPr/>
         </p:nvSpPr>
         <p:spPr>
           <a:xfrm>
             <a:off x="4267080" y="4548960"/>
-            <a:ext cx="1078560" cy="685800"/>
+            <a:ext cx="1078200" cy="685440"/>
           </a:xfrm>
           <a:prstGeom prst="ellipse">
             <a:avLst/>
@@ -8325,14 +8663,14 @@
       </p:sp>
       <p:sp>
         <p:nvSpPr>
-          <p:cNvPr id="179" name="CustomShape 18"/>
+          <p:cNvPr id="182" name="CustomShape 18"/>
           <p:cNvSpPr/>
           <p:nvPr/>
         </p:nvSpPr>
         <p:spPr>
           <a:xfrm flipH="1" flipV="1">
-            <a:off x="4141800" y="3319560"/>
-            <a:ext cx="439920" cy="1270800"/>
+            <a:off x="4140720" y="3318840"/>
+            <a:ext cx="439560" cy="1270440"/>
           </a:xfrm>
           <a:custGeom>
             <a:avLst/>
@@ -8374,14 +8712,14 @@
       </p:sp>
       <p:sp>
         <p:nvSpPr>
-          <p:cNvPr id="180" name="CustomShape 19"/>
+          <p:cNvPr id="183" name="CustomShape 19"/>
           <p:cNvSpPr/>
           <p:nvPr/>
         </p:nvSpPr>
         <p:spPr>
           <a:xfrm>
             <a:off x="2676240" y="736920"/>
-            <a:ext cx="842400" cy="455040"/>
+            <a:ext cx="842040" cy="454680"/>
           </a:xfrm>
           <a:prstGeom prst="rect">
             <a:avLst/>
@@ -8425,14 +8763,14 @@
       </p:sp>
       <p:sp>
         <p:nvSpPr>
-          <p:cNvPr id="181" name="CustomShape 20"/>
+          <p:cNvPr id="184" name="CustomShape 20"/>
           <p:cNvSpPr/>
           <p:nvPr/>
         </p:nvSpPr>
         <p:spPr>
           <a:xfrm flipH="1">
-            <a:off x="1385640" y="1702080"/>
-            <a:ext cx="1505520" cy="1099080"/>
+            <a:off x="1384920" y="1702080"/>
+            <a:ext cx="1505160" cy="1098720"/>
           </a:xfrm>
           <a:custGeom>
             <a:avLst/>
@@ -8474,7 +8812,7 @@
       </p:sp>
       <p:sp>
         <p:nvSpPr>
-          <p:cNvPr id="182" name="Line 21"/>
+          <p:cNvPr id="185" name="Line 21"/>
           <p:cNvSpPr/>
           <p:nvPr/>
         </p:nvSpPr>
@@ -8507,14 +8845,14 @@
       </p:sp>
       <p:sp>
         <p:nvSpPr>
-          <p:cNvPr id="183" name="CustomShape 22"/>
+          <p:cNvPr id="186" name="CustomShape 22"/>
           <p:cNvSpPr/>
           <p:nvPr/>
         </p:nvSpPr>
         <p:spPr>
           <a:xfrm>
             <a:off x="3161520" y="2861280"/>
-            <a:ext cx="1203840" cy="333360"/>
+            <a:ext cx="1203480" cy="333000"/>
           </a:xfrm>
           <a:prstGeom prst="rect">
             <a:avLst/>
@@ -8558,14 +8896,14 @@
       </p:sp>
       <p:sp>
         <p:nvSpPr>
-          <p:cNvPr id="184" name="CustomShape 23"/>
+          <p:cNvPr id="187" name="CustomShape 23"/>
           <p:cNvSpPr/>
           <p:nvPr/>
         </p:nvSpPr>
         <p:spPr>
           <a:xfrm>
             <a:off x="3119760" y="3897720"/>
-            <a:ext cx="1078560" cy="685800"/>
+            <a:ext cx="1078200" cy="685440"/>
           </a:xfrm>
           <a:prstGeom prst="ellipse">
             <a:avLst/>
@@ -8614,14 +8952,14 @@
       </p:sp>
       <p:sp>
         <p:nvSpPr>
-          <p:cNvPr id="185" name="CustomShape 24"/>
+          <p:cNvPr id="188" name="CustomShape 24"/>
           <p:cNvSpPr/>
           <p:nvPr/>
         </p:nvSpPr>
         <p:spPr>
           <a:xfrm flipV="1">
             <a:off x="3659400" y="3304080"/>
-            <a:ext cx="107280" cy="592200"/>
+            <a:ext cx="106920" cy="591840"/>
           </a:xfrm>
           <a:custGeom>
             <a:avLst/>
@@ -8663,14 +9001,14 @@
       </p:sp>
       <p:sp>
         <p:nvSpPr>
-          <p:cNvPr id="186" name="CustomShape 25"/>
+          <p:cNvPr id="189" name="CustomShape 25"/>
           <p:cNvSpPr/>
           <p:nvPr/>
         </p:nvSpPr>
         <p:spPr>
           <a:xfrm flipH="1" flipV="1">
-            <a:off x="3329280" y="2084040"/>
-            <a:ext cx="391680" cy="716400"/>
+            <a:off x="3328560" y="2083320"/>
+            <a:ext cx="391320" cy="716040"/>
           </a:xfrm>
           <a:custGeom>
             <a:avLst/>
@@ -8712,14 +9050,14 @@
       </p:sp>
       <p:sp>
         <p:nvSpPr>
-          <p:cNvPr id="187" name="CustomShape 26"/>
+          <p:cNvPr id="190" name="CustomShape 26"/>
           <p:cNvSpPr/>
           <p:nvPr/>
         </p:nvSpPr>
         <p:spPr>
           <a:xfrm flipH="1" flipV="1">
-            <a:off x="2576160" y="3287880"/>
-            <a:ext cx="699480" cy="709200"/>
+            <a:off x="2575800" y="3287160"/>
+            <a:ext cx="699120" cy="708840"/>
           </a:xfrm>
           <a:custGeom>
             <a:avLst/>
@@ -8761,14 +9099,14 @@
       </p:sp>
       <p:sp>
         <p:nvSpPr>
-          <p:cNvPr id="188" name="CustomShape 27"/>
+          <p:cNvPr id="191" name="CustomShape 27"/>
           <p:cNvSpPr/>
           <p:nvPr/>
         </p:nvSpPr>
         <p:spPr>
           <a:xfrm flipV="1">
             <a:off x="3904920" y="3319200"/>
-            <a:ext cx="541440" cy="543240"/>
+            <a:ext cx="541080" cy="542880"/>
           </a:xfrm>
           <a:custGeom>
             <a:avLst/>
@@ -8810,7 +9148,7 @@
       </p:sp>
       <p:sp>
         <p:nvSpPr>
-          <p:cNvPr id="189" name="Line 28"/>
+          <p:cNvPr id="192" name="Line 28"/>
           <p:cNvSpPr/>
           <p:nvPr/>
         </p:nvSpPr>
@@ -8843,7 +9181,7 @@
       </p:sp>
       <p:sp>
         <p:nvSpPr>
-          <p:cNvPr id="190" name="Line 29"/>
+          <p:cNvPr id="193" name="Line 29"/>
           <p:cNvSpPr/>
           <p:nvPr/>
         </p:nvSpPr>
@@ -8876,14 +9214,14 @@
       </p:sp>
       <p:sp>
         <p:nvSpPr>
-          <p:cNvPr id="191" name="CustomShape 30"/>
+          <p:cNvPr id="194" name="CustomShape 30"/>
           <p:cNvSpPr/>
           <p:nvPr/>
         </p:nvSpPr>
         <p:spPr>
           <a:xfrm>
             <a:off x="5222520" y="2901240"/>
-            <a:ext cx="719280" cy="333360"/>
+            <a:ext cx="718920" cy="333000"/>
           </a:xfrm>
           <a:prstGeom prst="rect">
             <a:avLst/>
@@ -8927,14 +9265,14 @@
       </p:sp>
       <p:sp>
         <p:nvSpPr>
-          <p:cNvPr id="192" name="CustomShape 31"/>
+          <p:cNvPr id="195" name="CustomShape 31"/>
           <p:cNvSpPr/>
           <p:nvPr/>
         </p:nvSpPr>
         <p:spPr>
           <a:xfrm>
             <a:off x="4726800" y="3331080"/>
-            <a:ext cx="79200" cy="1217160"/>
+            <a:ext cx="78840" cy="1216800"/>
           </a:xfrm>
           <a:custGeom>
             <a:avLst/>
@@ -8975,14 +9313,14 @@
       </p:sp>
       <p:sp>
         <p:nvSpPr>
-          <p:cNvPr id="193" name="CustomShape 32"/>
+          <p:cNvPr id="196" name="CustomShape 32"/>
           <p:cNvSpPr/>
           <p:nvPr/>
         </p:nvSpPr>
         <p:spPr>
           <a:xfrm>
             <a:off x="5470560" y="4287600"/>
-            <a:ext cx="1078560" cy="685800"/>
+            <a:ext cx="1078200" cy="685440"/>
           </a:xfrm>
           <a:prstGeom prst="ellipse">
             <a:avLst/>
@@ -9031,14 +9369,14 @@
       </p:sp>
       <p:sp>
         <p:nvSpPr>
-          <p:cNvPr id="194" name="CustomShape 33"/>
+          <p:cNvPr id="197" name="CustomShape 33"/>
           <p:cNvSpPr/>
           <p:nvPr/>
         </p:nvSpPr>
         <p:spPr>
           <a:xfrm>
             <a:off x="4930920" y="3388320"/>
-            <a:ext cx="696960" cy="999000"/>
+            <a:ext cx="696600" cy="998640"/>
           </a:xfrm>
           <a:custGeom>
             <a:avLst/>
@@ -9080,7 +9418,7 @@
       </p:sp>
       <p:sp>
         <p:nvSpPr>
-          <p:cNvPr id="195" name="Line 34"/>
+          <p:cNvPr id="198" name="Line 34"/>
           <p:cNvSpPr/>
           <p:nvPr/>
         </p:nvSpPr>
@@ -9113,7 +9451,7 @@
       </p:sp>
       <p:sp>
         <p:nvSpPr>
-          <p:cNvPr id="196" name="Line 35"/>
+          <p:cNvPr id="199" name="Line 35"/>
           <p:cNvSpPr/>
           <p:nvPr/>
         </p:nvSpPr>
@@ -9146,14 +9484,14 @@
       </p:sp>
       <p:sp>
         <p:nvSpPr>
-          <p:cNvPr id="197" name="CustomShape 36"/>
+          <p:cNvPr id="200" name="CustomShape 36"/>
           <p:cNvSpPr/>
           <p:nvPr/>
         </p:nvSpPr>
         <p:spPr>
           <a:xfrm>
             <a:off x="6766920" y="4044960"/>
-            <a:ext cx="891360" cy="685800"/>
+            <a:ext cx="891000" cy="685440"/>
           </a:xfrm>
           <a:prstGeom prst="ellipse">
             <a:avLst/>
@@ -9202,14 +9540,14 @@
       </p:sp>
       <p:sp>
         <p:nvSpPr>
-          <p:cNvPr id="198" name="CustomShape 37"/>
+          <p:cNvPr id="201" name="CustomShape 37"/>
           <p:cNvSpPr/>
           <p:nvPr/>
         </p:nvSpPr>
         <p:spPr>
           <a:xfrm>
             <a:off x="7795440" y="4255560"/>
-            <a:ext cx="891360" cy="685800"/>
+            <a:ext cx="891000" cy="685440"/>
           </a:xfrm>
           <a:prstGeom prst="ellipse">
             <a:avLst/>
@@ -9258,14 +9596,14 @@
       </p:sp>
       <p:sp>
         <p:nvSpPr>
-          <p:cNvPr id="199" name="CustomShape 38"/>
+          <p:cNvPr id="202" name="CustomShape 38"/>
           <p:cNvSpPr/>
           <p:nvPr/>
         </p:nvSpPr>
         <p:spPr>
           <a:xfrm>
             <a:off x="5731560" y="3331080"/>
-            <a:ext cx="277560" cy="955800"/>
+            <a:ext cx="277200" cy="955440"/>
           </a:xfrm>
           <a:custGeom>
             <a:avLst/>
@@ -9307,7 +9645,7 @@
       </p:sp>
       <p:sp>
         <p:nvSpPr>
-          <p:cNvPr id="200" name="Line 39"/>
+          <p:cNvPr id="203" name="Line 39"/>
           <p:cNvSpPr/>
           <p:nvPr/>
         </p:nvSpPr>
@@ -9340,7 +9678,7 @@
       </p:sp>
       <p:sp>
         <p:nvSpPr>
-          <p:cNvPr id="201" name="Line 40"/>
+          <p:cNvPr id="204" name="Line 40"/>
           <p:cNvSpPr/>
           <p:nvPr/>
         </p:nvSpPr>
@@ -9373,14 +9711,14 @@
       </p:sp>
       <p:sp>
         <p:nvSpPr>
-          <p:cNvPr id="202" name="CustomShape 41"/>
+          <p:cNvPr id="205" name="CustomShape 41"/>
           <p:cNvSpPr/>
           <p:nvPr/>
         </p:nvSpPr>
         <p:spPr>
           <a:xfrm>
             <a:off x="5942160" y="2930760"/>
-            <a:ext cx="1030320" cy="333360"/>
+            <a:ext cx="1029960" cy="333000"/>
           </a:xfrm>
           <a:prstGeom prst="rect">
             <a:avLst/>
@@ -9424,7 +9762,7 @@
       </p:sp>
       <p:sp>
         <p:nvSpPr>
-          <p:cNvPr id="203" name="Line 42"/>
+          <p:cNvPr id="206" name="Line 42"/>
           <p:cNvSpPr/>
           <p:nvPr/>
         </p:nvSpPr>
@@ -9457,7 +9795,7 @@
       </p:sp>
       <p:sp>
         <p:nvSpPr>
-          <p:cNvPr id="204" name="Line 43"/>
+          <p:cNvPr id="207" name="Line 43"/>
           <p:cNvSpPr/>
           <p:nvPr/>
         </p:nvSpPr>
@@ -9490,14 +9828,14 @@
       </p:sp>
       <p:sp>
         <p:nvSpPr>
-          <p:cNvPr id="205" name="CustomShape 44"/>
+          <p:cNvPr id="208" name="CustomShape 44"/>
           <p:cNvSpPr/>
           <p:nvPr/>
         </p:nvSpPr>
         <p:spPr>
           <a:xfrm>
             <a:off x="7027920" y="2944800"/>
-            <a:ext cx="1030320" cy="333360"/>
+            <a:ext cx="1029960" cy="333000"/>
           </a:xfrm>
           <a:prstGeom prst="rect">
             <a:avLst/>
@@ -9541,14 +9879,14 @@
       </p:sp>
       <p:sp>
         <p:nvSpPr>
-          <p:cNvPr id="206" name="CustomShape 45"/>
+          <p:cNvPr id="209" name="CustomShape 45"/>
           <p:cNvSpPr/>
           <p:nvPr/>
         </p:nvSpPr>
         <p:spPr>
           <a:xfrm flipH="1">
             <a:off x="4848840" y="1698840"/>
-            <a:ext cx="1377000" cy="1094040"/>
+            <a:ext cx="1376640" cy="1093680"/>
           </a:xfrm>
           <a:custGeom>
             <a:avLst/>
@@ -9590,14 +9928,14 @@
       </p:sp>
       <p:sp>
         <p:nvSpPr>
-          <p:cNvPr id="207" name="CustomShape 46"/>
+          <p:cNvPr id="210" name="CustomShape 46"/>
           <p:cNvSpPr/>
           <p:nvPr/>
         </p:nvSpPr>
         <p:spPr>
           <a:xfrm>
             <a:off x="6607440" y="1779480"/>
-            <a:ext cx="360" cy="1049760"/>
+            <a:ext cx="360" cy="1049400"/>
           </a:xfrm>
           <a:custGeom>
             <a:avLst/>
@@ -9639,14 +9977,14 @@
       </p:sp>
       <p:sp>
         <p:nvSpPr>
-          <p:cNvPr id="208" name="CustomShape 47"/>
+          <p:cNvPr id="211" name="CustomShape 47"/>
           <p:cNvSpPr/>
           <p:nvPr/>
         </p:nvSpPr>
         <p:spPr>
           <a:xfrm>
             <a:off x="6998040" y="1677960"/>
-            <a:ext cx="483480" cy="1067760"/>
+            <a:ext cx="483120" cy="1067400"/>
           </a:xfrm>
           <a:custGeom>
             <a:avLst/>
@@ -9688,14 +10026,14 @@
       </p:sp>
       <p:sp>
         <p:nvSpPr>
-          <p:cNvPr id="209" name="CustomShape 48"/>
+          <p:cNvPr id="212" name="CustomShape 48"/>
           <p:cNvSpPr/>
           <p:nvPr/>
         </p:nvSpPr>
         <p:spPr>
           <a:xfrm>
             <a:off x="5871240" y="704520"/>
-            <a:ext cx="1385640" cy="979920"/>
+            <a:ext cx="1385280" cy="979560"/>
           </a:xfrm>
           <a:prstGeom prst="ellipse">
             <a:avLst/>
@@ -9744,7 +10082,7 @@
       </p:sp>
       <p:sp>
         <p:nvSpPr>
-          <p:cNvPr id="210" name="Line 49"/>
+          <p:cNvPr id="213" name="Line 49"/>
           <p:cNvSpPr/>
           <p:nvPr/>
         </p:nvSpPr>
@@ -9777,7 +10115,7 @@
       </p:sp>
       <p:sp>
         <p:nvSpPr>
-          <p:cNvPr id="211" name="Line 50"/>
+          <p:cNvPr id="214" name="Line 50"/>
           <p:cNvSpPr/>
           <p:nvPr/>
         </p:nvSpPr>
@@ -9810,14 +10148,14 @@
       </p:sp>
       <p:sp>
         <p:nvSpPr>
-          <p:cNvPr id="212" name="CustomShape 51"/>
+          <p:cNvPr id="215" name="CustomShape 51"/>
           <p:cNvSpPr/>
           <p:nvPr/>
         </p:nvSpPr>
         <p:spPr>
           <a:xfrm>
             <a:off x="8078760" y="2955600"/>
-            <a:ext cx="797040" cy="333360"/>
+            <a:ext cx="796680" cy="333000"/>
           </a:xfrm>
           <a:prstGeom prst="rect">
             <a:avLst/>
@@ -9861,14 +10199,14 @@
       </p:sp>
       <p:sp>
         <p:nvSpPr>
-          <p:cNvPr id="213" name="CustomShape 52"/>
+          <p:cNvPr id="216" name="CustomShape 52"/>
           <p:cNvSpPr/>
           <p:nvPr/>
         </p:nvSpPr>
         <p:spPr>
           <a:xfrm>
             <a:off x="5868000" y="3349080"/>
-            <a:ext cx="898200" cy="876240"/>
+            <a:ext cx="897840" cy="875880"/>
           </a:xfrm>
           <a:custGeom>
             <a:avLst/>
@@ -9910,14 +10248,14 @@
       </p:sp>
       <p:sp>
         <p:nvSpPr>
-          <p:cNvPr id="214" name="CustomShape 53"/>
+          <p:cNvPr id="217" name="CustomShape 53"/>
           <p:cNvSpPr/>
           <p:nvPr/>
         </p:nvSpPr>
         <p:spPr>
           <a:xfrm>
             <a:off x="6607440" y="3335760"/>
-            <a:ext cx="441000" cy="650160"/>
+            <a:ext cx="440640" cy="649800"/>
           </a:xfrm>
           <a:custGeom>
             <a:avLst/>
@@ -9959,14 +10297,14 @@
       </p:sp>
       <p:sp>
         <p:nvSpPr>
-          <p:cNvPr id="215" name="CustomShape 54"/>
+          <p:cNvPr id="218" name="CustomShape 54"/>
           <p:cNvSpPr/>
           <p:nvPr/>
         </p:nvSpPr>
         <p:spPr>
           <a:xfrm>
             <a:off x="7538040" y="3388320"/>
-            <a:ext cx="469800" cy="836640"/>
+            <a:ext cx="469440" cy="836280"/>
           </a:xfrm>
           <a:custGeom>
             <a:avLst/>
@@ -10008,14 +10346,14 @@
       </p:sp>
       <p:sp>
         <p:nvSpPr>
-          <p:cNvPr id="216" name="CustomShape 55"/>
+          <p:cNvPr id="219" name="CustomShape 55"/>
           <p:cNvSpPr/>
           <p:nvPr/>
         </p:nvSpPr>
         <p:spPr>
           <a:xfrm flipH="1">
             <a:off x="8317440" y="3388320"/>
-            <a:ext cx="111240" cy="836640"/>
+            <a:ext cx="110880" cy="836280"/>
           </a:xfrm>
           <a:custGeom>
             <a:avLst/>
@@ -10057,7 +10395,7 @@
       </p:sp>
       <p:sp>
         <p:nvSpPr>
-          <p:cNvPr id="217" name="Line 56"/>
+          <p:cNvPr id="220" name="Line 56"/>
           <p:cNvSpPr/>
           <p:nvPr/>
         </p:nvSpPr>
@@ -10090,7 +10428,7 @@
       </p:sp>
       <p:sp>
         <p:nvSpPr>
-          <p:cNvPr id="218" name="Line 57"/>
+          <p:cNvPr id="221" name="Line 57"/>
           <p:cNvSpPr/>
           <p:nvPr/>
         </p:nvSpPr>
@@ -10123,14 +10461,14 @@
       </p:sp>
       <p:sp>
         <p:nvSpPr>
-          <p:cNvPr id="219" name="CustomShape 58"/>
+          <p:cNvPr id="222" name="CustomShape 58"/>
           <p:cNvSpPr/>
           <p:nvPr/>
         </p:nvSpPr>
         <p:spPr>
           <a:xfrm>
             <a:off x="8957520" y="2930760"/>
-            <a:ext cx="797040" cy="333360"/>
+            <a:ext cx="796680" cy="333000"/>
           </a:xfrm>
           <a:prstGeom prst="rect">
             <a:avLst/>
@@ -10174,14 +10512,14 @@
       </p:sp>
       <p:sp>
         <p:nvSpPr>
-          <p:cNvPr id="220" name="CustomShape 59"/>
+          <p:cNvPr id="223" name="CustomShape 59"/>
           <p:cNvSpPr/>
           <p:nvPr/>
         </p:nvSpPr>
         <p:spPr>
           <a:xfrm>
             <a:off x="8199720" y="1062000"/>
-            <a:ext cx="1128600" cy="979920"/>
+            <a:ext cx="1128240" cy="979560"/>
           </a:xfrm>
           <a:prstGeom prst="ellipse">
             <a:avLst/>
@@ -10230,14 +10568,14 @@
       </p:sp>
       <p:sp>
         <p:nvSpPr>
-          <p:cNvPr id="221" name="CustomShape 60"/>
+          <p:cNvPr id="224" name="CustomShape 60"/>
           <p:cNvSpPr/>
           <p:nvPr/>
         </p:nvSpPr>
         <p:spPr>
           <a:xfrm flipV="1">
-            <a:off x="7733880" y="1897560"/>
-            <a:ext cx="630360" cy="815040"/>
+            <a:off x="7733880" y="1896480"/>
+            <a:ext cx="630000" cy="814680"/>
           </a:xfrm>
           <a:custGeom>
             <a:avLst/>
@@ -10279,14 +10617,14 @@
       </p:sp>
       <p:sp>
         <p:nvSpPr>
-          <p:cNvPr id="222" name="CustomShape 61"/>
+          <p:cNvPr id="225" name="CustomShape 61"/>
           <p:cNvSpPr/>
           <p:nvPr/>
         </p:nvSpPr>
         <p:spPr>
           <a:xfrm flipV="1">
-            <a:off x="8609040" y="2041920"/>
-            <a:ext cx="154800" cy="786240"/>
+            <a:off x="8609040" y="2041200"/>
+            <a:ext cx="154440" cy="785880"/>
           </a:xfrm>
           <a:custGeom>
             <a:avLst/>
@@ -10328,14 +10666,14 @@
       </p:sp>
       <p:sp>
         <p:nvSpPr>
-          <p:cNvPr id="223" name="CustomShape 62"/>
+          <p:cNvPr id="226" name="CustomShape 62"/>
           <p:cNvSpPr/>
           <p:nvPr/>
         </p:nvSpPr>
         <p:spPr>
           <a:xfrm flipH="1" flipV="1">
             <a:off x="9163080" y="1898280"/>
-            <a:ext cx="191880" cy="950760"/>
+            <a:ext cx="191520" cy="950400"/>
           </a:xfrm>
           <a:custGeom>
             <a:avLst/>
@@ -10377,14 +10715,14 @@
       </p:sp>
       <p:sp>
         <p:nvSpPr>
-          <p:cNvPr id="224" name="CustomShape 63"/>
+          <p:cNvPr id="227" name="CustomShape 63"/>
           <p:cNvSpPr/>
           <p:nvPr/>
         </p:nvSpPr>
         <p:spPr>
           <a:xfrm>
             <a:off x="5852520" y="89280"/>
-            <a:ext cx="3371040" cy="364320"/>
+            <a:ext cx="3371040" cy="363960"/>
           </a:xfrm>
           <a:prstGeom prst="rect">
             <a:avLst/>

</xml_diff>

<commit_message>
Altera~coes nos artefatos e artefato 18 concluido
</commit_message>
<xml_diff>
--- a/Artefatos/16-DFD Essencial para cada capacidade.pptx
+++ b/Artefatos/16-DFD Essencial para cada capacidade.pptx
@@ -70,7 +70,7 @@
         <p:spPr>
           <a:xfrm>
             <a:off x="692640" y="375480"/>
-            <a:ext cx="8690760" cy="946800"/>
+            <a:ext cx="8690400" cy="946800"/>
           </a:xfrm>
           <a:prstGeom prst="rect">
             <a:avLst/>
@@ -183,7 +183,7 @@
         <p:spPr>
           <a:xfrm>
             <a:off x="692640" y="375480"/>
-            <a:ext cx="8690760" cy="946800"/>
+            <a:ext cx="8690400" cy="946800"/>
           </a:xfrm>
           <a:prstGeom prst="rect">
             <a:avLst/>
@@ -356,7 +356,7 @@
         <p:spPr>
           <a:xfrm>
             <a:off x="692640" y="375480"/>
-            <a:ext cx="8690760" cy="946800"/>
+            <a:ext cx="8690400" cy="946800"/>
           </a:xfrm>
           <a:prstGeom prst="rect">
             <a:avLst/>
@@ -589,7 +589,7 @@
         <p:spPr>
           <a:xfrm>
             <a:off x="692640" y="375480"/>
-            <a:ext cx="8690760" cy="946800"/>
+            <a:ext cx="8690400" cy="946800"/>
           </a:xfrm>
           <a:prstGeom prst="rect">
             <a:avLst/>
@@ -673,7 +673,7 @@
         <p:spPr>
           <a:xfrm>
             <a:off x="692640" y="375480"/>
-            <a:ext cx="8690760" cy="946800"/>
+            <a:ext cx="8690400" cy="946800"/>
           </a:xfrm>
           <a:prstGeom prst="rect">
             <a:avLst/>
@@ -756,7 +756,7 @@
         <p:spPr>
           <a:xfrm>
             <a:off x="692640" y="375480"/>
-            <a:ext cx="8690760" cy="946800"/>
+            <a:ext cx="8690400" cy="946800"/>
           </a:xfrm>
           <a:prstGeom prst="rect">
             <a:avLst/>
@@ -869,7 +869,7 @@
         <p:spPr>
           <a:xfrm>
             <a:off x="692640" y="375480"/>
-            <a:ext cx="8690760" cy="946800"/>
+            <a:ext cx="8690400" cy="946800"/>
           </a:xfrm>
           <a:prstGeom prst="rect">
             <a:avLst/>
@@ -922,7 +922,7 @@
         <p:spPr>
           <a:xfrm>
             <a:off x="692640" y="375480"/>
-            <a:ext cx="8690760" cy="4390200"/>
+            <a:ext cx="8690400" cy="4390200"/>
           </a:xfrm>
           <a:prstGeom prst="rect">
             <a:avLst/>
@@ -975,7 +975,7 @@
         <p:spPr>
           <a:xfrm>
             <a:off x="692640" y="375480"/>
-            <a:ext cx="8690760" cy="946800"/>
+            <a:ext cx="8690400" cy="946800"/>
           </a:xfrm>
           <a:prstGeom prst="rect">
             <a:avLst/>
@@ -1118,7 +1118,7 @@
         <p:spPr>
           <a:xfrm>
             <a:off x="692640" y="375480"/>
-            <a:ext cx="8690760" cy="946800"/>
+            <a:ext cx="8690400" cy="946800"/>
           </a:xfrm>
           <a:prstGeom prst="rect">
             <a:avLst/>
@@ -1261,7 +1261,7 @@
         <p:spPr>
           <a:xfrm>
             <a:off x="692640" y="375480"/>
-            <a:ext cx="8690760" cy="946800"/>
+            <a:ext cx="8690400" cy="946800"/>
           </a:xfrm>
           <a:prstGeom prst="rect">
             <a:avLst/>
@@ -1411,7 +1411,7 @@
         <p:spPr>
           <a:xfrm>
             <a:off x="692640" y="375480"/>
-            <a:ext cx="8690760" cy="946800"/>
+            <a:ext cx="8690400" cy="946800"/>
           </a:xfrm>
           <a:prstGeom prst="rect">
             <a:avLst/>
@@ -1455,7 +1455,7 @@
         </p:spPr>
         <p:txBody>
           <a:bodyPr lIns="0" rIns="0" tIns="0" bIns="0">
-            <a:normAutofit fontScale="94000"/>
+            <a:normAutofit/>
           </a:bodyPr>
           <a:p>
             <a:pPr marL="432000" indent="-324000">
@@ -1659,7 +1659,7 @@
         <p:spPr>
           <a:xfrm>
             <a:off x="471960" y="226440"/>
-            <a:ext cx="951840" cy="759960"/>
+            <a:ext cx="951480" cy="759600"/>
           </a:xfrm>
           <a:prstGeom prst="rect">
             <a:avLst/>
@@ -1733,7 +1733,7 @@
         <p:spPr>
           <a:xfrm>
             <a:off x="432000" y="1729440"/>
-            <a:ext cx="1254600" cy="1061280"/>
+            <a:ext cx="1254240" cy="1060920"/>
           </a:xfrm>
           <a:prstGeom prst="ellipse">
             <a:avLst/>
@@ -1778,10 +1778,7 @@
               </a:rPr>
               <a:t>Receber Solicitação de produção</a:t>
             </a:r>
-            <a:endParaRPr b="1" lang="pt-BR" sz="1050" spc="-1" strike="noStrike">
-              <a:solidFill>
-                <a:srgbClr val="000000"/>
-              </a:solidFill>
+            <a:endParaRPr b="0" lang="pt-BR" sz="1050" spc="-1" strike="noStrike">
               <a:latin typeface="Arial"/>
             </a:endParaRPr>
           </a:p>
@@ -1796,7 +1793,7 @@
         <p:spPr>
           <a:xfrm>
             <a:off x="948960" y="988200"/>
-            <a:ext cx="172800" cy="739440"/>
+            <a:ext cx="172440" cy="739080"/>
           </a:xfrm>
           <a:custGeom>
             <a:avLst/>
@@ -1844,7 +1841,7 @@
         <p:spPr>
           <a:xfrm>
             <a:off x="-67680" y="1195920"/>
-            <a:ext cx="1362600" cy="394200"/>
+            <a:ext cx="1362240" cy="394200"/>
           </a:xfrm>
           <a:prstGeom prst="rect">
             <a:avLst/>
@@ -1928,7 +1925,7 @@
         <p:spPr>
           <a:xfrm>
             <a:off x="1123200" y="2792520"/>
-            <a:ext cx="360" cy="661680"/>
+            <a:ext cx="360" cy="661320"/>
           </a:xfrm>
           <a:custGeom>
             <a:avLst/>
@@ -1976,7 +1973,7 @@
         <p:spPr>
           <a:xfrm>
             <a:off x="324360" y="3565080"/>
-            <a:ext cx="1672200" cy="454680"/>
+            <a:ext cx="1671840" cy="454680"/>
           </a:xfrm>
           <a:prstGeom prst="rect">
             <a:avLst/>
@@ -2047,7 +2044,7 @@
         <p:spPr>
           <a:xfrm>
             <a:off x="6912000" y="85680"/>
-            <a:ext cx="2806920" cy="638280"/>
+            <a:ext cx="2806560" cy="638280"/>
           </a:xfrm>
           <a:prstGeom prst="rect">
             <a:avLst/>
@@ -2131,7 +2128,7 @@
         <p:spPr>
           <a:xfrm>
             <a:off x="2448000" y="1656000"/>
-            <a:ext cx="1222920" cy="1078920"/>
+            <a:ext cx="1222560" cy="1078560"/>
           </a:xfrm>
           <a:prstGeom prst="ellipse">
             <a:avLst/>
@@ -2177,9 +2174,6 @@
               <a:t>Analisar Solicitação de produção</a:t>
             </a:r>
             <a:endParaRPr b="0" lang="pt-BR" sz="1050" spc="-1" strike="noStrike">
-              <a:solidFill>
-                <a:srgbClr val="000000"/>
-              </a:solidFill>
               <a:latin typeface="Arial"/>
             </a:endParaRPr>
           </a:p>
@@ -2194,7 +2188,7 @@
         <p:spPr>
           <a:xfrm flipH="1">
             <a:off x="1589040" y="2592000"/>
-            <a:ext cx="1144440" cy="846720"/>
+            <a:ext cx="1144080" cy="846360"/>
           </a:xfrm>
           <a:custGeom>
             <a:avLst/>
@@ -2243,7 +2237,7 @@
         <p:spPr>
           <a:xfrm>
             <a:off x="2088000" y="1056960"/>
-            <a:ext cx="841320" cy="454680"/>
+            <a:ext cx="840960" cy="454680"/>
           </a:xfrm>
           <a:prstGeom prst="rect">
             <a:avLst/>
@@ -2294,7 +2288,7 @@
         <p:spPr>
           <a:xfrm>
             <a:off x="2808000" y="360000"/>
-            <a:ext cx="841320" cy="790920"/>
+            <a:ext cx="840960" cy="790560"/>
           </a:xfrm>
           <a:prstGeom prst="rect">
             <a:avLst/>
@@ -2368,7 +2362,7 @@
         <p:spPr>
           <a:xfrm flipV="1">
             <a:off x="3108960" y="1150560"/>
-            <a:ext cx="129960" cy="502920"/>
+            <a:ext cx="129600" cy="502560"/>
           </a:xfrm>
           <a:custGeom>
             <a:avLst/>
@@ -2482,7 +2476,7 @@
         <p:spPr>
           <a:xfrm>
             <a:off x="2160000" y="3576960"/>
-            <a:ext cx="1672200" cy="272160"/>
+            <a:ext cx="1671840" cy="272160"/>
           </a:xfrm>
           <a:prstGeom prst="rect">
             <a:avLst/>
@@ -2532,8 +2526,8 @@
         </p:nvSpPr>
         <p:spPr>
           <a:xfrm flipH="1" flipV="1">
-            <a:off x="3021120" y="2734560"/>
-            <a:ext cx="360" cy="790920"/>
+            <a:off x="3020400" y="2734560"/>
+            <a:ext cx="360" cy="790560"/>
           </a:xfrm>
           <a:custGeom>
             <a:avLst/>
@@ -2648,7 +2642,7 @@
         <p:spPr>
           <a:xfrm>
             <a:off x="3833280" y="3600000"/>
-            <a:ext cx="1274760" cy="394200"/>
+            <a:ext cx="1274400" cy="394200"/>
           </a:xfrm>
           <a:prstGeom prst="rect">
             <a:avLst/>
@@ -2699,7 +2693,7 @@
         <p:spPr>
           <a:xfrm flipH="1" flipV="1">
             <a:off x="3526560" y="2518560"/>
-            <a:ext cx="934920" cy="934920"/>
+            <a:ext cx="934560" cy="934560"/>
           </a:xfrm>
           <a:custGeom>
             <a:avLst/>
@@ -2748,7 +2742,7 @@
         <p:spPr>
           <a:xfrm>
             <a:off x="5112000" y="1800000"/>
-            <a:ext cx="1128960" cy="1078920"/>
+            <a:ext cx="1128600" cy="1078560"/>
           </a:xfrm>
           <a:prstGeom prst="ellipse">
             <a:avLst/>
@@ -2794,9 +2788,6 @@
               <a:t>Emitir Ordem  de produção</a:t>
             </a:r>
             <a:endParaRPr b="0" lang="pt-BR" sz="1050" spc="-1" strike="noStrike">
-              <a:solidFill>
-                <a:srgbClr val="000000"/>
-              </a:solidFill>
               <a:latin typeface="Arial"/>
             </a:endParaRPr>
           </a:p>
@@ -2810,8 +2801,8 @@
         </p:nvSpPr>
         <p:spPr>
           <a:xfrm flipV="1">
-            <a:off x="4536000" y="2661120"/>
-            <a:ext cx="718920" cy="862920"/>
+            <a:off x="4536000" y="2660760"/>
+            <a:ext cx="718560" cy="862560"/>
           </a:xfrm>
           <a:custGeom>
             <a:avLst/>
@@ -2959,7 +2950,7 @@
         <p:spPr>
           <a:xfrm>
             <a:off x="5184000" y="3600000"/>
-            <a:ext cx="1274760" cy="394200"/>
+            <a:ext cx="1274400" cy="394200"/>
           </a:xfrm>
           <a:prstGeom prst="rect">
             <a:avLst/>
@@ -3009,8 +3000,8 @@
         </p:nvSpPr>
         <p:spPr>
           <a:xfrm flipH="1" flipV="1">
-            <a:off x="5758920" y="2878560"/>
-            <a:ext cx="92880" cy="574920"/>
+            <a:off x="5758200" y="2878560"/>
+            <a:ext cx="92520" cy="574560"/>
           </a:xfrm>
           <a:custGeom>
             <a:avLst/>
@@ -3059,7 +3050,7 @@
         <p:spPr>
           <a:xfrm>
             <a:off x="5277960" y="432000"/>
-            <a:ext cx="841320" cy="790920"/>
+            <a:ext cx="840960" cy="790560"/>
           </a:xfrm>
           <a:prstGeom prst="rect">
             <a:avLst/>
@@ -3133,7 +3124,7 @@
         <p:spPr>
           <a:xfrm flipV="1">
             <a:off x="5687640" y="1223280"/>
-            <a:ext cx="360" cy="574920"/>
+            <a:ext cx="360" cy="574560"/>
           </a:xfrm>
           <a:custGeom>
             <a:avLst/>
@@ -3181,7 +3172,7 @@
         <p:spPr>
           <a:xfrm>
             <a:off x="4824000" y="1322280"/>
-            <a:ext cx="841320" cy="333000"/>
+            <a:ext cx="840960" cy="333000"/>
           </a:xfrm>
           <a:prstGeom prst="rect">
             <a:avLst/>
@@ -3262,7 +3253,7 @@
         <p:spPr>
           <a:xfrm>
             <a:off x="6912000" y="85680"/>
-            <a:ext cx="2806920" cy="638280"/>
+            <a:ext cx="2806560" cy="638280"/>
           </a:xfrm>
           <a:prstGeom prst="rect">
             <a:avLst/>
@@ -3313,7 +3304,7 @@
         <p:spPr>
           <a:xfrm>
             <a:off x="471960" y="236520"/>
-            <a:ext cx="951840" cy="759960"/>
+            <a:ext cx="951480" cy="759600"/>
           </a:xfrm>
           <a:prstGeom prst="rect">
             <a:avLst/>
@@ -3387,7 +3378,7 @@
         <p:spPr>
           <a:xfrm>
             <a:off x="956520" y="997560"/>
-            <a:ext cx="172800" cy="739440"/>
+            <a:ext cx="172440" cy="739080"/>
           </a:xfrm>
           <a:custGeom>
             <a:avLst/>
@@ -3435,7 +3426,7 @@
         <p:spPr>
           <a:xfrm>
             <a:off x="76320" y="1109880"/>
-            <a:ext cx="786600" cy="394200"/>
+            <a:ext cx="786240" cy="394200"/>
           </a:xfrm>
           <a:prstGeom prst="rect">
             <a:avLst/>
@@ -3486,7 +3477,7 @@
         <p:spPr>
           <a:xfrm>
             <a:off x="576000" y="1745640"/>
-            <a:ext cx="1128960" cy="1061280"/>
+            <a:ext cx="1128600" cy="1060920"/>
           </a:xfrm>
           <a:prstGeom prst="ellipse">
             <a:avLst/>
@@ -3532,9 +3523,6 @@
               <a:t>Receber Ordem de produção</a:t>
             </a:r>
             <a:endParaRPr b="0" lang="pt-BR" sz="1050" spc="-1" strike="noStrike">
-              <a:solidFill>
-                <a:srgbClr val="000000"/>
-              </a:solidFill>
               <a:latin typeface="Arial"/>
             </a:endParaRPr>
           </a:p>
@@ -3582,7 +3570,7 @@
         <p:spPr>
           <a:xfrm>
             <a:off x="324360" y="3565080"/>
-            <a:ext cx="1672200" cy="272160"/>
+            <a:ext cx="1671840" cy="272160"/>
           </a:xfrm>
           <a:prstGeom prst="rect">
             <a:avLst/>
@@ -3666,7 +3654,7 @@
         <p:spPr>
           <a:xfrm>
             <a:off x="1123560" y="2880000"/>
-            <a:ext cx="360" cy="573840"/>
+            <a:ext cx="360" cy="573480"/>
           </a:xfrm>
           <a:custGeom>
             <a:avLst/>
@@ -3714,7 +3702,7 @@
         <p:spPr>
           <a:xfrm>
             <a:off x="2088000" y="1800000"/>
-            <a:ext cx="1128960" cy="1061280"/>
+            <a:ext cx="1128600" cy="1060920"/>
           </a:xfrm>
           <a:prstGeom prst="ellipse">
             <a:avLst/>
@@ -3760,9 +3748,6 @@
               <a:t>Separar componentes</a:t>
             </a:r>
             <a:endParaRPr b="0" lang="pt-BR" sz="1200" spc="-1" strike="noStrike">
-              <a:solidFill>
-                <a:srgbClr val="000000"/>
-              </a:solidFill>
               <a:latin typeface="Arial"/>
             </a:endParaRPr>
           </a:p>
@@ -3777,7 +3762,7 @@
         <p:spPr>
           <a:xfrm flipH="1">
             <a:off x="1589040" y="2808000"/>
-            <a:ext cx="712440" cy="630720"/>
+            <a:ext cx="712080" cy="630360"/>
           </a:xfrm>
           <a:custGeom>
             <a:avLst/>
@@ -3892,7 +3877,7 @@
         <p:spPr>
           <a:xfrm>
             <a:off x="1872000" y="3565080"/>
-            <a:ext cx="1672200" cy="271800"/>
+            <a:ext cx="1671840" cy="271440"/>
           </a:xfrm>
           <a:prstGeom prst="rect">
             <a:avLst/>
@@ -3918,7 +3903,7 @@
         <p:spPr>
           <a:xfrm>
             <a:off x="1926720" y="3565080"/>
-            <a:ext cx="1672200" cy="271800"/>
+            <a:ext cx="1671840" cy="271440"/>
           </a:xfrm>
           <a:prstGeom prst="rect">
             <a:avLst/>
@@ -3944,7 +3929,7 @@
         <p:spPr>
           <a:xfrm>
             <a:off x="2079720" y="3528360"/>
-            <a:ext cx="1231200" cy="454680"/>
+            <a:ext cx="1230840" cy="454680"/>
           </a:xfrm>
           <a:prstGeom prst="rect">
             <a:avLst/>
@@ -3995,7 +3980,7 @@
         <p:spPr>
           <a:xfrm flipH="1">
             <a:off x="2525040" y="2862360"/>
-            <a:ext cx="136440" cy="576360"/>
+            <a:ext cx="136080" cy="576000"/>
           </a:xfrm>
           <a:custGeom>
             <a:avLst/>
@@ -4044,7 +4029,7 @@
         <p:spPr>
           <a:xfrm>
             <a:off x="3693960" y="1872000"/>
-            <a:ext cx="1128960" cy="1061280"/>
+            <a:ext cx="1128600" cy="1060920"/>
           </a:xfrm>
           <a:prstGeom prst="ellipse">
             <a:avLst/>
@@ -4090,9 +4075,6 @@
               <a:t>Fixar componentes</a:t>
             </a:r>
             <a:endParaRPr b="0" lang="pt-BR" sz="1200" spc="-1" strike="noStrike">
-              <a:solidFill>
-                <a:srgbClr val="000000"/>
-              </a:solidFill>
               <a:latin typeface="Arial"/>
             </a:endParaRPr>
           </a:p>
@@ -4106,8 +4088,8 @@
         </p:nvSpPr>
         <p:spPr>
           <a:xfrm>
-            <a:off x="5205960" y="1944000"/>
-            <a:ext cx="1128960" cy="1061280"/>
+            <a:off x="5040000" y="1819080"/>
+            <a:ext cx="1128600" cy="1060920"/>
           </a:xfrm>
           <a:prstGeom prst="ellipse">
             <a:avLst/>
@@ -4153,9 +4135,6 @@
               <a:t>Soldar Componentes</a:t>
             </a:r>
             <a:endParaRPr b="0" lang="pt-BR" sz="1200" spc="-1" strike="noStrike">
-              <a:solidFill>
-                <a:srgbClr val="000000"/>
-              </a:solidFill>
               <a:latin typeface="Arial"/>
             </a:endParaRPr>
           </a:p>
@@ -4302,7 +4281,7 @@
         <p:spPr>
           <a:xfrm>
             <a:off x="5823720" y="3672360"/>
-            <a:ext cx="1231200" cy="454680"/>
+            <a:ext cx="1230840" cy="454680"/>
           </a:xfrm>
           <a:prstGeom prst="rect">
             <a:avLst/>
@@ -4352,8 +4331,8 @@
         </p:nvSpPr>
         <p:spPr>
           <a:xfrm>
-            <a:off x="7437960" y="1728000"/>
-            <a:ext cx="1416960" cy="1222920"/>
+            <a:off x="6359400" y="1512000"/>
+            <a:ext cx="1416600" cy="1222560"/>
           </a:xfrm>
           <a:prstGeom prst="ellipse">
             <a:avLst/>
@@ -4399,9 +4378,6 @@
               <a:t>Fazer Retrabalho</a:t>
             </a:r>
             <a:endParaRPr b="0" lang="pt-BR" sz="1200" spc="-1" strike="noStrike">
-              <a:solidFill>
-                <a:srgbClr val="000000"/>
-              </a:solidFill>
               <a:latin typeface="Arial"/>
             </a:endParaRPr>
           </a:p>
@@ -4416,7 +4392,7 @@
         <p:spPr>
           <a:xfrm flipH="1">
             <a:off x="6550560" y="2736000"/>
-            <a:ext cx="1006920" cy="790920"/>
+            <a:ext cx="289440" cy="790560"/>
           </a:xfrm>
           <a:custGeom>
             <a:avLst/>
@@ -4531,7 +4507,7 @@
         <p:spPr>
           <a:xfrm>
             <a:off x="7632000" y="3600000"/>
-            <a:ext cx="1294920" cy="454680"/>
+            <a:ext cx="1294560" cy="454680"/>
           </a:xfrm>
           <a:prstGeom prst="rect">
             <a:avLst/>
@@ -4581,8 +4557,8 @@
         </p:nvSpPr>
         <p:spPr>
           <a:xfrm>
-            <a:off x="8352000" y="2952000"/>
-            <a:ext cx="214920" cy="646920"/>
+            <a:off x="7560000" y="2664000"/>
+            <a:ext cx="1006560" cy="934560"/>
           </a:xfrm>
           <a:custGeom>
             <a:avLst/>
@@ -4664,7 +4640,7 @@
         <p:spPr>
           <a:xfrm>
             <a:off x="3796200" y="3567600"/>
-            <a:ext cx="1231200" cy="454680"/>
+            <a:ext cx="1230840" cy="454680"/>
           </a:xfrm>
           <a:prstGeom prst="rect">
             <a:avLst/>
@@ -4748,7 +4724,7 @@
         <p:spPr>
           <a:xfrm flipH="1">
             <a:off x="4246560" y="2934360"/>
-            <a:ext cx="136440" cy="576360"/>
+            <a:ext cx="136080" cy="576000"/>
           </a:xfrm>
           <a:custGeom>
             <a:avLst/>
@@ -4796,8 +4772,8 @@
         </p:nvSpPr>
         <p:spPr>
           <a:xfrm flipH="1">
-            <a:off x="4966560" y="2952000"/>
-            <a:ext cx="430920" cy="504360"/>
+            <a:off x="4966560" y="2808000"/>
+            <a:ext cx="361440" cy="720000"/>
           </a:xfrm>
           <a:custGeom>
             <a:avLst/>
@@ -4844,9 +4820,9 @@
           <p:nvPr/>
         </p:nvSpPr>
         <p:spPr>
-          <a:xfrm flipH="1">
-            <a:off x="5973480" y="3006360"/>
-            <a:ext cx="360" cy="594360"/>
+          <a:xfrm>
+            <a:off x="5759640" y="2880000"/>
+            <a:ext cx="213480" cy="720360"/>
           </a:xfrm>
           <a:custGeom>
             <a:avLst/>
@@ -4894,8 +4870,8 @@
         </p:nvSpPr>
         <p:spPr>
           <a:xfrm flipH="1">
-            <a:off x="3079440" y="2808000"/>
-            <a:ext cx="734400" cy="630720"/>
+            <a:off x="3078720" y="2808000"/>
+            <a:ext cx="734040" cy="630360"/>
           </a:xfrm>
           <a:custGeom>
             <a:avLst/>
@@ -4934,6 +4910,298 @@
           </a:effectRef>
           <a:fontRef idx="minor"/>
         </p:style>
+      </p:sp>
+      <p:sp>
+        <p:nvSpPr>
+          <p:cNvPr id="107" name="CustomShape 38"/>
+          <p:cNvSpPr/>
+          <p:nvPr/>
+        </p:nvSpPr>
+        <p:spPr>
+          <a:xfrm>
+            <a:off x="6358680" y="1512360"/>
+            <a:ext cx="1416600" cy="1222560"/>
+          </a:xfrm>
+          <a:prstGeom prst="ellipse">
+            <a:avLst/>
+          </a:prstGeom>
+          <a:ln>
+            <a:solidFill>
+              <a:srgbClr val="111111"/>
+            </a:solidFill>
+          </a:ln>
+        </p:spPr>
+        <p:style>
+          <a:lnRef idx="2">
+            <a:schemeClr val="accent6">
+              <a:shade val="50000"/>
+            </a:schemeClr>
+          </a:lnRef>
+          <a:fillRef idx="1">
+            <a:schemeClr val="accent6"/>
+          </a:fillRef>
+          <a:effectRef idx="0">
+            <a:schemeClr val="accent6"/>
+          </a:effectRef>
+          <a:fontRef idx="minor"/>
+        </p:style>
+        <p:txBody>
+          <a:bodyPr lIns="90000" rIns="90000" tIns="45000" bIns="45000" anchor="ctr">
+            <a:noAutofit/>
+          </a:bodyPr>
+          <a:p>
+            <a:pPr algn="ctr">
+              <a:lnSpc>
+                <a:spcPct val="100000"/>
+              </a:lnSpc>
+            </a:pPr>
+            <a:r>
+              <a:rPr b="0" lang="pt-BR" sz="1200" spc="-1" strike="noStrike">
+                <a:solidFill>
+                  <a:srgbClr val="000000"/>
+                </a:solidFill>
+                <a:latin typeface="Arial"/>
+                <a:ea typeface="DejaVu Sans"/>
+              </a:rPr>
+              <a:t>Fazer Retrabalho</a:t>
+            </a:r>
+            <a:endParaRPr b="0" lang="pt-BR" sz="1200" spc="-1" strike="noStrike">
+              <a:latin typeface="Arial"/>
+            </a:endParaRPr>
+          </a:p>
+        </p:txBody>
+      </p:sp>
+      <p:sp>
+        <p:nvSpPr>
+          <p:cNvPr id="108" name="CustomShape 39"/>
+          <p:cNvSpPr/>
+          <p:nvPr/>
+        </p:nvSpPr>
+        <p:spPr>
+          <a:xfrm>
+            <a:off x="471960" y="246600"/>
+            <a:ext cx="951480" cy="759600"/>
+          </a:xfrm>
+          <a:prstGeom prst="rect">
+            <a:avLst/>
+          </a:prstGeom>
+          <a:gradFill rotWithShape="0">
+            <a:gsLst>
+              <a:gs pos="0">
+                <a:srgbClr val="d0d0d0"/>
+              </a:gs>
+              <a:gs pos="100000">
+                <a:srgbClr val="ededed">
+                  <a:alpha val="0"/>
+                </a:srgbClr>
+              </a:gs>
+            </a:gsLst>
+            <a:lin ang="16200000"/>
+          </a:gradFill>
+          <a:ln/>
+          <a:effectLst>
+            <a:outerShdw blurRad="40000" dir="5400000" dist="20160" rotWithShape="0">
+              <a:srgbClr val="000000">
+                <a:alpha val="38000"/>
+              </a:srgbClr>
+            </a:outerShdw>
+          </a:effectLst>
+        </p:spPr>
+        <p:style>
+          <a:lnRef idx="1">
+            <a:schemeClr val="dk1"/>
+          </a:lnRef>
+          <a:fillRef idx="2">
+            <a:schemeClr val="dk1"/>
+          </a:fillRef>
+          <a:effectRef idx="1">
+            <a:schemeClr val="dk1"/>
+          </a:effectRef>
+          <a:fontRef idx="minor"/>
+        </p:style>
+        <p:txBody>
+          <a:bodyPr lIns="90000" rIns="90000" tIns="45000" bIns="45000" anchor="ctr">
+            <a:noAutofit/>
+          </a:bodyPr>
+          <a:p>
+            <a:pPr algn="ctr">
+              <a:lnSpc>
+                <a:spcPct val="100000"/>
+              </a:lnSpc>
+            </a:pPr>
+            <a:r>
+              <a:rPr b="0" lang="pt-BR" sz="1200" spc="-1" strike="noStrike">
+                <a:solidFill>
+                  <a:srgbClr val="000000"/>
+                </a:solidFill>
+                <a:latin typeface="Arial"/>
+                <a:ea typeface="DejaVu Sans"/>
+              </a:rPr>
+              <a:t>Gerencia</a:t>
+            </a:r>
+            <a:endParaRPr b="0" lang="pt-BR" sz="1200" spc="-1" strike="noStrike">
+              <a:latin typeface="Arial"/>
+            </a:endParaRPr>
+          </a:p>
+        </p:txBody>
+      </p:sp>
+      <p:sp>
+        <p:nvSpPr>
+          <p:cNvPr id="109" name="CustomShape 40"/>
+          <p:cNvSpPr/>
+          <p:nvPr/>
+        </p:nvSpPr>
+        <p:spPr>
+          <a:xfrm>
+            <a:off x="5688000" y="288000"/>
+            <a:ext cx="951480" cy="759600"/>
+          </a:xfrm>
+          <a:prstGeom prst="rect">
+            <a:avLst/>
+          </a:prstGeom>
+          <a:gradFill rotWithShape="0">
+            <a:gsLst>
+              <a:gs pos="0">
+                <a:srgbClr val="d0d0d0"/>
+              </a:gs>
+              <a:gs pos="100000">
+                <a:srgbClr val="ededed">
+                  <a:alpha val="0"/>
+                </a:srgbClr>
+              </a:gs>
+            </a:gsLst>
+            <a:lin ang="16200000"/>
+          </a:gradFill>
+          <a:ln/>
+          <a:effectLst>
+            <a:outerShdw blurRad="40000" dir="5400000" dist="20160" rotWithShape="0">
+              <a:srgbClr val="000000">
+                <a:alpha val="38000"/>
+              </a:srgbClr>
+            </a:outerShdw>
+          </a:effectLst>
+        </p:spPr>
+        <p:style>
+          <a:lnRef idx="1">
+            <a:schemeClr val="dk1"/>
+          </a:lnRef>
+          <a:fillRef idx="2">
+            <a:schemeClr val="dk1"/>
+          </a:fillRef>
+          <a:effectRef idx="1">
+            <a:schemeClr val="dk1"/>
+          </a:effectRef>
+          <a:fontRef idx="minor"/>
+        </p:style>
+        <p:txBody>
+          <a:bodyPr lIns="90000" rIns="90000" tIns="45000" bIns="45000" anchor="ctr">
+            <a:noAutofit/>
+          </a:bodyPr>
+          <a:p>
+            <a:pPr algn="ctr">
+              <a:lnSpc>
+                <a:spcPct val="100000"/>
+              </a:lnSpc>
+            </a:pPr>
+            <a:r>
+              <a:rPr b="0" lang="pt-BR" sz="1200" spc="-1" strike="noStrike">
+                <a:solidFill>
+                  <a:srgbClr val="000000"/>
+                </a:solidFill>
+                <a:latin typeface="Arial"/>
+                <a:ea typeface="DejaVu Sans"/>
+              </a:rPr>
+              <a:t>Controle de qualidade</a:t>
+            </a:r>
+            <a:endParaRPr b="0" lang="pt-BR" sz="1200" spc="-1" strike="noStrike">
+              <a:latin typeface="Arial"/>
+            </a:endParaRPr>
+          </a:p>
+        </p:txBody>
+      </p:sp>
+      <p:sp>
+        <p:nvSpPr>
+          <p:cNvPr id="110" name="CustomShape 41"/>
+          <p:cNvSpPr/>
+          <p:nvPr/>
+        </p:nvSpPr>
+        <p:spPr>
+          <a:xfrm flipH="1" flipV="1">
+            <a:off x="6264000" y="1080000"/>
+            <a:ext cx="432000" cy="504000"/>
+          </a:xfrm>
+          <a:custGeom>
+            <a:avLst/>
+            <a:gdLst/>
+            <a:ahLst/>
+            <a:rect l="l" t="t" r="r" b="b"/>
+            <a:pathLst>
+              <a:path w="21600" h="21600">
+                <a:moveTo>
+                  <a:pt x="0" y="0"/>
+                </a:moveTo>
+                <a:lnTo>
+                  <a:pt x="21600" y="21600"/>
+                </a:lnTo>
+              </a:path>
+            </a:pathLst>
+          </a:custGeom>
+          <a:noFill/>
+          <a:ln>
+            <a:solidFill>
+              <a:schemeClr val="tx1"/>
+            </a:solidFill>
+            <a:tailEnd len="med" type="triangle" w="med"/>
+          </a:ln>
+        </p:spPr>
+        <p:style>
+          <a:lnRef idx="1">
+            <a:schemeClr val="accent1"/>
+          </a:lnRef>
+          <a:fillRef idx="0">
+            <a:schemeClr val="accent1"/>
+          </a:fillRef>
+          <a:effectRef idx="0">
+            <a:schemeClr val="accent1"/>
+          </a:effectRef>
+          <a:fontRef idx="minor"/>
+        </p:style>
+      </p:sp>
+      <p:sp>
+        <p:nvSpPr>
+          <p:cNvPr id="111" name="TextShape 42"/>
+          <p:cNvSpPr txBox="1"/>
+          <p:nvPr/>
+        </p:nvSpPr>
+        <p:spPr>
+          <a:xfrm>
+            <a:off x="5328000" y="1224000"/>
+            <a:ext cx="1031400" cy="431640"/>
+          </a:xfrm>
+          <a:prstGeom prst="rect">
+            <a:avLst/>
+          </a:prstGeom>
+          <a:noFill/>
+          <a:ln>
+            <a:noFill/>
+          </a:ln>
+        </p:spPr>
+        <p:txBody>
+          <a:bodyPr lIns="90000" rIns="90000" tIns="45000" bIns="45000">
+            <a:spAutoFit/>
+          </a:bodyPr>
+          <a:p>
+            <a:r>
+              <a:rPr b="0" lang="pt-BR" sz="1200" spc="-1" strike="noStrike">
+                <a:latin typeface="Arial"/>
+              </a:rPr>
+              <a:t>Sub componente</a:t>
+            </a:r>
+            <a:endParaRPr b="0" lang="pt-BR" sz="1200" spc="-1" strike="noStrike">
+              <a:latin typeface="Arial"/>
+            </a:endParaRPr>
+          </a:p>
+        </p:txBody>
       </p:sp>
     </p:spTree>
   </p:cSld>
@@ -4967,14 +5235,14 @@
       </p:grpSpPr>
       <p:sp>
         <p:nvSpPr>
-          <p:cNvPr id="107" name="CustomShape 1"/>
+          <p:cNvPr id="112" name="CustomShape 1"/>
           <p:cNvSpPr/>
           <p:nvPr/>
         </p:nvSpPr>
         <p:spPr>
           <a:xfrm>
             <a:off x="6912000" y="85680"/>
-            <a:ext cx="2806920" cy="638280"/>
+            <a:ext cx="2806560" cy="638280"/>
           </a:xfrm>
           <a:prstGeom prst="rect">
             <a:avLst/>
@@ -5018,14 +5286,14 @@
       </p:sp>
       <p:sp>
         <p:nvSpPr>
-          <p:cNvPr id="108" name="CustomShape 2"/>
+          <p:cNvPr id="113" name="CustomShape 2"/>
           <p:cNvSpPr/>
           <p:nvPr/>
         </p:nvSpPr>
         <p:spPr>
           <a:xfrm>
             <a:off x="471960" y="246600"/>
-            <a:ext cx="951840" cy="759960"/>
+            <a:ext cx="951480" cy="759600"/>
           </a:xfrm>
           <a:prstGeom prst="rect">
             <a:avLst/>
@@ -5092,14 +5360,14 @@
       </p:sp>
       <p:sp>
         <p:nvSpPr>
-          <p:cNvPr id="109" name="CustomShape 3"/>
+          <p:cNvPr id="114" name="CustomShape 3"/>
           <p:cNvSpPr/>
           <p:nvPr/>
         </p:nvSpPr>
         <p:spPr>
           <a:xfrm>
             <a:off x="432000" y="1584000"/>
-            <a:ext cx="1366920" cy="934920"/>
+            <a:ext cx="1366560" cy="934560"/>
           </a:xfrm>
           <a:prstGeom prst="ellipse">
             <a:avLst/>
@@ -5145,24 +5413,21 @@
               <a:t>Receber sub componente não testado</a:t>
             </a:r>
             <a:endParaRPr b="0" lang="pt-BR" sz="1050" spc="-1" strike="noStrike">
-              <a:solidFill>
-                <a:srgbClr val="000000"/>
-              </a:solidFill>
-              <a:latin typeface="Arial"/>
-            </a:endParaRPr>
-          </a:p>
-        </p:txBody>
-      </p:sp>
-      <p:sp>
-        <p:nvSpPr>
-          <p:cNvPr id="110" name="CustomShape 4"/>
+              <a:latin typeface="Arial"/>
+            </a:endParaRPr>
+          </a:p>
+        </p:txBody>
+      </p:sp>
+      <p:sp>
+        <p:nvSpPr>
+          <p:cNvPr id="115" name="CustomShape 4"/>
           <p:cNvSpPr/>
           <p:nvPr/>
         </p:nvSpPr>
         <p:spPr>
           <a:xfrm>
             <a:off x="964080" y="997200"/>
-            <a:ext cx="114840" cy="585720"/>
+            <a:ext cx="114480" cy="585360"/>
           </a:xfrm>
           <a:custGeom>
             <a:avLst/>
@@ -5203,14 +5468,14 @@
       </p:sp>
       <p:sp>
         <p:nvSpPr>
-          <p:cNvPr id="111" name="CustomShape 5"/>
+          <p:cNvPr id="116" name="CustomShape 5"/>
           <p:cNvSpPr/>
           <p:nvPr/>
         </p:nvSpPr>
         <p:spPr>
           <a:xfrm>
             <a:off x="1156320" y="1126080"/>
-            <a:ext cx="1218600" cy="241920"/>
+            <a:ext cx="1218240" cy="241920"/>
           </a:xfrm>
           <a:prstGeom prst="rect">
             <a:avLst/>
@@ -5264,7 +5529,7 @@
       </p:sp>
       <p:sp>
         <p:nvSpPr>
-          <p:cNvPr id="112" name="Line 6"/>
+          <p:cNvPr id="117" name="Line 6"/>
           <p:cNvSpPr/>
           <p:nvPr/>
         </p:nvSpPr>
@@ -5297,7 +5562,7 @@
       </p:sp>
       <p:sp>
         <p:nvSpPr>
-          <p:cNvPr id="113" name="Line 7"/>
+          <p:cNvPr id="118" name="Line 7"/>
           <p:cNvSpPr/>
           <p:nvPr/>
         </p:nvSpPr>
@@ -5330,14 +5595,14 @@
       </p:sp>
       <p:sp>
         <p:nvSpPr>
-          <p:cNvPr id="114" name="CustomShape 8"/>
+          <p:cNvPr id="119" name="CustomShape 8"/>
           <p:cNvSpPr/>
           <p:nvPr/>
         </p:nvSpPr>
         <p:spPr>
           <a:xfrm>
             <a:off x="576000" y="2952000"/>
-            <a:ext cx="1294920" cy="454680"/>
+            <a:ext cx="1294560" cy="454680"/>
           </a:xfrm>
           <a:prstGeom prst="rect">
             <a:avLst/>
@@ -5381,14 +5646,14 @@
       </p:sp>
       <p:sp>
         <p:nvSpPr>
-          <p:cNvPr id="115" name="CustomShape 9"/>
+          <p:cNvPr id="120" name="CustomShape 9"/>
           <p:cNvSpPr/>
           <p:nvPr/>
         </p:nvSpPr>
         <p:spPr>
           <a:xfrm>
             <a:off x="1123920" y="2520000"/>
-            <a:ext cx="27000" cy="430920"/>
+            <a:ext cx="26640" cy="430560"/>
           </a:xfrm>
           <a:custGeom>
             <a:avLst/>
@@ -5429,14 +5694,14 @@
       </p:sp>
       <p:sp>
         <p:nvSpPr>
-          <p:cNvPr id="116" name="CustomShape 10"/>
+          <p:cNvPr id="121" name="CustomShape 10"/>
           <p:cNvSpPr/>
           <p:nvPr/>
         </p:nvSpPr>
         <p:spPr>
           <a:xfrm>
             <a:off x="2253960" y="1440000"/>
-            <a:ext cx="1128960" cy="1061280"/>
+            <a:ext cx="1128600" cy="1060920"/>
           </a:xfrm>
           <a:prstGeom prst="ellipse">
             <a:avLst/>
@@ -5482,24 +5747,21 @@
               <a:t>Testar Subcomponente</a:t>
             </a:r>
             <a:endParaRPr b="0" lang="pt-BR" sz="1200" spc="-1" strike="noStrike">
-              <a:solidFill>
-                <a:srgbClr val="000000"/>
-              </a:solidFill>
-              <a:latin typeface="Arial"/>
-            </a:endParaRPr>
-          </a:p>
-        </p:txBody>
-      </p:sp>
-      <p:sp>
-        <p:nvSpPr>
-          <p:cNvPr id="117" name="CustomShape 11"/>
+              <a:latin typeface="Arial"/>
+            </a:endParaRPr>
+          </a:p>
+        </p:txBody>
+      </p:sp>
+      <p:sp>
+        <p:nvSpPr>
+          <p:cNvPr id="122" name="CustomShape 11"/>
           <p:cNvSpPr/>
           <p:nvPr/>
         </p:nvSpPr>
         <p:spPr>
           <a:xfrm flipH="1">
             <a:off x="1582560" y="2304000"/>
-            <a:ext cx="790920" cy="646920"/>
+            <a:ext cx="790560" cy="646560"/>
           </a:xfrm>
           <a:custGeom>
             <a:avLst/>
@@ -5541,14 +5803,14 @@
       </p:sp>
       <p:sp>
         <p:nvSpPr>
-          <p:cNvPr id="118" name="CustomShape 12"/>
+          <p:cNvPr id="123" name="CustomShape 12"/>
           <p:cNvSpPr/>
           <p:nvPr/>
         </p:nvSpPr>
         <p:spPr>
           <a:xfrm>
             <a:off x="2232000" y="2952000"/>
-            <a:ext cx="1294920" cy="454680"/>
+            <a:ext cx="1294560" cy="454680"/>
           </a:xfrm>
           <a:prstGeom prst="rect">
             <a:avLst/>
@@ -5592,7 +5854,7 @@
       </p:sp>
       <p:sp>
         <p:nvSpPr>
-          <p:cNvPr id="119" name="Line 13"/>
+          <p:cNvPr id="124" name="Line 13"/>
           <p:cNvSpPr/>
           <p:nvPr/>
         </p:nvSpPr>
@@ -5625,7 +5887,7 @@
       </p:sp>
       <p:sp>
         <p:nvSpPr>
-          <p:cNvPr id="120" name="Line 14"/>
+          <p:cNvPr id="125" name="Line 14"/>
           <p:cNvSpPr/>
           <p:nvPr/>
         </p:nvSpPr>
@@ -5658,14 +5920,14 @@
       </p:sp>
       <p:sp>
         <p:nvSpPr>
-          <p:cNvPr id="121" name="CustomShape 15"/>
+          <p:cNvPr id="126" name="CustomShape 15"/>
           <p:cNvSpPr/>
           <p:nvPr/>
         </p:nvSpPr>
         <p:spPr>
           <a:xfrm>
             <a:off x="2923920" y="2502360"/>
-            <a:ext cx="27000" cy="430920"/>
+            <a:ext cx="26640" cy="430560"/>
           </a:xfrm>
           <a:custGeom>
             <a:avLst/>
@@ -5706,14 +5968,14 @@
       </p:sp>
       <p:sp>
         <p:nvSpPr>
-          <p:cNvPr id="122" name="CustomShape 16"/>
+          <p:cNvPr id="127" name="CustomShape 16"/>
           <p:cNvSpPr/>
           <p:nvPr/>
         </p:nvSpPr>
         <p:spPr>
           <a:xfrm>
             <a:off x="2448000" y="246960"/>
-            <a:ext cx="951840" cy="759960"/>
+            <a:ext cx="951480" cy="759600"/>
           </a:xfrm>
           <a:prstGeom prst="rect">
             <a:avLst/>
@@ -5780,14 +6042,14 @@
       </p:sp>
       <p:sp>
         <p:nvSpPr>
-          <p:cNvPr id="123" name="CustomShape 17"/>
+          <p:cNvPr id="128" name="CustomShape 17"/>
           <p:cNvSpPr/>
           <p:nvPr/>
         </p:nvSpPr>
         <p:spPr>
           <a:xfrm flipV="1">
             <a:off x="2808000" y="1006560"/>
-            <a:ext cx="129960" cy="431640"/>
+            <a:ext cx="129600" cy="431280"/>
           </a:xfrm>
           <a:custGeom>
             <a:avLst/>
@@ -5828,14 +6090,14 @@
       </p:sp>
       <p:sp>
         <p:nvSpPr>
-          <p:cNvPr id="124" name="CustomShape 18"/>
+          <p:cNvPr id="129" name="CustomShape 18"/>
           <p:cNvSpPr/>
           <p:nvPr/>
         </p:nvSpPr>
         <p:spPr>
           <a:xfrm>
             <a:off x="3096000" y="1080000"/>
-            <a:ext cx="841320" cy="453960"/>
+            <a:ext cx="840960" cy="453600"/>
           </a:xfrm>
           <a:prstGeom prst="rect">
             <a:avLst/>
@@ -5854,14 +6116,14 @@
       </p:sp>
       <p:sp>
         <p:nvSpPr>
-          <p:cNvPr id="125" name="CustomShape 19"/>
+          <p:cNvPr id="130" name="CustomShape 19"/>
           <p:cNvSpPr/>
           <p:nvPr/>
         </p:nvSpPr>
         <p:spPr>
           <a:xfrm>
             <a:off x="3096000" y="1080000"/>
-            <a:ext cx="2014920" cy="249480"/>
+            <a:ext cx="2014560" cy="249480"/>
           </a:xfrm>
           <a:prstGeom prst="rect">
             <a:avLst/>
@@ -5935,14 +6197,14 @@
       </p:grpSpPr>
       <p:sp>
         <p:nvSpPr>
-          <p:cNvPr id="126" name="CustomShape 1"/>
+          <p:cNvPr id="131" name="CustomShape 1"/>
           <p:cNvSpPr/>
           <p:nvPr/>
         </p:nvSpPr>
         <p:spPr>
           <a:xfrm>
             <a:off x="6912000" y="85680"/>
-            <a:ext cx="2806920" cy="638280"/>
+            <a:ext cx="2806560" cy="638280"/>
           </a:xfrm>
           <a:prstGeom prst="rect">
             <a:avLst/>
@@ -5986,14 +6248,14 @@
       </p:sp>
       <p:sp>
         <p:nvSpPr>
-          <p:cNvPr id="127" name="CustomShape 2"/>
+          <p:cNvPr id="132" name="CustomShape 2"/>
           <p:cNvSpPr/>
           <p:nvPr/>
         </p:nvSpPr>
         <p:spPr>
           <a:xfrm>
             <a:off x="3096000" y="1080000"/>
-            <a:ext cx="841320" cy="453960"/>
+            <a:ext cx="840960" cy="453600"/>
           </a:xfrm>
           <a:prstGeom prst="rect">
             <a:avLst/>
@@ -6012,14 +6274,14 @@
       </p:sp>
       <p:sp>
         <p:nvSpPr>
-          <p:cNvPr id="128" name="CustomShape 3"/>
+          <p:cNvPr id="133" name="CustomShape 3"/>
           <p:cNvSpPr/>
           <p:nvPr/>
         </p:nvSpPr>
         <p:spPr>
           <a:xfrm>
             <a:off x="504360" y="1512000"/>
-            <a:ext cx="1726560" cy="1510560"/>
+            <a:ext cx="1726200" cy="1510200"/>
           </a:xfrm>
           <a:prstGeom prst="ellipse">
             <a:avLst/>
@@ -6065,24 +6327,21 @@
               <a:t>Separar subcomponentes</a:t>
             </a:r>
             <a:endParaRPr b="0" lang="pt-BR" sz="1050" spc="-1" strike="noStrike">
-              <a:solidFill>
-                <a:srgbClr val="000000"/>
-              </a:solidFill>
-              <a:latin typeface="Arial"/>
-            </a:endParaRPr>
-          </a:p>
-        </p:txBody>
-      </p:sp>
-      <p:sp>
-        <p:nvSpPr>
-          <p:cNvPr id="129" name="CustomShape 4"/>
+              <a:latin typeface="Arial"/>
+            </a:endParaRPr>
+          </a:p>
+        </p:txBody>
+      </p:sp>
+      <p:sp>
+        <p:nvSpPr>
+          <p:cNvPr id="134" name="CustomShape 4"/>
           <p:cNvSpPr/>
           <p:nvPr/>
         </p:nvSpPr>
         <p:spPr>
           <a:xfrm>
             <a:off x="720000" y="3816000"/>
-            <a:ext cx="1294920" cy="454680"/>
+            <a:ext cx="1294560" cy="454680"/>
           </a:xfrm>
           <a:prstGeom prst="rect">
             <a:avLst/>
@@ -6126,7 +6385,7 @@
       </p:sp>
       <p:sp>
         <p:nvSpPr>
-          <p:cNvPr id="130" name="Line 5"/>
+          <p:cNvPr id="135" name="Line 5"/>
           <p:cNvSpPr/>
           <p:nvPr/>
         </p:nvSpPr>
@@ -6159,7 +6418,7 @@
       </p:sp>
       <p:sp>
         <p:nvSpPr>
-          <p:cNvPr id="131" name="Line 6"/>
+          <p:cNvPr id="136" name="Line 6"/>
           <p:cNvSpPr/>
           <p:nvPr/>
         </p:nvSpPr>
@@ -6192,14 +6451,14 @@
       </p:sp>
       <p:sp>
         <p:nvSpPr>
-          <p:cNvPr id="132" name="CustomShape 7"/>
+          <p:cNvPr id="137" name="CustomShape 7"/>
           <p:cNvSpPr/>
           <p:nvPr/>
         </p:nvSpPr>
         <p:spPr>
           <a:xfrm rot="21552600">
-            <a:off x="1366920" y="3022560"/>
-            <a:ext cx="6840" cy="719280"/>
+            <a:off x="1366560" y="3022200"/>
+            <a:ext cx="6480" cy="718920"/>
           </a:xfrm>
           <a:custGeom>
             <a:avLst/>
@@ -6240,14 +6499,14 @@
       </p:sp>
       <p:sp>
         <p:nvSpPr>
-          <p:cNvPr id="133" name="CustomShape 8"/>
+          <p:cNvPr id="138" name="CustomShape 8"/>
           <p:cNvSpPr/>
           <p:nvPr/>
         </p:nvSpPr>
         <p:spPr>
           <a:xfrm>
             <a:off x="2469960" y="1656000"/>
-            <a:ext cx="2064960" cy="1438920"/>
+            <a:ext cx="2064600" cy="1438560"/>
           </a:xfrm>
           <a:prstGeom prst="ellipse">
             <a:avLst/>
@@ -6293,17 +6552,14 @@
               <a:t>Fixar Subcomponentes</a:t>
             </a:r>
             <a:endParaRPr b="0" lang="pt-BR" sz="1200" spc="-1" strike="noStrike">
-              <a:solidFill>
-                <a:srgbClr val="000000"/>
-              </a:solidFill>
-              <a:latin typeface="Arial"/>
-            </a:endParaRPr>
-          </a:p>
-        </p:txBody>
-      </p:sp>
-      <p:sp>
-        <p:nvSpPr>
-          <p:cNvPr id="134" name="Line 9"/>
+              <a:latin typeface="Arial"/>
+            </a:endParaRPr>
+          </a:p>
+        </p:txBody>
+      </p:sp>
+      <p:sp>
+        <p:nvSpPr>
+          <p:cNvPr id="139" name="Line 9"/>
           <p:cNvSpPr/>
           <p:nvPr/>
         </p:nvSpPr>
@@ -6336,7 +6592,7 @@
       </p:sp>
       <p:sp>
         <p:nvSpPr>
-          <p:cNvPr id="135" name="Line 10"/>
+          <p:cNvPr id="140" name="Line 10"/>
           <p:cNvSpPr/>
           <p:nvPr/>
         </p:nvSpPr>
@@ -6369,14 +6625,14 @@
       </p:sp>
       <p:sp>
         <p:nvSpPr>
-          <p:cNvPr id="136" name="CustomShape 11"/>
+          <p:cNvPr id="141" name="CustomShape 11"/>
           <p:cNvSpPr/>
           <p:nvPr/>
         </p:nvSpPr>
         <p:spPr>
           <a:xfrm flipH="1">
             <a:off x="1798560" y="2880000"/>
-            <a:ext cx="934920" cy="790920"/>
+            <a:ext cx="934560" cy="790560"/>
           </a:xfrm>
           <a:custGeom>
             <a:avLst/>
@@ -6418,14 +6674,14 @@
       </p:sp>
       <p:sp>
         <p:nvSpPr>
-          <p:cNvPr id="137" name="CustomShape 12"/>
+          <p:cNvPr id="142" name="CustomShape 12"/>
           <p:cNvSpPr/>
           <p:nvPr/>
         </p:nvSpPr>
         <p:spPr>
           <a:xfrm>
             <a:off x="3456000" y="3096000"/>
-            <a:ext cx="360" cy="646920"/>
+            <a:ext cx="360" cy="646560"/>
           </a:xfrm>
           <a:custGeom>
             <a:avLst/>
@@ -6466,14 +6722,14 @@
       </p:sp>
       <p:sp>
         <p:nvSpPr>
-          <p:cNvPr id="138" name="CustomShape 13"/>
+          <p:cNvPr id="143" name="CustomShape 13"/>
           <p:cNvSpPr/>
           <p:nvPr/>
         </p:nvSpPr>
         <p:spPr>
           <a:xfrm flipH="1">
             <a:off x="3965040" y="2952000"/>
-            <a:ext cx="1000440" cy="720360"/>
+            <a:ext cx="1000080" cy="720000"/>
           </a:xfrm>
           <a:custGeom>
             <a:avLst/>
@@ -6515,14 +6771,14 @@
       </p:sp>
       <p:sp>
         <p:nvSpPr>
-          <p:cNvPr id="139" name="CustomShape 14"/>
+          <p:cNvPr id="144" name="CustomShape 14"/>
           <p:cNvSpPr/>
           <p:nvPr/>
         </p:nvSpPr>
         <p:spPr>
           <a:xfrm>
             <a:off x="2520000" y="3744000"/>
-            <a:ext cx="1798920" cy="454680"/>
+            <a:ext cx="1798560" cy="454680"/>
           </a:xfrm>
           <a:prstGeom prst="rect">
             <a:avLst/>
@@ -6566,14 +6822,14 @@
       </p:sp>
       <p:sp>
         <p:nvSpPr>
-          <p:cNvPr id="140" name="CustomShape 15"/>
+          <p:cNvPr id="145" name="CustomShape 15"/>
           <p:cNvSpPr/>
           <p:nvPr/>
         </p:nvSpPr>
         <p:spPr>
           <a:xfrm>
             <a:off x="4680360" y="1656360"/>
-            <a:ext cx="1726560" cy="1510560"/>
+            <a:ext cx="1726200" cy="1510200"/>
           </a:xfrm>
           <a:prstGeom prst="ellipse">
             <a:avLst/>
@@ -6619,17 +6875,14 @@
               <a:t>Empacotar a maquina</a:t>
             </a:r>
             <a:endParaRPr b="0" lang="pt-BR" sz="1050" spc="-1" strike="noStrike">
-              <a:solidFill>
-                <a:srgbClr val="000000"/>
-              </a:solidFill>
-              <a:latin typeface="Arial"/>
-            </a:endParaRPr>
-          </a:p>
-        </p:txBody>
-      </p:sp>
-      <p:sp>
-        <p:nvSpPr>
-          <p:cNvPr id="141" name="Line 16"/>
+              <a:latin typeface="Arial"/>
+            </a:endParaRPr>
+          </a:p>
+        </p:txBody>
+      </p:sp>
+      <p:sp>
+        <p:nvSpPr>
+          <p:cNvPr id="146" name="Line 16"/>
           <p:cNvSpPr/>
           <p:nvPr/>
         </p:nvSpPr>
@@ -6662,7 +6915,7 @@
       </p:sp>
       <p:sp>
         <p:nvSpPr>
-          <p:cNvPr id="142" name="Line 17"/>
+          <p:cNvPr id="147" name="Line 17"/>
           <p:cNvSpPr/>
           <p:nvPr/>
         </p:nvSpPr>
@@ -6695,14 +6948,14 @@
       </p:sp>
       <p:sp>
         <p:nvSpPr>
-          <p:cNvPr id="143" name="CustomShape 18"/>
+          <p:cNvPr id="148" name="CustomShape 18"/>
           <p:cNvSpPr/>
           <p:nvPr/>
         </p:nvSpPr>
         <p:spPr>
           <a:xfrm>
             <a:off x="4752000" y="3816000"/>
-            <a:ext cx="1582920" cy="454680"/>
+            <a:ext cx="1582560" cy="454680"/>
           </a:xfrm>
           <a:prstGeom prst="rect">
             <a:avLst/>
@@ -6746,14 +6999,14 @@
       </p:sp>
       <p:sp>
         <p:nvSpPr>
-          <p:cNvPr id="144" name="CustomShape 19"/>
+          <p:cNvPr id="149" name="CustomShape 19"/>
           <p:cNvSpPr/>
           <p:nvPr/>
         </p:nvSpPr>
         <p:spPr>
           <a:xfrm rot="21552600">
-            <a:off x="5542920" y="3166920"/>
-            <a:ext cx="6840" cy="502920"/>
+            <a:off x="5542560" y="3166560"/>
+            <a:ext cx="6480" cy="502560"/>
           </a:xfrm>
           <a:custGeom>
             <a:avLst/>
@@ -6794,14 +7047,14 @@
       </p:sp>
       <p:sp>
         <p:nvSpPr>
-          <p:cNvPr id="145" name="CustomShape 20"/>
+          <p:cNvPr id="150" name="CustomShape 20"/>
           <p:cNvSpPr/>
           <p:nvPr/>
         </p:nvSpPr>
         <p:spPr>
           <a:xfrm>
             <a:off x="6912000" y="2232000"/>
-            <a:ext cx="1726560" cy="1510560"/>
+            <a:ext cx="1726200" cy="1510200"/>
           </a:xfrm>
           <a:prstGeom prst="ellipse">
             <a:avLst/>
@@ -6847,24 +7100,21 @@
               <a:t>Encaminhar maquina</a:t>
             </a:r>
             <a:endParaRPr b="0" lang="pt-BR" sz="1050" spc="-1" strike="noStrike">
-              <a:solidFill>
-                <a:srgbClr val="000000"/>
-              </a:solidFill>
-              <a:latin typeface="Arial"/>
-            </a:endParaRPr>
-          </a:p>
-        </p:txBody>
-      </p:sp>
-      <p:sp>
-        <p:nvSpPr>
-          <p:cNvPr id="146" name="CustomShape 21"/>
+              <a:latin typeface="Arial"/>
+            </a:endParaRPr>
+          </a:p>
+        </p:txBody>
+      </p:sp>
+      <p:sp>
+        <p:nvSpPr>
+          <p:cNvPr id="151" name="CustomShape 21"/>
           <p:cNvSpPr/>
           <p:nvPr/>
         </p:nvSpPr>
         <p:spPr>
           <a:xfrm>
             <a:off x="7344000" y="864000"/>
-            <a:ext cx="951840" cy="759960"/>
+            <a:ext cx="951480" cy="759600"/>
           </a:xfrm>
           <a:prstGeom prst="rect">
             <a:avLst/>
@@ -6931,14 +7181,14 @@
       </p:sp>
       <p:sp>
         <p:nvSpPr>
-          <p:cNvPr id="147" name="CustomShape 22"/>
+          <p:cNvPr id="152" name="CustomShape 22"/>
           <p:cNvSpPr/>
           <p:nvPr/>
         </p:nvSpPr>
         <p:spPr>
           <a:xfrm flipH="1">
             <a:off x="5909040" y="2952000"/>
-            <a:ext cx="1000440" cy="720360"/>
+            <a:ext cx="1000080" cy="720000"/>
           </a:xfrm>
           <a:custGeom>
             <a:avLst/>
@@ -6980,14 +7230,14 @@
       </p:sp>
       <p:sp>
         <p:nvSpPr>
-          <p:cNvPr id="148" name="CustomShape 23"/>
+          <p:cNvPr id="153" name="CustomShape 23"/>
           <p:cNvSpPr/>
           <p:nvPr/>
         </p:nvSpPr>
         <p:spPr>
           <a:xfrm flipV="1">
             <a:off x="7788960" y="1623600"/>
-            <a:ext cx="129960" cy="605880"/>
+            <a:ext cx="129600" cy="605520"/>
           </a:xfrm>
           <a:custGeom>
             <a:avLst/>
@@ -7028,14 +7278,14 @@
       </p:sp>
       <p:sp>
         <p:nvSpPr>
-          <p:cNvPr id="149" name="CustomShape 24"/>
+          <p:cNvPr id="154" name="CustomShape 24"/>
           <p:cNvSpPr/>
           <p:nvPr/>
         </p:nvSpPr>
         <p:spPr>
           <a:xfrm>
             <a:off x="6984000" y="1754280"/>
-            <a:ext cx="841320" cy="333000"/>
+            <a:ext cx="840960" cy="333000"/>
           </a:xfrm>
           <a:prstGeom prst="rect">
             <a:avLst/>
@@ -7109,14 +7359,14 @@
       </p:grpSpPr>
       <p:sp>
         <p:nvSpPr>
-          <p:cNvPr id="150" name="CustomShape 1"/>
+          <p:cNvPr id="155" name="CustomShape 1"/>
           <p:cNvSpPr/>
           <p:nvPr/>
         </p:nvSpPr>
         <p:spPr>
           <a:xfrm>
             <a:off x="6912000" y="85680"/>
-            <a:ext cx="2806920" cy="638280"/>
+            <a:ext cx="2806560" cy="638280"/>
           </a:xfrm>
           <a:prstGeom prst="rect">
             <a:avLst/>
@@ -7160,14 +7410,14 @@
       </p:sp>
       <p:sp>
         <p:nvSpPr>
-          <p:cNvPr id="151" name="CustomShape 2"/>
+          <p:cNvPr id="156" name="CustomShape 2"/>
           <p:cNvSpPr/>
           <p:nvPr/>
         </p:nvSpPr>
         <p:spPr>
           <a:xfrm>
             <a:off x="471960" y="246600"/>
-            <a:ext cx="951840" cy="759960"/>
+            <a:ext cx="951480" cy="759600"/>
           </a:xfrm>
           <a:prstGeom prst="rect">
             <a:avLst/>
@@ -7234,14 +7484,14 @@
       </p:sp>
       <p:sp>
         <p:nvSpPr>
-          <p:cNvPr id="152" name="CustomShape 3"/>
+          <p:cNvPr id="157" name="CustomShape 3"/>
           <p:cNvSpPr/>
           <p:nvPr/>
         </p:nvSpPr>
         <p:spPr>
           <a:xfrm>
             <a:off x="964080" y="997200"/>
-            <a:ext cx="114840" cy="585720"/>
+            <a:ext cx="114480" cy="585360"/>
           </a:xfrm>
           <a:custGeom>
             <a:avLst/>
@@ -7282,14 +7532,14 @@
       </p:sp>
       <p:sp>
         <p:nvSpPr>
-          <p:cNvPr id="153" name="CustomShape 4"/>
+          <p:cNvPr id="158" name="CustomShape 4"/>
           <p:cNvSpPr/>
           <p:nvPr/>
         </p:nvSpPr>
         <p:spPr>
           <a:xfrm>
             <a:off x="2448000" y="246960"/>
-            <a:ext cx="951840" cy="759960"/>
+            <a:ext cx="951480" cy="759600"/>
           </a:xfrm>
           <a:prstGeom prst="rect">
             <a:avLst/>
@@ -7356,14 +7606,14 @@
       </p:sp>
       <p:sp>
         <p:nvSpPr>
-          <p:cNvPr id="154" name="CustomShape 5"/>
+          <p:cNvPr id="159" name="CustomShape 5"/>
           <p:cNvSpPr/>
           <p:nvPr/>
         </p:nvSpPr>
         <p:spPr>
           <a:xfrm flipV="1">
             <a:off x="2808000" y="1006560"/>
-            <a:ext cx="129960" cy="574920"/>
+            <a:ext cx="129600" cy="574560"/>
           </a:xfrm>
           <a:custGeom>
             <a:avLst/>
@@ -7404,14 +7654,14 @@
       </p:sp>
       <p:sp>
         <p:nvSpPr>
-          <p:cNvPr id="155" name="CustomShape 6"/>
+          <p:cNvPr id="160" name="CustomShape 6"/>
           <p:cNvSpPr/>
           <p:nvPr/>
         </p:nvSpPr>
         <p:spPr>
           <a:xfrm>
             <a:off x="3096000" y="1080000"/>
-            <a:ext cx="841320" cy="453960"/>
+            <a:ext cx="840960" cy="453600"/>
           </a:xfrm>
           <a:prstGeom prst="rect">
             <a:avLst/>
@@ -7430,14 +7680,14 @@
       </p:sp>
       <p:sp>
         <p:nvSpPr>
-          <p:cNvPr id="156" name="CustomShape 7"/>
+          <p:cNvPr id="161" name="CustomShape 7"/>
           <p:cNvSpPr/>
           <p:nvPr/>
         </p:nvSpPr>
         <p:spPr>
           <a:xfrm>
             <a:off x="144000" y="1080000"/>
-            <a:ext cx="841320" cy="333000"/>
+            <a:ext cx="840960" cy="333000"/>
           </a:xfrm>
           <a:prstGeom prst="rect">
             <a:avLst/>
@@ -7481,14 +7731,14 @@
       </p:sp>
       <p:sp>
         <p:nvSpPr>
-          <p:cNvPr id="157" name="CustomShape 8"/>
+          <p:cNvPr id="162" name="CustomShape 8"/>
           <p:cNvSpPr/>
           <p:nvPr/>
         </p:nvSpPr>
         <p:spPr>
           <a:xfrm>
             <a:off x="576360" y="1584000"/>
-            <a:ext cx="1150560" cy="1150560"/>
+            <a:ext cx="1150200" cy="1150200"/>
           </a:xfrm>
           <a:prstGeom prst="ellipse">
             <a:avLst/>
@@ -7534,24 +7784,21 @@
               <a:t>Receber máquina pronta</a:t>
             </a:r>
             <a:endParaRPr b="0" lang="pt-BR" sz="1050" spc="-1" strike="noStrike">
-              <a:solidFill>
-                <a:srgbClr val="000000"/>
-              </a:solidFill>
-              <a:latin typeface="Arial"/>
-            </a:endParaRPr>
-          </a:p>
-        </p:txBody>
-      </p:sp>
-      <p:sp>
-        <p:nvSpPr>
-          <p:cNvPr id="158" name="CustomShape 9"/>
+              <a:latin typeface="Arial"/>
+            </a:endParaRPr>
+          </a:p>
+        </p:txBody>
+      </p:sp>
+      <p:sp>
+        <p:nvSpPr>
+          <p:cNvPr id="163" name="CustomShape 9"/>
           <p:cNvSpPr/>
           <p:nvPr/>
         </p:nvSpPr>
         <p:spPr>
           <a:xfrm>
             <a:off x="648000" y="3240000"/>
-            <a:ext cx="1294920" cy="272160"/>
+            <a:ext cx="1294560" cy="272160"/>
           </a:xfrm>
           <a:prstGeom prst="rect">
             <a:avLst/>
@@ -7595,7 +7842,7 @@
       </p:sp>
       <p:sp>
         <p:nvSpPr>
-          <p:cNvPr id="159" name="Line 10"/>
+          <p:cNvPr id="164" name="Line 10"/>
           <p:cNvSpPr/>
           <p:nvPr/>
         </p:nvSpPr>
@@ -7628,7 +7875,7 @@
       </p:sp>
       <p:sp>
         <p:nvSpPr>
-          <p:cNvPr id="160" name="Line 11"/>
+          <p:cNvPr id="165" name="Line 11"/>
           <p:cNvSpPr/>
           <p:nvPr/>
         </p:nvSpPr>
@@ -7661,14 +7908,14 @@
       </p:sp>
       <p:sp>
         <p:nvSpPr>
-          <p:cNvPr id="161" name="CustomShape 12"/>
+          <p:cNvPr id="166" name="CustomShape 12"/>
           <p:cNvSpPr/>
           <p:nvPr/>
         </p:nvSpPr>
         <p:spPr>
           <a:xfrm>
             <a:off x="1224000" y="2735640"/>
-            <a:ext cx="114840" cy="503280"/>
+            <a:ext cx="114480" cy="502920"/>
           </a:xfrm>
           <a:custGeom>
             <a:avLst/>
@@ -7709,14 +7956,14 @@
       </p:sp>
       <p:sp>
         <p:nvSpPr>
-          <p:cNvPr id="162" name="CustomShape 13"/>
+          <p:cNvPr id="167" name="CustomShape 13"/>
           <p:cNvSpPr/>
           <p:nvPr/>
         </p:nvSpPr>
         <p:spPr>
           <a:xfrm>
             <a:off x="2088360" y="1584000"/>
-            <a:ext cx="1294560" cy="1222920"/>
+            <a:ext cx="1294200" cy="1222560"/>
           </a:xfrm>
           <a:prstGeom prst="ellipse">
             <a:avLst/>
@@ -7762,24 +8009,21 @@
               <a:t>Enviar Máquina pronta</a:t>
             </a:r>
             <a:endParaRPr b="0" lang="pt-BR" sz="1050" spc="-1" strike="noStrike">
-              <a:solidFill>
-                <a:srgbClr val="000000"/>
-              </a:solidFill>
-              <a:latin typeface="Arial"/>
-            </a:endParaRPr>
-          </a:p>
-        </p:txBody>
-      </p:sp>
-      <p:sp>
-        <p:nvSpPr>
-          <p:cNvPr id="163" name="CustomShape 14"/>
+              <a:latin typeface="Arial"/>
+            </a:endParaRPr>
+          </a:p>
+        </p:txBody>
+      </p:sp>
+      <p:sp>
+        <p:nvSpPr>
+          <p:cNvPr id="168" name="CustomShape 14"/>
           <p:cNvSpPr/>
           <p:nvPr/>
         </p:nvSpPr>
         <p:spPr>
           <a:xfrm flipH="1">
             <a:off x="1798560" y="2664000"/>
-            <a:ext cx="568440" cy="574920"/>
+            <a:ext cx="568080" cy="574560"/>
           </a:xfrm>
           <a:custGeom>
             <a:avLst/>
@@ -7821,14 +8065,14 @@
       </p:sp>
       <p:sp>
         <p:nvSpPr>
-          <p:cNvPr id="164" name="CustomShape 15"/>
+          <p:cNvPr id="169" name="CustomShape 15"/>
           <p:cNvSpPr/>
           <p:nvPr/>
         </p:nvSpPr>
         <p:spPr>
           <a:xfrm>
             <a:off x="1872000" y="1107000"/>
-            <a:ext cx="841320" cy="333000"/>
+            <a:ext cx="840960" cy="333000"/>
           </a:xfrm>
           <a:prstGeom prst="rect">
             <a:avLst/>
@@ -7902,14 +8146,14 @@
       </p:grpSpPr>
       <p:sp>
         <p:nvSpPr>
-          <p:cNvPr id="165" name="CustomShape 1"/>
+          <p:cNvPr id="170" name="CustomShape 1"/>
           <p:cNvSpPr/>
           <p:nvPr/>
         </p:nvSpPr>
         <p:spPr>
           <a:xfrm>
             <a:off x="6912000" y="85680"/>
-            <a:ext cx="2806920" cy="912600"/>
+            <a:ext cx="2806560" cy="912600"/>
           </a:xfrm>
           <a:prstGeom prst="rect">
             <a:avLst/>
@@ -7963,14 +8207,14 @@
       </p:sp>
       <p:sp>
         <p:nvSpPr>
-          <p:cNvPr id="166" name="CustomShape 2"/>
+          <p:cNvPr id="171" name="CustomShape 2"/>
           <p:cNvSpPr/>
           <p:nvPr/>
         </p:nvSpPr>
         <p:spPr>
           <a:xfrm>
             <a:off x="471960" y="246600"/>
-            <a:ext cx="951840" cy="759960"/>
+            <a:ext cx="951480" cy="759600"/>
           </a:xfrm>
           <a:prstGeom prst="rect">
             <a:avLst/>
@@ -8037,14 +8281,14 @@
       </p:sp>
       <p:sp>
         <p:nvSpPr>
-          <p:cNvPr id="167" name="CustomShape 3"/>
+          <p:cNvPr id="172" name="CustomShape 3"/>
           <p:cNvSpPr/>
           <p:nvPr/>
         </p:nvSpPr>
         <p:spPr>
           <a:xfrm>
             <a:off x="964080" y="997200"/>
-            <a:ext cx="114840" cy="585720"/>
+            <a:ext cx="114480" cy="585360"/>
           </a:xfrm>
           <a:custGeom>
             <a:avLst/>
@@ -8085,14 +8329,14 @@
       </p:sp>
       <p:sp>
         <p:nvSpPr>
-          <p:cNvPr id="168" name="CustomShape 4"/>
+          <p:cNvPr id="173" name="CustomShape 4"/>
           <p:cNvSpPr/>
           <p:nvPr/>
         </p:nvSpPr>
         <p:spPr>
           <a:xfrm>
             <a:off x="2448000" y="246960"/>
-            <a:ext cx="951840" cy="759960"/>
+            <a:ext cx="951480" cy="759600"/>
           </a:xfrm>
           <a:prstGeom prst="rect">
             <a:avLst/>
@@ -8159,14 +8403,14 @@
       </p:sp>
       <p:sp>
         <p:nvSpPr>
-          <p:cNvPr id="169" name="CustomShape 5"/>
+          <p:cNvPr id="174" name="CustomShape 5"/>
           <p:cNvSpPr/>
           <p:nvPr/>
         </p:nvSpPr>
         <p:spPr>
           <a:xfrm flipV="1">
             <a:off x="2808000" y="1006560"/>
-            <a:ext cx="129960" cy="574920"/>
+            <a:ext cx="129600" cy="574560"/>
           </a:xfrm>
           <a:custGeom>
             <a:avLst/>
@@ -8207,14 +8451,14 @@
       </p:sp>
       <p:sp>
         <p:nvSpPr>
-          <p:cNvPr id="170" name="CustomShape 6"/>
+          <p:cNvPr id="175" name="CustomShape 6"/>
           <p:cNvSpPr/>
           <p:nvPr/>
         </p:nvSpPr>
         <p:spPr>
           <a:xfrm>
             <a:off x="3096000" y="1080000"/>
-            <a:ext cx="841320" cy="453960"/>
+            <a:ext cx="840960" cy="453600"/>
           </a:xfrm>
           <a:prstGeom prst="rect">
             <a:avLst/>
@@ -8233,14 +8477,14 @@
       </p:sp>
       <p:sp>
         <p:nvSpPr>
-          <p:cNvPr id="171" name="CustomShape 7"/>
+          <p:cNvPr id="176" name="CustomShape 7"/>
           <p:cNvSpPr/>
           <p:nvPr/>
         </p:nvSpPr>
         <p:spPr>
           <a:xfrm>
             <a:off x="144000" y="1080000"/>
-            <a:ext cx="841320" cy="257400"/>
+            <a:ext cx="840960" cy="257040"/>
           </a:xfrm>
           <a:prstGeom prst="rect">
             <a:avLst/>
@@ -8284,14 +8528,14 @@
       </p:sp>
       <p:sp>
         <p:nvSpPr>
-          <p:cNvPr id="172" name="CustomShape 8"/>
+          <p:cNvPr id="177" name="CustomShape 8"/>
           <p:cNvSpPr/>
           <p:nvPr/>
         </p:nvSpPr>
         <p:spPr>
           <a:xfrm>
             <a:off x="288000" y="1585080"/>
-            <a:ext cx="1583640" cy="1150560"/>
+            <a:ext cx="1583280" cy="1150200"/>
           </a:xfrm>
           <a:prstGeom prst="ellipse">
             <a:avLst/>
@@ -8337,24 +8581,21 @@
               <a:t>Priorizar pedido no planejamento</a:t>
             </a:r>
             <a:endParaRPr b="0" lang="pt-BR" sz="1100" spc="-1" strike="noStrike">
-              <a:solidFill>
-                <a:srgbClr val="000000"/>
-              </a:solidFill>
-              <a:latin typeface="Arial"/>
-            </a:endParaRPr>
-          </a:p>
-        </p:txBody>
-      </p:sp>
-      <p:sp>
-        <p:nvSpPr>
-          <p:cNvPr id="173" name="CustomShape 9"/>
+              <a:latin typeface="Arial"/>
+            </a:endParaRPr>
+          </a:p>
+        </p:txBody>
+      </p:sp>
+      <p:sp>
+        <p:nvSpPr>
+          <p:cNvPr id="178" name="CustomShape 9"/>
           <p:cNvSpPr/>
           <p:nvPr/>
         </p:nvSpPr>
         <p:spPr>
           <a:xfrm>
             <a:off x="648000" y="3240000"/>
-            <a:ext cx="1294920" cy="454680"/>
+            <a:ext cx="1294560" cy="454680"/>
           </a:xfrm>
           <a:prstGeom prst="rect">
             <a:avLst/>
@@ -8398,7 +8639,7 @@
       </p:sp>
       <p:sp>
         <p:nvSpPr>
-          <p:cNvPr id="174" name="Line 10"/>
+          <p:cNvPr id="179" name="Line 10"/>
           <p:cNvSpPr/>
           <p:nvPr/>
         </p:nvSpPr>
@@ -8431,7 +8672,7 @@
       </p:sp>
       <p:sp>
         <p:nvSpPr>
-          <p:cNvPr id="175" name="Line 11"/>
+          <p:cNvPr id="180" name="Line 11"/>
           <p:cNvSpPr/>
           <p:nvPr/>
         </p:nvSpPr>
@@ -8464,14 +8705,14 @@
       </p:sp>
       <p:sp>
         <p:nvSpPr>
-          <p:cNvPr id="176" name="CustomShape 12"/>
+          <p:cNvPr id="181" name="CustomShape 12"/>
           <p:cNvSpPr/>
           <p:nvPr/>
         </p:nvSpPr>
         <p:spPr>
           <a:xfrm>
             <a:off x="1224000" y="2735640"/>
-            <a:ext cx="114840" cy="503280"/>
+            <a:ext cx="114480" cy="502920"/>
           </a:xfrm>
           <a:custGeom>
             <a:avLst/>
@@ -8512,14 +8753,14 @@
       </p:sp>
       <p:sp>
         <p:nvSpPr>
-          <p:cNvPr id="177" name="CustomShape 13"/>
+          <p:cNvPr id="182" name="CustomShape 13"/>
           <p:cNvSpPr/>
           <p:nvPr/>
         </p:nvSpPr>
         <p:spPr>
           <a:xfrm>
             <a:off x="2088360" y="1584000"/>
-            <a:ext cx="1294560" cy="1222920"/>
+            <a:ext cx="1294200" cy="1222560"/>
           </a:xfrm>
           <a:prstGeom prst="ellipse">
             <a:avLst/>
@@ -8565,24 +8806,21 @@
               <a:t>Enviar pedido priorizado</a:t>
             </a:r>
             <a:endParaRPr b="0" lang="pt-BR" sz="1050" spc="-1" strike="noStrike">
-              <a:solidFill>
-                <a:srgbClr val="000000"/>
-              </a:solidFill>
-              <a:latin typeface="Arial"/>
-            </a:endParaRPr>
-          </a:p>
-        </p:txBody>
-      </p:sp>
-      <p:sp>
-        <p:nvSpPr>
-          <p:cNvPr id="178" name="CustomShape 14"/>
+              <a:latin typeface="Arial"/>
+            </a:endParaRPr>
+          </a:p>
+        </p:txBody>
+      </p:sp>
+      <p:sp>
+        <p:nvSpPr>
+          <p:cNvPr id="183" name="CustomShape 14"/>
           <p:cNvSpPr/>
           <p:nvPr/>
         </p:nvSpPr>
         <p:spPr>
           <a:xfrm flipH="1">
             <a:off x="1798560" y="2664000"/>
-            <a:ext cx="568440" cy="574920"/>
+            <a:ext cx="568080" cy="574560"/>
           </a:xfrm>
           <a:custGeom>
             <a:avLst/>
@@ -8624,14 +8862,14 @@
       </p:sp>
       <p:sp>
         <p:nvSpPr>
-          <p:cNvPr id="179" name="CustomShape 15"/>
+          <p:cNvPr id="184" name="CustomShape 15"/>
           <p:cNvSpPr/>
           <p:nvPr/>
         </p:nvSpPr>
         <p:spPr>
           <a:xfrm>
             <a:off x="1872000" y="1107000"/>
-            <a:ext cx="841320" cy="257040"/>
+            <a:ext cx="840960" cy="257040"/>
           </a:xfrm>
           <a:prstGeom prst="rect">
             <a:avLst/>
@@ -8705,14 +8943,14 @@
       </p:grpSpPr>
       <p:sp>
         <p:nvSpPr>
-          <p:cNvPr id="180" name="CustomShape 1"/>
+          <p:cNvPr id="185" name="CustomShape 1"/>
           <p:cNvSpPr/>
           <p:nvPr/>
         </p:nvSpPr>
         <p:spPr>
           <a:xfrm>
             <a:off x="156240" y="91080"/>
-            <a:ext cx="841320" cy="580680"/>
+            <a:ext cx="840960" cy="580320"/>
           </a:xfrm>
           <a:prstGeom prst="rect">
             <a:avLst/>
@@ -8779,14 +9017,14 @@
       </p:sp>
       <p:sp>
         <p:nvSpPr>
-          <p:cNvPr id="181" name="CustomShape 2"/>
+          <p:cNvPr id="186" name="CustomShape 2"/>
           <p:cNvSpPr/>
           <p:nvPr/>
         </p:nvSpPr>
         <p:spPr>
           <a:xfrm>
             <a:off x="270720" y="1271520"/>
-            <a:ext cx="997920" cy="811440"/>
+            <a:ext cx="997560" cy="811080"/>
           </a:xfrm>
           <a:prstGeom prst="ellipse">
             <a:avLst/>
@@ -8835,14 +9073,14 @@
       </p:sp>
       <p:sp>
         <p:nvSpPr>
-          <p:cNvPr id="182" name="CustomShape 3"/>
+          <p:cNvPr id="187" name="CustomShape 3"/>
           <p:cNvSpPr/>
           <p:nvPr/>
         </p:nvSpPr>
         <p:spPr>
           <a:xfrm>
             <a:off x="577800" y="673920"/>
-            <a:ext cx="190800" cy="595800"/>
+            <a:ext cx="190440" cy="595440"/>
           </a:xfrm>
           <a:custGeom>
             <a:avLst/>
@@ -8883,14 +9121,14 @@
       </p:sp>
       <p:sp>
         <p:nvSpPr>
-          <p:cNvPr id="183" name="CustomShape 4"/>
+          <p:cNvPr id="188" name="CustomShape 4"/>
           <p:cNvSpPr/>
           <p:nvPr/>
         </p:nvSpPr>
         <p:spPr>
           <a:xfrm>
             <a:off x="-44640" y="864720"/>
-            <a:ext cx="1362600" cy="211320"/>
+            <a:ext cx="1362240" cy="211320"/>
           </a:xfrm>
           <a:prstGeom prst="rect">
             <a:avLst/>
@@ -8934,7 +9172,7 @@
       </p:sp>
       <p:sp>
         <p:nvSpPr>
-          <p:cNvPr id="184" name="Line 5"/>
+          <p:cNvPr id="189" name="Line 5"/>
           <p:cNvSpPr/>
           <p:nvPr/>
         </p:nvSpPr>
@@ -8967,7 +9205,7 @@
       </p:sp>
       <p:sp>
         <p:nvSpPr>
-          <p:cNvPr id="185" name="Line 6"/>
+          <p:cNvPr id="190" name="Line 6"/>
           <p:cNvSpPr/>
           <p:nvPr/>
         </p:nvSpPr>
@@ -9000,14 +9238,14 @@
       </p:sp>
       <p:sp>
         <p:nvSpPr>
-          <p:cNvPr id="186" name="CustomShape 7"/>
+          <p:cNvPr id="191" name="CustomShape 7"/>
           <p:cNvSpPr/>
           <p:nvPr/>
         </p:nvSpPr>
         <p:spPr>
           <a:xfrm>
             <a:off x="770760" y="2084760"/>
-            <a:ext cx="157680" cy="689760"/>
+            <a:ext cx="157320" cy="689400"/>
           </a:xfrm>
           <a:custGeom>
             <a:avLst/>
@@ -9048,14 +9286,14 @@
       </p:sp>
       <p:sp>
         <p:nvSpPr>
-          <p:cNvPr id="187" name="CustomShape 8"/>
+          <p:cNvPr id="192" name="CustomShape 8"/>
           <p:cNvSpPr/>
           <p:nvPr/>
         </p:nvSpPr>
         <p:spPr>
           <a:xfrm>
             <a:off x="325440" y="2939400"/>
-            <a:ext cx="1314720" cy="211320"/>
+            <a:ext cx="1314360" cy="211320"/>
           </a:xfrm>
           <a:prstGeom prst="rect">
             <a:avLst/>
@@ -9099,7 +9337,7 @@
       </p:sp>
       <p:sp>
         <p:nvSpPr>
-          <p:cNvPr id="188" name="Line 9"/>
+          <p:cNvPr id="193" name="Line 9"/>
           <p:cNvSpPr/>
           <p:nvPr/>
         </p:nvSpPr>
@@ -9132,14 +9370,14 @@
       </p:sp>
       <p:sp>
         <p:nvSpPr>
-          <p:cNvPr id="189" name="CustomShape 10"/>
+          <p:cNvPr id="194" name="CustomShape 10"/>
           <p:cNvSpPr/>
           <p:nvPr/>
         </p:nvSpPr>
         <p:spPr>
           <a:xfrm>
             <a:off x="2090520" y="2924280"/>
-            <a:ext cx="972720" cy="211320"/>
+            <a:ext cx="972360" cy="211320"/>
           </a:xfrm>
           <a:prstGeom prst="rect">
             <a:avLst/>
@@ -9183,14 +9421,14 @@
       </p:sp>
       <p:sp>
         <p:nvSpPr>
-          <p:cNvPr id="190" name="CustomShape 11"/>
+          <p:cNvPr id="195" name="CustomShape 11"/>
           <p:cNvSpPr/>
           <p:nvPr/>
         </p:nvSpPr>
         <p:spPr>
           <a:xfrm>
             <a:off x="3184200" y="177480"/>
-            <a:ext cx="841320" cy="580680"/>
+            <a:ext cx="840960" cy="580320"/>
           </a:xfrm>
           <a:prstGeom prst="rect">
             <a:avLst/>
@@ -9257,14 +9495,14 @@
       </p:sp>
       <p:sp>
         <p:nvSpPr>
-          <p:cNvPr id="191" name="CustomShape 12"/>
+          <p:cNvPr id="196" name="CustomShape 12"/>
           <p:cNvSpPr/>
           <p:nvPr/>
         </p:nvSpPr>
         <p:spPr>
           <a:xfrm>
             <a:off x="2892600" y="1319400"/>
-            <a:ext cx="873000" cy="763560"/>
+            <a:ext cx="872640" cy="763200"/>
           </a:xfrm>
           <a:prstGeom prst="ellipse">
             <a:avLst/>
@@ -9313,14 +9551,14 @@
       </p:sp>
       <p:sp>
         <p:nvSpPr>
-          <p:cNvPr id="192" name="CustomShape 13"/>
+          <p:cNvPr id="197" name="CustomShape 13"/>
           <p:cNvSpPr/>
           <p:nvPr/>
         </p:nvSpPr>
         <p:spPr>
           <a:xfrm flipV="1">
             <a:off x="3330000" y="757800"/>
-            <a:ext cx="273960" cy="557640"/>
+            <a:ext cx="273600" cy="557280"/>
           </a:xfrm>
           <a:custGeom>
             <a:avLst/>
@@ -9361,7 +9599,7 @@
       </p:sp>
       <p:sp>
         <p:nvSpPr>
-          <p:cNvPr id="193" name="Line 14"/>
+          <p:cNvPr id="198" name="Line 14"/>
           <p:cNvSpPr/>
           <p:nvPr/>
         </p:nvSpPr>
@@ -9394,7 +9632,7 @@
       </p:sp>
       <p:sp>
         <p:nvSpPr>
-          <p:cNvPr id="194" name="Line 15"/>
+          <p:cNvPr id="199" name="Line 15"/>
           <p:cNvSpPr/>
           <p:nvPr/>
         </p:nvSpPr>
@@ -9427,14 +9665,14 @@
       </p:sp>
       <p:sp>
         <p:nvSpPr>
-          <p:cNvPr id="195" name="CustomShape 16"/>
+          <p:cNvPr id="200" name="CustomShape 16"/>
           <p:cNvSpPr/>
           <p:nvPr/>
         </p:nvSpPr>
         <p:spPr>
           <a:xfrm>
             <a:off x="4329360" y="2892960"/>
-            <a:ext cx="788040" cy="333000"/>
+            <a:ext cx="787680" cy="333000"/>
           </a:xfrm>
           <a:prstGeom prst="rect">
             <a:avLst/>
@@ -9478,14 +9716,14 @@
       </p:sp>
       <p:sp>
         <p:nvSpPr>
-          <p:cNvPr id="196" name="CustomShape 17"/>
+          <p:cNvPr id="201" name="CustomShape 17"/>
           <p:cNvSpPr/>
           <p:nvPr/>
         </p:nvSpPr>
         <p:spPr>
           <a:xfrm>
             <a:off x="4267080" y="4548960"/>
-            <a:ext cx="1077480" cy="684720"/>
+            <a:ext cx="1077120" cy="684360"/>
           </a:xfrm>
           <a:prstGeom prst="ellipse">
             <a:avLst/>
@@ -9534,14 +9772,14 @@
       </p:sp>
       <p:sp>
         <p:nvSpPr>
-          <p:cNvPr id="197" name="CustomShape 18"/>
+          <p:cNvPr id="202" name="CustomShape 18"/>
           <p:cNvSpPr/>
           <p:nvPr/>
         </p:nvSpPr>
         <p:spPr>
           <a:xfrm flipH="1" flipV="1">
-            <a:off x="4139280" y="3318120"/>
-            <a:ext cx="438840" cy="1269720"/>
+            <a:off x="4138920" y="3318120"/>
+            <a:ext cx="438480" cy="1269360"/>
           </a:xfrm>
           <a:custGeom>
             <a:avLst/>
@@ -9583,14 +9821,14 @@
       </p:sp>
       <p:sp>
         <p:nvSpPr>
-          <p:cNvPr id="198" name="CustomShape 19"/>
+          <p:cNvPr id="203" name="CustomShape 19"/>
           <p:cNvSpPr/>
           <p:nvPr/>
         </p:nvSpPr>
         <p:spPr>
           <a:xfrm>
             <a:off x="2676240" y="736920"/>
-            <a:ext cx="841320" cy="454680"/>
+            <a:ext cx="840960" cy="454680"/>
           </a:xfrm>
           <a:prstGeom prst="rect">
             <a:avLst/>
@@ -9634,14 +9872,14 @@
       </p:sp>
       <p:sp>
         <p:nvSpPr>
-          <p:cNvPr id="199" name="CustomShape 20"/>
+          <p:cNvPr id="204" name="CustomShape 20"/>
           <p:cNvSpPr/>
           <p:nvPr/>
         </p:nvSpPr>
         <p:spPr>
           <a:xfrm flipH="1">
             <a:off x="1384200" y="1702080"/>
-            <a:ext cx="1504440" cy="1098000"/>
+            <a:ext cx="1504080" cy="1097640"/>
           </a:xfrm>
           <a:custGeom>
             <a:avLst/>
@@ -9683,7 +9921,7 @@
       </p:sp>
       <p:sp>
         <p:nvSpPr>
-          <p:cNvPr id="200" name="Line 21"/>
+          <p:cNvPr id="205" name="Line 21"/>
           <p:cNvSpPr/>
           <p:nvPr/>
         </p:nvSpPr>
@@ -9716,14 +9954,14 @@
       </p:sp>
       <p:sp>
         <p:nvSpPr>
-          <p:cNvPr id="201" name="CustomShape 22"/>
+          <p:cNvPr id="206" name="CustomShape 22"/>
           <p:cNvSpPr/>
           <p:nvPr/>
         </p:nvSpPr>
         <p:spPr>
           <a:xfrm>
             <a:off x="3161520" y="2861280"/>
-            <a:ext cx="1202760" cy="333000"/>
+            <a:ext cx="1202400" cy="333000"/>
           </a:xfrm>
           <a:prstGeom prst="rect">
             <a:avLst/>
@@ -9767,14 +10005,14 @@
       </p:sp>
       <p:sp>
         <p:nvSpPr>
-          <p:cNvPr id="202" name="CustomShape 23"/>
+          <p:cNvPr id="207" name="CustomShape 23"/>
           <p:cNvSpPr/>
           <p:nvPr/>
         </p:nvSpPr>
         <p:spPr>
           <a:xfrm>
             <a:off x="3119760" y="3897720"/>
-            <a:ext cx="1077480" cy="684720"/>
+            <a:ext cx="1077120" cy="684360"/>
           </a:xfrm>
           <a:prstGeom prst="ellipse">
             <a:avLst/>
@@ -9823,14 +10061,14 @@
       </p:sp>
       <p:sp>
         <p:nvSpPr>
-          <p:cNvPr id="203" name="CustomShape 24"/>
+          <p:cNvPr id="208" name="CustomShape 24"/>
           <p:cNvSpPr/>
           <p:nvPr/>
         </p:nvSpPr>
         <p:spPr>
           <a:xfrm flipV="1">
-            <a:off x="3659400" y="3303360"/>
-            <a:ext cx="106200" cy="591120"/>
+            <a:off x="3659400" y="3302640"/>
+            <a:ext cx="105840" cy="590760"/>
           </a:xfrm>
           <a:custGeom>
             <a:avLst/>
@@ -9872,14 +10110,14 @@
       </p:sp>
       <p:sp>
         <p:nvSpPr>
-          <p:cNvPr id="204" name="CustomShape 25"/>
+          <p:cNvPr id="209" name="CustomShape 25"/>
           <p:cNvSpPr/>
           <p:nvPr/>
         </p:nvSpPr>
         <p:spPr>
           <a:xfrm flipH="1" flipV="1">
             <a:off x="3327840" y="2082600"/>
-            <a:ext cx="390600" cy="715320"/>
+            <a:ext cx="390240" cy="714960"/>
           </a:xfrm>
           <a:custGeom>
             <a:avLst/>
@@ -9921,14 +10159,14 @@
       </p:sp>
       <p:sp>
         <p:nvSpPr>
-          <p:cNvPr id="205" name="CustomShape 26"/>
+          <p:cNvPr id="210" name="CustomShape 26"/>
           <p:cNvSpPr/>
           <p:nvPr/>
         </p:nvSpPr>
         <p:spPr>
           <a:xfrm flipH="1" flipV="1">
-            <a:off x="2574360" y="3286440"/>
-            <a:ext cx="698400" cy="708120"/>
+            <a:off x="2573280" y="3286440"/>
+            <a:ext cx="698040" cy="707760"/>
           </a:xfrm>
           <a:custGeom>
             <a:avLst/>
@@ -9970,14 +10208,14 @@
       </p:sp>
       <p:sp>
         <p:nvSpPr>
-          <p:cNvPr id="206" name="CustomShape 27"/>
+          <p:cNvPr id="211" name="CustomShape 27"/>
           <p:cNvSpPr/>
           <p:nvPr/>
         </p:nvSpPr>
         <p:spPr>
           <a:xfrm flipV="1">
-            <a:off x="3904920" y="3318480"/>
-            <a:ext cx="540360" cy="542160"/>
+            <a:off x="3904920" y="3317760"/>
+            <a:ext cx="540000" cy="541800"/>
           </a:xfrm>
           <a:custGeom>
             <a:avLst/>
@@ -10019,7 +10257,7 @@
       </p:sp>
       <p:sp>
         <p:nvSpPr>
-          <p:cNvPr id="207" name="Line 28"/>
+          <p:cNvPr id="212" name="Line 28"/>
           <p:cNvSpPr/>
           <p:nvPr/>
         </p:nvSpPr>
@@ -10052,7 +10290,7 @@
       </p:sp>
       <p:sp>
         <p:nvSpPr>
-          <p:cNvPr id="208" name="Line 29"/>
+          <p:cNvPr id="213" name="Line 29"/>
           <p:cNvSpPr/>
           <p:nvPr/>
         </p:nvSpPr>
@@ -10085,14 +10323,14 @@
       </p:sp>
       <p:sp>
         <p:nvSpPr>
-          <p:cNvPr id="209" name="CustomShape 30"/>
+          <p:cNvPr id="214" name="CustomShape 30"/>
           <p:cNvSpPr/>
           <p:nvPr/>
         </p:nvSpPr>
         <p:spPr>
           <a:xfrm>
             <a:off x="5222520" y="2901240"/>
-            <a:ext cx="718200" cy="333000"/>
+            <a:ext cx="717840" cy="333000"/>
           </a:xfrm>
           <a:prstGeom prst="rect">
             <a:avLst/>
@@ -10136,14 +10374,14 @@
       </p:sp>
       <p:sp>
         <p:nvSpPr>
-          <p:cNvPr id="210" name="CustomShape 31"/>
+          <p:cNvPr id="215" name="CustomShape 31"/>
           <p:cNvSpPr/>
           <p:nvPr/>
         </p:nvSpPr>
         <p:spPr>
           <a:xfrm>
             <a:off x="4726800" y="3331080"/>
-            <a:ext cx="78120" cy="1216080"/>
+            <a:ext cx="77760" cy="1215720"/>
           </a:xfrm>
           <a:custGeom>
             <a:avLst/>
@@ -10184,14 +10422,14 @@
       </p:sp>
       <p:sp>
         <p:nvSpPr>
-          <p:cNvPr id="211" name="CustomShape 32"/>
+          <p:cNvPr id="216" name="CustomShape 32"/>
           <p:cNvSpPr/>
           <p:nvPr/>
         </p:nvSpPr>
         <p:spPr>
           <a:xfrm>
             <a:off x="5470560" y="4287600"/>
-            <a:ext cx="1077480" cy="684720"/>
+            <a:ext cx="1077120" cy="684360"/>
           </a:xfrm>
           <a:prstGeom prst="ellipse">
             <a:avLst/>
@@ -10240,14 +10478,14 @@
       </p:sp>
       <p:sp>
         <p:nvSpPr>
-          <p:cNvPr id="212" name="CustomShape 33"/>
+          <p:cNvPr id="217" name="CustomShape 33"/>
           <p:cNvSpPr/>
           <p:nvPr/>
         </p:nvSpPr>
         <p:spPr>
           <a:xfrm>
             <a:off x="4930920" y="3388320"/>
-            <a:ext cx="695880" cy="997920"/>
+            <a:ext cx="695520" cy="997560"/>
           </a:xfrm>
           <a:custGeom>
             <a:avLst/>
@@ -10289,7 +10527,7 @@
       </p:sp>
       <p:sp>
         <p:nvSpPr>
-          <p:cNvPr id="213" name="Line 34"/>
+          <p:cNvPr id="218" name="Line 34"/>
           <p:cNvSpPr/>
           <p:nvPr/>
         </p:nvSpPr>
@@ -10322,7 +10560,7 @@
       </p:sp>
       <p:sp>
         <p:nvSpPr>
-          <p:cNvPr id="214" name="Line 35"/>
+          <p:cNvPr id="219" name="Line 35"/>
           <p:cNvSpPr/>
           <p:nvPr/>
         </p:nvSpPr>
@@ -10355,14 +10593,14 @@
       </p:sp>
       <p:sp>
         <p:nvSpPr>
-          <p:cNvPr id="215" name="CustomShape 36"/>
+          <p:cNvPr id="220" name="CustomShape 36"/>
           <p:cNvSpPr/>
           <p:nvPr/>
         </p:nvSpPr>
         <p:spPr>
           <a:xfrm>
             <a:off x="6766920" y="4044960"/>
-            <a:ext cx="890280" cy="684720"/>
+            <a:ext cx="889920" cy="684360"/>
           </a:xfrm>
           <a:prstGeom prst="ellipse">
             <a:avLst/>
@@ -10411,14 +10649,14 @@
       </p:sp>
       <p:sp>
         <p:nvSpPr>
-          <p:cNvPr id="216" name="CustomShape 37"/>
+          <p:cNvPr id="221" name="CustomShape 37"/>
           <p:cNvSpPr/>
           <p:nvPr/>
         </p:nvSpPr>
         <p:spPr>
           <a:xfrm>
             <a:off x="7795440" y="4255560"/>
-            <a:ext cx="890280" cy="684720"/>
+            <a:ext cx="889920" cy="684360"/>
           </a:xfrm>
           <a:prstGeom prst="ellipse">
             <a:avLst/>
@@ -10467,14 +10705,14 @@
       </p:sp>
       <p:sp>
         <p:nvSpPr>
-          <p:cNvPr id="217" name="CustomShape 38"/>
+          <p:cNvPr id="222" name="CustomShape 38"/>
           <p:cNvSpPr/>
           <p:nvPr/>
         </p:nvSpPr>
         <p:spPr>
           <a:xfrm>
             <a:off x="5731560" y="3331080"/>
-            <a:ext cx="276480" cy="954720"/>
+            <a:ext cx="276120" cy="954360"/>
           </a:xfrm>
           <a:custGeom>
             <a:avLst/>
@@ -10516,7 +10754,7 @@
       </p:sp>
       <p:sp>
         <p:nvSpPr>
-          <p:cNvPr id="218" name="Line 39"/>
+          <p:cNvPr id="223" name="Line 39"/>
           <p:cNvSpPr/>
           <p:nvPr/>
         </p:nvSpPr>
@@ -10549,7 +10787,7 @@
       </p:sp>
       <p:sp>
         <p:nvSpPr>
-          <p:cNvPr id="219" name="Line 40"/>
+          <p:cNvPr id="224" name="Line 40"/>
           <p:cNvSpPr/>
           <p:nvPr/>
         </p:nvSpPr>
@@ -10582,14 +10820,14 @@
       </p:sp>
       <p:sp>
         <p:nvSpPr>
-          <p:cNvPr id="220" name="CustomShape 41"/>
+          <p:cNvPr id="225" name="CustomShape 41"/>
           <p:cNvSpPr/>
           <p:nvPr/>
         </p:nvSpPr>
         <p:spPr>
           <a:xfrm>
             <a:off x="5942160" y="2930760"/>
-            <a:ext cx="1029240" cy="333000"/>
+            <a:ext cx="1028880" cy="333000"/>
           </a:xfrm>
           <a:prstGeom prst="rect">
             <a:avLst/>
@@ -10633,7 +10871,7 @@
       </p:sp>
       <p:sp>
         <p:nvSpPr>
-          <p:cNvPr id="221" name="Line 42"/>
+          <p:cNvPr id="226" name="Line 42"/>
           <p:cNvSpPr/>
           <p:nvPr/>
         </p:nvSpPr>
@@ -10666,7 +10904,7 @@
       </p:sp>
       <p:sp>
         <p:nvSpPr>
-          <p:cNvPr id="222" name="Line 43"/>
+          <p:cNvPr id="227" name="Line 43"/>
           <p:cNvSpPr/>
           <p:nvPr/>
         </p:nvSpPr>
@@ -10699,14 +10937,14 @@
       </p:sp>
       <p:sp>
         <p:nvSpPr>
-          <p:cNvPr id="223" name="CustomShape 44"/>
+          <p:cNvPr id="228" name="CustomShape 44"/>
           <p:cNvSpPr/>
           <p:nvPr/>
         </p:nvSpPr>
         <p:spPr>
           <a:xfrm>
             <a:off x="7027920" y="2944800"/>
-            <a:ext cx="1029240" cy="333000"/>
+            <a:ext cx="1028880" cy="333000"/>
           </a:xfrm>
           <a:prstGeom prst="rect">
             <a:avLst/>
@@ -10750,14 +10988,14 @@
       </p:sp>
       <p:sp>
         <p:nvSpPr>
-          <p:cNvPr id="224" name="CustomShape 45"/>
+          <p:cNvPr id="229" name="CustomShape 45"/>
           <p:cNvSpPr/>
           <p:nvPr/>
         </p:nvSpPr>
         <p:spPr>
           <a:xfrm flipH="1">
-            <a:off x="4848120" y="1698840"/>
-            <a:ext cx="1375920" cy="1092960"/>
+            <a:off x="4847400" y="1698840"/>
+            <a:ext cx="1375560" cy="1092600"/>
           </a:xfrm>
           <a:custGeom>
             <a:avLst/>
@@ -10799,14 +11037,14 @@
       </p:sp>
       <p:sp>
         <p:nvSpPr>
-          <p:cNvPr id="225" name="CustomShape 46"/>
+          <p:cNvPr id="230" name="CustomShape 46"/>
           <p:cNvSpPr/>
           <p:nvPr/>
         </p:nvSpPr>
         <p:spPr>
           <a:xfrm>
             <a:off x="6607440" y="1779480"/>
-            <a:ext cx="360" cy="1048680"/>
+            <a:ext cx="360" cy="1048320"/>
           </a:xfrm>
           <a:custGeom>
             <a:avLst/>
@@ -10848,14 +11086,14 @@
       </p:sp>
       <p:sp>
         <p:nvSpPr>
-          <p:cNvPr id="226" name="CustomShape 47"/>
+          <p:cNvPr id="231" name="CustomShape 47"/>
           <p:cNvSpPr/>
           <p:nvPr/>
         </p:nvSpPr>
         <p:spPr>
           <a:xfrm>
             <a:off x="6998040" y="1677960"/>
-            <a:ext cx="482400" cy="1066680"/>
+            <a:ext cx="482040" cy="1066320"/>
           </a:xfrm>
           <a:custGeom>
             <a:avLst/>
@@ -10897,14 +11135,14 @@
       </p:sp>
       <p:sp>
         <p:nvSpPr>
-          <p:cNvPr id="227" name="CustomShape 48"/>
+          <p:cNvPr id="232" name="CustomShape 48"/>
           <p:cNvSpPr/>
           <p:nvPr/>
         </p:nvSpPr>
         <p:spPr>
           <a:xfrm>
             <a:off x="5871240" y="704520"/>
-            <a:ext cx="1384560" cy="978840"/>
+            <a:ext cx="1384200" cy="978480"/>
           </a:xfrm>
           <a:prstGeom prst="ellipse">
             <a:avLst/>
@@ -10953,7 +11191,7 @@
       </p:sp>
       <p:sp>
         <p:nvSpPr>
-          <p:cNvPr id="228" name="Line 49"/>
+          <p:cNvPr id="233" name="Line 49"/>
           <p:cNvSpPr/>
           <p:nvPr/>
         </p:nvSpPr>
@@ -10986,7 +11224,7 @@
       </p:sp>
       <p:sp>
         <p:nvSpPr>
-          <p:cNvPr id="229" name="Line 50"/>
+          <p:cNvPr id="234" name="Line 50"/>
           <p:cNvSpPr/>
           <p:nvPr/>
         </p:nvSpPr>
@@ -11019,14 +11257,14 @@
       </p:sp>
       <p:sp>
         <p:nvSpPr>
-          <p:cNvPr id="230" name="CustomShape 51"/>
+          <p:cNvPr id="235" name="CustomShape 51"/>
           <p:cNvSpPr/>
           <p:nvPr/>
         </p:nvSpPr>
         <p:spPr>
           <a:xfrm>
             <a:off x="8078760" y="2955600"/>
-            <a:ext cx="795960" cy="333000"/>
+            <a:ext cx="795600" cy="333000"/>
           </a:xfrm>
           <a:prstGeom prst="rect">
             <a:avLst/>
@@ -11070,14 +11308,14 @@
       </p:sp>
       <p:sp>
         <p:nvSpPr>
-          <p:cNvPr id="231" name="CustomShape 52"/>
+          <p:cNvPr id="236" name="CustomShape 52"/>
           <p:cNvSpPr/>
           <p:nvPr/>
         </p:nvSpPr>
         <p:spPr>
           <a:xfrm>
             <a:off x="5868000" y="3349080"/>
-            <a:ext cx="897120" cy="875160"/>
+            <a:ext cx="896760" cy="874800"/>
           </a:xfrm>
           <a:custGeom>
             <a:avLst/>
@@ -11119,14 +11357,14 @@
       </p:sp>
       <p:sp>
         <p:nvSpPr>
-          <p:cNvPr id="232" name="CustomShape 53"/>
+          <p:cNvPr id="237" name="CustomShape 53"/>
           <p:cNvSpPr/>
           <p:nvPr/>
         </p:nvSpPr>
         <p:spPr>
           <a:xfrm>
             <a:off x="6607440" y="3335760"/>
-            <a:ext cx="439920" cy="649080"/>
+            <a:ext cx="439560" cy="648720"/>
           </a:xfrm>
           <a:custGeom>
             <a:avLst/>
@@ -11168,14 +11406,14 @@
       </p:sp>
       <p:sp>
         <p:nvSpPr>
-          <p:cNvPr id="233" name="CustomShape 54"/>
+          <p:cNvPr id="238" name="CustomShape 54"/>
           <p:cNvSpPr/>
           <p:nvPr/>
         </p:nvSpPr>
         <p:spPr>
           <a:xfrm>
             <a:off x="7538040" y="3388320"/>
-            <a:ext cx="468720" cy="835560"/>
+            <a:ext cx="468360" cy="835200"/>
           </a:xfrm>
           <a:custGeom>
             <a:avLst/>
@@ -11217,14 +11455,14 @@
       </p:sp>
       <p:sp>
         <p:nvSpPr>
-          <p:cNvPr id="234" name="CustomShape 55"/>
+          <p:cNvPr id="239" name="CustomShape 55"/>
           <p:cNvSpPr/>
           <p:nvPr/>
         </p:nvSpPr>
         <p:spPr>
           <a:xfrm flipH="1">
-            <a:off x="8316720" y="3388320"/>
-            <a:ext cx="110160" cy="835560"/>
+            <a:off x="8316000" y="3388320"/>
+            <a:ext cx="109800" cy="835200"/>
           </a:xfrm>
           <a:custGeom>
             <a:avLst/>
@@ -11266,7 +11504,7 @@
       </p:sp>
       <p:sp>
         <p:nvSpPr>
-          <p:cNvPr id="235" name="Line 56"/>
+          <p:cNvPr id="240" name="Line 56"/>
           <p:cNvSpPr/>
           <p:nvPr/>
         </p:nvSpPr>
@@ -11299,7 +11537,7 @@
       </p:sp>
       <p:sp>
         <p:nvSpPr>
-          <p:cNvPr id="236" name="Line 57"/>
+          <p:cNvPr id="241" name="Line 57"/>
           <p:cNvSpPr/>
           <p:nvPr/>
         </p:nvSpPr>
@@ -11332,14 +11570,14 @@
       </p:sp>
       <p:sp>
         <p:nvSpPr>
-          <p:cNvPr id="237" name="CustomShape 58"/>
+          <p:cNvPr id="242" name="CustomShape 58"/>
           <p:cNvSpPr/>
           <p:nvPr/>
         </p:nvSpPr>
         <p:spPr>
           <a:xfrm>
             <a:off x="8957520" y="2930760"/>
-            <a:ext cx="795960" cy="333000"/>
+            <a:ext cx="795600" cy="333000"/>
           </a:xfrm>
           <a:prstGeom prst="rect">
             <a:avLst/>
@@ -11383,14 +11621,14 @@
       </p:sp>
       <p:sp>
         <p:nvSpPr>
-          <p:cNvPr id="238" name="CustomShape 59"/>
+          <p:cNvPr id="243" name="CustomShape 59"/>
           <p:cNvSpPr/>
           <p:nvPr/>
         </p:nvSpPr>
         <p:spPr>
           <a:xfrm>
             <a:off x="8199720" y="1062000"/>
-            <a:ext cx="1127520" cy="978840"/>
+            <a:ext cx="1127160" cy="978480"/>
           </a:xfrm>
           <a:prstGeom prst="ellipse">
             <a:avLst/>
@@ -11439,14 +11677,14 @@
       </p:sp>
       <p:sp>
         <p:nvSpPr>
-          <p:cNvPr id="239" name="CustomShape 60"/>
+          <p:cNvPr id="244" name="CustomShape 60"/>
           <p:cNvSpPr/>
           <p:nvPr/>
         </p:nvSpPr>
         <p:spPr>
           <a:xfrm flipV="1">
-            <a:off x="7733880" y="1895040"/>
-            <a:ext cx="629280" cy="813960"/>
+            <a:off x="7733880" y="1894680"/>
+            <a:ext cx="628920" cy="813600"/>
           </a:xfrm>
           <a:custGeom>
             <a:avLst/>
@@ -11488,14 +11726,14 @@
       </p:sp>
       <p:sp>
         <p:nvSpPr>
-          <p:cNvPr id="240" name="CustomShape 61"/>
+          <p:cNvPr id="245" name="CustomShape 61"/>
           <p:cNvSpPr/>
           <p:nvPr/>
         </p:nvSpPr>
         <p:spPr>
           <a:xfrm flipV="1">
             <a:off x="8609040" y="2040480"/>
-            <a:ext cx="153720" cy="785160"/>
+            <a:ext cx="153360" cy="784800"/>
           </a:xfrm>
           <a:custGeom>
             <a:avLst/>
@@ -11537,14 +11775,14 @@
       </p:sp>
       <p:sp>
         <p:nvSpPr>
-          <p:cNvPr id="241" name="CustomShape 62"/>
+          <p:cNvPr id="246" name="CustomShape 62"/>
           <p:cNvSpPr/>
           <p:nvPr/>
         </p:nvSpPr>
         <p:spPr>
           <a:xfrm flipH="1" flipV="1">
-            <a:off x="9162360" y="1897560"/>
-            <a:ext cx="190800" cy="949680"/>
+            <a:off x="9161640" y="1896840"/>
+            <a:ext cx="190440" cy="949320"/>
           </a:xfrm>
           <a:custGeom>
             <a:avLst/>
@@ -11586,7 +11824,7 @@
       </p:sp>
       <p:sp>
         <p:nvSpPr>
-          <p:cNvPr id="242" name="CustomShape 63"/>
+          <p:cNvPr id="247" name="CustomShape 63"/>
           <p:cNvSpPr/>
           <p:nvPr/>
         </p:nvSpPr>

</xml_diff>

<commit_message>
Mudanças no artefato 18 17 16
</commit_message>
<xml_diff>
--- a/Artefatos/16-DFD Essencial para cada capacidade.pptx
+++ b/Artefatos/16-DFD Essencial para cada capacidade.pptx
@@ -69,7 +69,7 @@
         <p:spPr>
           <a:xfrm>
             <a:off x="692640" y="375480"/>
-            <a:ext cx="8690040" cy="946800"/>
+            <a:ext cx="8689680" cy="946800"/>
           </a:xfrm>
           <a:prstGeom prst="rect">
             <a:avLst/>
@@ -182,7 +182,7 @@
         <p:spPr>
           <a:xfrm>
             <a:off x="692640" y="375480"/>
-            <a:ext cx="8690040" cy="946800"/>
+            <a:ext cx="8689680" cy="946800"/>
           </a:xfrm>
           <a:prstGeom prst="rect">
             <a:avLst/>
@@ -355,7 +355,7 @@
         <p:spPr>
           <a:xfrm>
             <a:off x="692640" y="375480"/>
-            <a:ext cx="8690040" cy="946800"/>
+            <a:ext cx="8689680" cy="946800"/>
           </a:xfrm>
           <a:prstGeom prst="rect">
             <a:avLst/>
@@ -588,7 +588,7 @@
         <p:spPr>
           <a:xfrm>
             <a:off x="692640" y="375480"/>
-            <a:ext cx="8690040" cy="946800"/>
+            <a:ext cx="8689680" cy="946800"/>
           </a:xfrm>
           <a:prstGeom prst="rect">
             <a:avLst/>
@@ -672,7 +672,7 @@
         <p:spPr>
           <a:xfrm>
             <a:off x="692640" y="375480"/>
-            <a:ext cx="8690040" cy="946800"/>
+            <a:ext cx="8689680" cy="946800"/>
           </a:xfrm>
           <a:prstGeom prst="rect">
             <a:avLst/>
@@ -755,7 +755,7 @@
         <p:spPr>
           <a:xfrm>
             <a:off x="692640" y="375480"/>
-            <a:ext cx="8690040" cy="946800"/>
+            <a:ext cx="8689680" cy="946800"/>
           </a:xfrm>
           <a:prstGeom prst="rect">
             <a:avLst/>
@@ -868,7 +868,7 @@
         <p:spPr>
           <a:xfrm>
             <a:off x="692640" y="375480"/>
-            <a:ext cx="8690040" cy="946800"/>
+            <a:ext cx="8689680" cy="946800"/>
           </a:xfrm>
           <a:prstGeom prst="rect">
             <a:avLst/>
@@ -921,7 +921,7 @@
         <p:spPr>
           <a:xfrm>
             <a:off x="692640" y="375480"/>
-            <a:ext cx="8690040" cy="4390200"/>
+            <a:ext cx="8689680" cy="4390200"/>
           </a:xfrm>
           <a:prstGeom prst="rect">
             <a:avLst/>
@@ -974,7 +974,7 @@
         <p:spPr>
           <a:xfrm>
             <a:off x="692640" y="375480"/>
-            <a:ext cx="8690040" cy="946800"/>
+            <a:ext cx="8689680" cy="946800"/>
           </a:xfrm>
           <a:prstGeom prst="rect">
             <a:avLst/>
@@ -1117,7 +1117,7 @@
         <p:spPr>
           <a:xfrm>
             <a:off x="692640" y="375480"/>
-            <a:ext cx="8690040" cy="946800"/>
+            <a:ext cx="8689680" cy="946800"/>
           </a:xfrm>
           <a:prstGeom prst="rect">
             <a:avLst/>
@@ -1260,7 +1260,7 @@
         <p:spPr>
           <a:xfrm>
             <a:off x="692640" y="375480"/>
-            <a:ext cx="8690040" cy="946800"/>
+            <a:ext cx="8689680" cy="946800"/>
           </a:xfrm>
           <a:prstGeom prst="rect">
             <a:avLst/>
@@ -1410,7 +1410,7 @@
         <p:spPr>
           <a:xfrm>
             <a:off x="692640" y="375480"/>
-            <a:ext cx="8690040" cy="946800"/>
+            <a:ext cx="8689680" cy="946800"/>
           </a:xfrm>
           <a:prstGeom prst="rect">
             <a:avLst/>
@@ -1658,7 +1658,7 @@
         <p:spPr>
           <a:xfrm>
             <a:off x="471960" y="226440"/>
-            <a:ext cx="951120" cy="759240"/>
+            <a:ext cx="950760" cy="758880"/>
           </a:xfrm>
           <a:prstGeom prst="rect">
             <a:avLst/>
@@ -1732,7 +1732,7 @@
         <p:spPr>
           <a:xfrm>
             <a:off x="432000" y="1729440"/>
-            <a:ext cx="1253880" cy="1060560"/>
+            <a:ext cx="1253520" cy="1060200"/>
           </a:xfrm>
           <a:prstGeom prst="ellipse">
             <a:avLst/>
@@ -1792,7 +1792,7 @@
         <p:spPr>
           <a:xfrm>
             <a:off x="948960" y="988200"/>
-            <a:ext cx="172080" cy="738720"/>
+            <a:ext cx="171720" cy="738360"/>
           </a:xfrm>
           <a:custGeom>
             <a:avLst/>
@@ -1840,7 +1840,7 @@
         <p:spPr>
           <a:xfrm>
             <a:off x="-67680" y="1195920"/>
-            <a:ext cx="1361880" cy="394200"/>
+            <a:ext cx="1361520" cy="394200"/>
           </a:xfrm>
           <a:prstGeom prst="rect">
             <a:avLst/>
@@ -1924,7 +1924,7 @@
         <p:spPr>
           <a:xfrm>
             <a:off x="1123200" y="2792520"/>
-            <a:ext cx="360" cy="660960"/>
+            <a:ext cx="360" cy="660600"/>
           </a:xfrm>
           <a:custGeom>
             <a:avLst/>
@@ -1972,7 +1972,7 @@
         <p:spPr>
           <a:xfrm>
             <a:off x="324360" y="3565080"/>
-            <a:ext cx="1671480" cy="454680"/>
+            <a:ext cx="1671120" cy="454680"/>
           </a:xfrm>
           <a:prstGeom prst="rect">
             <a:avLst/>
@@ -2043,7 +2043,7 @@
         <p:spPr>
           <a:xfrm>
             <a:off x="6912000" y="85680"/>
-            <a:ext cx="2806200" cy="638280"/>
+            <a:ext cx="2805840" cy="638280"/>
           </a:xfrm>
           <a:prstGeom prst="rect">
             <a:avLst/>
@@ -2127,7 +2127,7 @@
         <p:spPr>
           <a:xfrm>
             <a:off x="2448000" y="1656000"/>
-            <a:ext cx="1222200" cy="1078200"/>
+            <a:ext cx="1221840" cy="1077840"/>
           </a:xfrm>
           <a:prstGeom prst="ellipse">
             <a:avLst/>
@@ -2187,7 +2187,7 @@
         <p:spPr>
           <a:xfrm flipH="1">
             <a:off x="1588320" y="2592000"/>
-            <a:ext cx="1143720" cy="846000"/>
+            <a:ext cx="1143360" cy="845640"/>
           </a:xfrm>
           <a:custGeom>
             <a:avLst/>
@@ -2236,7 +2236,7 @@
         <p:spPr>
           <a:xfrm>
             <a:off x="2088000" y="1056960"/>
-            <a:ext cx="840600" cy="454680"/>
+            <a:ext cx="840240" cy="454680"/>
           </a:xfrm>
           <a:prstGeom prst="rect">
             <a:avLst/>
@@ -2287,7 +2287,7 @@
         <p:spPr>
           <a:xfrm>
             <a:off x="2808000" y="360000"/>
-            <a:ext cx="840600" cy="790200"/>
+            <a:ext cx="840240" cy="789840"/>
           </a:xfrm>
           <a:prstGeom prst="rect">
             <a:avLst/>
@@ -2361,7 +2361,7 @@
         <p:spPr>
           <a:xfrm flipV="1">
             <a:off x="3108960" y="1149840"/>
-            <a:ext cx="129240" cy="502200"/>
+            <a:ext cx="128880" cy="501840"/>
           </a:xfrm>
           <a:custGeom>
             <a:avLst/>
@@ -2475,7 +2475,7 @@
         <p:spPr>
           <a:xfrm>
             <a:off x="2160000" y="3576960"/>
-            <a:ext cx="1671480" cy="272160"/>
+            <a:ext cx="1671120" cy="272160"/>
           </a:xfrm>
           <a:prstGeom prst="rect">
             <a:avLst/>
@@ -2525,8 +2525,8 @@
         </p:nvSpPr>
         <p:spPr>
           <a:xfrm flipH="1" flipV="1">
-            <a:off x="3019680" y="2733840"/>
-            <a:ext cx="360" cy="790200"/>
+            <a:off x="3018960" y="2733840"/>
+            <a:ext cx="360" cy="789840"/>
           </a:xfrm>
           <a:custGeom>
             <a:avLst/>
@@ -2641,7 +2641,7 @@
         <p:spPr>
           <a:xfrm>
             <a:off x="3833280" y="3600000"/>
-            <a:ext cx="1274040" cy="394200"/>
+            <a:ext cx="1273680" cy="394200"/>
           </a:xfrm>
           <a:prstGeom prst="rect">
             <a:avLst/>
@@ -2692,7 +2692,7 @@
         <p:spPr>
           <a:xfrm flipH="1" flipV="1">
             <a:off x="3525840" y="2517840"/>
-            <a:ext cx="934200" cy="934200"/>
+            <a:ext cx="933840" cy="933840"/>
           </a:xfrm>
           <a:custGeom>
             <a:avLst/>
@@ -2741,7 +2741,7 @@
         <p:spPr>
           <a:xfrm>
             <a:off x="5112000" y="1800000"/>
-            <a:ext cx="1128240" cy="1078200"/>
+            <a:ext cx="1127880" cy="1077840"/>
           </a:xfrm>
           <a:prstGeom prst="ellipse">
             <a:avLst/>
@@ -2800,8 +2800,8 @@
         </p:nvSpPr>
         <p:spPr>
           <a:xfrm flipV="1">
-            <a:off x="4536000" y="2659680"/>
-            <a:ext cx="718200" cy="862200"/>
+            <a:off x="4536000" y="2659320"/>
+            <a:ext cx="717840" cy="861840"/>
           </a:xfrm>
           <a:custGeom>
             <a:avLst/>
@@ -2949,7 +2949,7 @@
         <p:spPr>
           <a:xfrm>
             <a:off x="5184000" y="3600000"/>
-            <a:ext cx="1274040" cy="394200"/>
+            <a:ext cx="1273680" cy="394200"/>
           </a:xfrm>
           <a:prstGeom prst="rect">
             <a:avLst/>
@@ -2999,8 +2999,8 @@
         </p:nvSpPr>
         <p:spPr>
           <a:xfrm flipH="1" flipV="1">
-            <a:off x="5758200" y="2877840"/>
-            <a:ext cx="92160" cy="574200"/>
+            <a:off x="5757480" y="2877840"/>
+            <a:ext cx="91800" cy="573840"/>
           </a:xfrm>
           <a:custGeom>
             <a:avLst/>
@@ -3049,7 +3049,7 @@
         <p:spPr>
           <a:xfrm>
             <a:off x="5277960" y="432000"/>
-            <a:ext cx="840600" cy="790200"/>
+            <a:ext cx="840240" cy="789840"/>
           </a:xfrm>
           <a:prstGeom prst="rect">
             <a:avLst/>
@@ -3123,7 +3123,7 @@
         <p:spPr>
           <a:xfrm flipV="1">
             <a:off x="5687640" y="1222560"/>
-            <a:ext cx="360" cy="574200"/>
+            <a:ext cx="360" cy="573840"/>
           </a:xfrm>
           <a:custGeom>
             <a:avLst/>
@@ -3171,7 +3171,7 @@
         <p:spPr>
           <a:xfrm>
             <a:off x="4824000" y="1322280"/>
-            <a:ext cx="840600" cy="333000"/>
+            <a:ext cx="840240" cy="333000"/>
           </a:xfrm>
           <a:prstGeom prst="rect">
             <a:avLst/>
@@ -3252,7 +3252,7 @@
         <p:spPr>
           <a:xfrm>
             <a:off x="6912000" y="85680"/>
-            <a:ext cx="2806200" cy="638280"/>
+            <a:ext cx="2805840" cy="638280"/>
           </a:xfrm>
           <a:prstGeom prst="rect">
             <a:avLst/>
@@ -3303,7 +3303,7 @@
         <p:spPr>
           <a:xfrm>
             <a:off x="471960" y="236520"/>
-            <a:ext cx="951120" cy="759240"/>
+            <a:ext cx="950760" cy="758880"/>
           </a:xfrm>
           <a:prstGeom prst="rect">
             <a:avLst/>
@@ -3377,7 +3377,7 @@
         <p:spPr>
           <a:xfrm>
             <a:off x="956520" y="997560"/>
-            <a:ext cx="172080" cy="738720"/>
+            <a:ext cx="171720" cy="738360"/>
           </a:xfrm>
           <a:custGeom>
             <a:avLst/>
@@ -3425,7 +3425,7 @@
         <p:spPr>
           <a:xfrm>
             <a:off x="76320" y="1109880"/>
-            <a:ext cx="785880" cy="394200"/>
+            <a:ext cx="785520" cy="394200"/>
           </a:xfrm>
           <a:prstGeom prst="rect">
             <a:avLst/>
@@ -3476,7 +3476,7 @@
         <p:spPr>
           <a:xfrm>
             <a:off x="576000" y="1745640"/>
-            <a:ext cx="1128240" cy="1060560"/>
+            <a:ext cx="1127880" cy="1060200"/>
           </a:xfrm>
           <a:prstGeom prst="ellipse">
             <a:avLst/>
@@ -3569,7 +3569,7 @@
         <p:spPr>
           <a:xfrm>
             <a:off x="324360" y="3565080"/>
-            <a:ext cx="1671480" cy="272160"/>
+            <a:ext cx="1671120" cy="272160"/>
           </a:xfrm>
           <a:prstGeom prst="rect">
             <a:avLst/>
@@ -3653,7 +3653,7 @@
         <p:spPr>
           <a:xfrm>
             <a:off x="1123560" y="2880000"/>
-            <a:ext cx="360" cy="573120"/>
+            <a:ext cx="360" cy="572760"/>
           </a:xfrm>
           <a:custGeom>
             <a:avLst/>
@@ -3701,7 +3701,7 @@
         <p:spPr>
           <a:xfrm>
             <a:off x="2088000" y="1800000"/>
-            <a:ext cx="1128240" cy="1060560"/>
+            <a:ext cx="1127880" cy="1060200"/>
           </a:xfrm>
           <a:prstGeom prst="ellipse">
             <a:avLst/>
@@ -3761,7 +3761,7 @@
         <p:spPr>
           <a:xfrm flipH="1">
             <a:off x="1588320" y="2808000"/>
-            <a:ext cx="711720" cy="630000"/>
+            <a:ext cx="711360" cy="629640"/>
           </a:xfrm>
           <a:custGeom>
             <a:avLst/>
@@ -3876,7 +3876,7 @@
         <p:spPr>
           <a:xfrm>
             <a:off x="1872000" y="3565080"/>
-            <a:ext cx="1671480" cy="271080"/>
+            <a:ext cx="1671120" cy="270720"/>
           </a:xfrm>
           <a:prstGeom prst="rect">
             <a:avLst/>
@@ -3902,7 +3902,7 @@
         <p:spPr>
           <a:xfrm>
             <a:off x="1926720" y="3565080"/>
-            <a:ext cx="1671480" cy="271080"/>
+            <a:ext cx="1671120" cy="270720"/>
           </a:xfrm>
           <a:prstGeom prst="rect">
             <a:avLst/>
@@ -3928,7 +3928,7 @@
         <p:spPr>
           <a:xfrm>
             <a:off x="2079720" y="3528360"/>
-            <a:ext cx="1230480" cy="454680"/>
+            <a:ext cx="1230120" cy="454680"/>
           </a:xfrm>
           <a:prstGeom prst="rect">
             <a:avLst/>
@@ -3979,7 +3979,7 @@
         <p:spPr>
           <a:xfrm flipH="1">
             <a:off x="2524320" y="2862360"/>
-            <a:ext cx="135720" cy="575640"/>
+            <a:ext cx="135360" cy="575280"/>
           </a:xfrm>
           <a:custGeom>
             <a:avLst/>
@@ -4028,7 +4028,7 @@
         <p:spPr>
           <a:xfrm>
             <a:off x="3693960" y="1872000"/>
-            <a:ext cx="1128240" cy="1060560"/>
+            <a:ext cx="1127880" cy="1060200"/>
           </a:xfrm>
           <a:prstGeom prst="ellipse">
             <a:avLst/>
@@ -4088,7 +4088,7 @@
         <p:spPr>
           <a:xfrm>
             <a:off x="5040000" y="1819080"/>
-            <a:ext cx="1128240" cy="1060560"/>
+            <a:ext cx="1127880" cy="1060200"/>
           </a:xfrm>
           <a:prstGeom prst="ellipse">
             <a:avLst/>
@@ -4280,7 +4280,7 @@
         <p:spPr>
           <a:xfrm>
             <a:off x="5823720" y="3672360"/>
-            <a:ext cx="1230480" cy="454680"/>
+            <a:ext cx="1230120" cy="454680"/>
           </a:xfrm>
           <a:prstGeom prst="rect">
             <a:avLst/>
@@ -4331,7 +4331,7 @@
         <p:spPr>
           <a:xfrm>
             <a:off x="6359400" y="1512000"/>
-            <a:ext cx="1416240" cy="1222200"/>
+            <a:ext cx="1415880" cy="1221840"/>
           </a:xfrm>
           <a:prstGeom prst="ellipse">
             <a:avLst/>
@@ -4391,7 +4391,7 @@
         <p:spPr>
           <a:xfrm flipH="1">
             <a:off x="6549840" y="2736000"/>
-            <a:ext cx="289080" cy="790200"/>
+            <a:ext cx="288720" cy="789840"/>
           </a:xfrm>
           <a:custGeom>
             <a:avLst/>
@@ -4506,7 +4506,7 @@
         <p:spPr>
           <a:xfrm>
             <a:off x="7632000" y="3600000"/>
-            <a:ext cx="1294200" cy="454680"/>
+            <a:ext cx="1293840" cy="454680"/>
           </a:xfrm>
           <a:prstGeom prst="rect">
             <a:avLst/>
@@ -4557,7 +4557,7 @@
         <p:spPr>
           <a:xfrm>
             <a:off x="7560000" y="2664000"/>
-            <a:ext cx="1006200" cy="934200"/>
+            <a:ext cx="1005840" cy="933840"/>
           </a:xfrm>
           <a:custGeom>
             <a:avLst/>
@@ -4639,7 +4639,7 @@
         <p:spPr>
           <a:xfrm>
             <a:off x="3796200" y="3567600"/>
-            <a:ext cx="1230480" cy="454680"/>
+            <a:ext cx="1230120" cy="454680"/>
           </a:xfrm>
           <a:prstGeom prst="rect">
             <a:avLst/>
@@ -4723,7 +4723,7 @@
         <p:spPr>
           <a:xfrm flipH="1">
             <a:off x="4245840" y="2934360"/>
-            <a:ext cx="135720" cy="575640"/>
+            <a:ext cx="135360" cy="575280"/>
           </a:xfrm>
           <a:custGeom>
             <a:avLst/>
@@ -4772,7 +4772,7 @@
         <p:spPr>
           <a:xfrm flipH="1">
             <a:off x="4965840" y="2808000"/>
-            <a:ext cx="361080" cy="719640"/>
+            <a:ext cx="360720" cy="719280"/>
           </a:xfrm>
           <a:custGeom>
             <a:avLst/>
@@ -4821,7 +4821,7 @@
         <p:spPr>
           <a:xfrm>
             <a:off x="5759640" y="2880000"/>
-            <a:ext cx="213120" cy="720000"/>
+            <a:ext cx="212760" cy="719640"/>
           </a:xfrm>
           <a:custGeom>
             <a:avLst/>
@@ -4869,8 +4869,8 @@
         </p:nvSpPr>
         <p:spPr>
           <a:xfrm flipH="1">
-            <a:off x="3078720" y="2808000"/>
-            <a:ext cx="733680" cy="630000"/>
+            <a:off x="3078000" y="2808000"/>
+            <a:ext cx="733320" cy="629640"/>
           </a:xfrm>
           <a:custGeom>
             <a:avLst/>
@@ -4919,7 +4919,7 @@
         <p:spPr>
           <a:xfrm>
             <a:off x="6358680" y="1512360"/>
-            <a:ext cx="1416240" cy="1222200"/>
+            <a:ext cx="1415880" cy="1221840"/>
           </a:xfrm>
           <a:prstGeom prst="ellipse">
             <a:avLst/>
@@ -4979,7 +4979,7 @@
         <p:spPr>
           <a:xfrm>
             <a:off x="471960" y="246600"/>
-            <a:ext cx="951120" cy="759240"/>
+            <a:ext cx="950760" cy="758880"/>
           </a:xfrm>
           <a:prstGeom prst="rect">
             <a:avLst/>
@@ -5053,7 +5053,7 @@
         <p:spPr>
           <a:xfrm>
             <a:off x="5688000" y="288000"/>
-            <a:ext cx="951120" cy="759240"/>
+            <a:ext cx="950760" cy="758880"/>
           </a:xfrm>
           <a:prstGeom prst="rect">
             <a:avLst/>
@@ -5127,7 +5127,7 @@
         <p:spPr>
           <a:xfrm flipH="1" flipV="1">
             <a:off x="6263280" y="1079280"/>
-            <a:ext cx="431640" cy="503640"/>
+            <a:ext cx="431280" cy="503280"/>
           </a:xfrm>
           <a:custGeom>
             <a:avLst/>
@@ -5175,7 +5175,7 @@
         <p:spPr>
           <a:xfrm>
             <a:off x="5328000" y="1224000"/>
-            <a:ext cx="1031040" cy="454680"/>
+            <a:ext cx="1030680" cy="454680"/>
           </a:xfrm>
           <a:prstGeom prst="rect">
             <a:avLst/>
@@ -5203,7 +5203,11 @@
             </a:pPr>
             <a:r>
               <a:rPr b="0" lang="pt-BR" sz="1200" spc="-1" strike="noStrike">
+                <a:solidFill>
+                  <a:srgbClr val="000000"/>
+                </a:solidFill>
                 <a:latin typeface="Arial"/>
+                <a:ea typeface="DejaVu Sans"/>
               </a:rPr>
               <a:t>Sub componente</a:t>
             </a:r>
@@ -5252,7 +5256,7 @@
         <p:spPr>
           <a:xfrm>
             <a:off x="6912000" y="85680"/>
-            <a:ext cx="2806200" cy="638280"/>
+            <a:ext cx="2805840" cy="638280"/>
           </a:xfrm>
           <a:prstGeom prst="rect">
             <a:avLst/>
@@ -5303,7 +5307,7 @@
         <p:spPr>
           <a:xfrm>
             <a:off x="471960" y="246600"/>
-            <a:ext cx="951120" cy="759240"/>
+            <a:ext cx="950760" cy="758880"/>
           </a:xfrm>
           <a:prstGeom prst="rect">
             <a:avLst/>
@@ -5377,7 +5381,7 @@
         <p:spPr>
           <a:xfrm>
             <a:off x="432000" y="1584000"/>
-            <a:ext cx="1366200" cy="934200"/>
+            <a:ext cx="1365840" cy="933840"/>
           </a:xfrm>
           <a:prstGeom prst="ellipse">
             <a:avLst/>
@@ -5437,7 +5441,7 @@
         <p:spPr>
           <a:xfrm>
             <a:off x="964080" y="997200"/>
-            <a:ext cx="114120" cy="585000"/>
+            <a:ext cx="113760" cy="584640"/>
           </a:xfrm>
           <a:custGeom>
             <a:avLst/>
@@ -5485,7 +5489,7 @@
         <p:spPr>
           <a:xfrm>
             <a:off x="1156320" y="1126080"/>
-            <a:ext cx="1217880" cy="241920"/>
+            <a:ext cx="1217520" cy="241920"/>
           </a:xfrm>
           <a:prstGeom prst="rect">
             <a:avLst/>
@@ -5612,7 +5616,7 @@
         <p:spPr>
           <a:xfrm>
             <a:off x="576000" y="2952000"/>
-            <a:ext cx="1294200" cy="454680"/>
+            <a:ext cx="1293840" cy="454680"/>
           </a:xfrm>
           <a:prstGeom prst="rect">
             <a:avLst/>
@@ -5663,7 +5667,7 @@
         <p:spPr>
           <a:xfrm>
             <a:off x="1123920" y="2520000"/>
-            <a:ext cx="26280" cy="430200"/>
+            <a:ext cx="25920" cy="429840"/>
           </a:xfrm>
           <a:custGeom>
             <a:avLst/>
@@ -5711,7 +5715,7 @@
         <p:spPr>
           <a:xfrm>
             <a:off x="2253960" y="1440000"/>
-            <a:ext cx="1128240" cy="1060560"/>
+            <a:ext cx="1127880" cy="1060200"/>
           </a:xfrm>
           <a:prstGeom prst="ellipse">
             <a:avLst/>
@@ -5771,7 +5775,7 @@
         <p:spPr>
           <a:xfrm flipH="1">
             <a:off x="1581840" y="2304000"/>
-            <a:ext cx="790200" cy="646200"/>
+            <a:ext cx="789840" cy="645840"/>
           </a:xfrm>
           <a:custGeom>
             <a:avLst/>
@@ -5820,7 +5824,7 @@
         <p:spPr>
           <a:xfrm>
             <a:off x="2232000" y="2952000"/>
-            <a:ext cx="1294200" cy="454680"/>
+            <a:ext cx="1293840" cy="454680"/>
           </a:xfrm>
           <a:prstGeom prst="rect">
             <a:avLst/>
@@ -5937,7 +5941,7 @@
         <p:spPr>
           <a:xfrm>
             <a:off x="2923920" y="2502360"/>
-            <a:ext cx="26280" cy="430200"/>
+            <a:ext cx="25920" cy="429840"/>
           </a:xfrm>
           <a:custGeom>
             <a:avLst/>
@@ -5985,7 +5989,7 @@
         <p:spPr>
           <a:xfrm>
             <a:off x="2448000" y="246960"/>
-            <a:ext cx="951120" cy="759240"/>
+            <a:ext cx="950760" cy="758880"/>
           </a:xfrm>
           <a:prstGeom prst="rect">
             <a:avLst/>
@@ -6059,7 +6063,7 @@
         <p:spPr>
           <a:xfrm flipV="1">
             <a:off x="2808000" y="1005840"/>
-            <a:ext cx="129240" cy="430920"/>
+            <a:ext cx="128880" cy="430560"/>
           </a:xfrm>
           <a:custGeom>
             <a:avLst/>
@@ -6107,7 +6111,7 @@
         <p:spPr>
           <a:xfrm>
             <a:off x="3096000" y="1080000"/>
-            <a:ext cx="840600" cy="453240"/>
+            <a:ext cx="840240" cy="452880"/>
           </a:xfrm>
           <a:prstGeom prst="rect">
             <a:avLst/>
@@ -6133,7 +6137,7 @@
         <p:spPr>
           <a:xfrm>
             <a:off x="3096000" y="1080000"/>
-            <a:ext cx="2014200" cy="249480"/>
+            <a:ext cx="2013840" cy="249480"/>
           </a:xfrm>
           <a:prstGeom prst="rect">
             <a:avLst/>
@@ -6214,7 +6218,7 @@
         <p:spPr>
           <a:xfrm>
             <a:off x="6912000" y="85680"/>
-            <a:ext cx="2806200" cy="638280"/>
+            <a:ext cx="2805840" cy="638280"/>
           </a:xfrm>
           <a:prstGeom prst="rect">
             <a:avLst/>
@@ -6265,7 +6269,7 @@
         <p:spPr>
           <a:xfrm>
             <a:off x="3096000" y="1080000"/>
-            <a:ext cx="840600" cy="453240"/>
+            <a:ext cx="840240" cy="452880"/>
           </a:xfrm>
           <a:prstGeom prst="rect">
             <a:avLst/>
@@ -6291,7 +6295,7 @@
         <p:spPr>
           <a:xfrm>
             <a:off x="504360" y="1512000"/>
-            <a:ext cx="1725840" cy="1509840"/>
+            <a:ext cx="1725480" cy="1509480"/>
           </a:xfrm>
           <a:prstGeom prst="ellipse">
             <a:avLst/>
@@ -6351,7 +6355,7 @@
         <p:spPr>
           <a:xfrm>
             <a:off x="720000" y="3816000"/>
-            <a:ext cx="1294200" cy="454680"/>
+            <a:ext cx="1293840" cy="454680"/>
           </a:xfrm>
           <a:prstGeom prst="rect">
             <a:avLst/>
@@ -6385,7 +6389,7 @@
                 <a:latin typeface="Arial"/>
                 <a:ea typeface="DejaVu Sans"/>
               </a:rPr>
-              <a:t>Subcomponentes prontos</a:t>
+              <a:t>Subcomponentes testados</a:t>
             </a:r>
             <a:endParaRPr b="0" lang="pt-BR" sz="1200" spc="-1" strike="noStrike">
               <a:latin typeface="Arial"/>
@@ -6467,8 +6471,8 @@
         </p:nvSpPr>
         <p:spPr>
           <a:xfrm rot="21552600">
-            <a:off x="1366200" y="3021840"/>
-            <a:ext cx="6120" cy="718560"/>
+            <a:off x="1365840" y="3021480"/>
+            <a:ext cx="5760" cy="718200"/>
           </a:xfrm>
           <a:custGeom>
             <a:avLst/>
@@ -6516,7 +6520,7 @@
         <p:spPr>
           <a:xfrm>
             <a:off x="2469960" y="1656000"/>
-            <a:ext cx="2064240" cy="1438200"/>
+            <a:ext cx="2063880" cy="1437840"/>
           </a:xfrm>
           <a:prstGeom prst="ellipse">
             <a:avLst/>
@@ -6642,7 +6646,7 @@
         <p:spPr>
           <a:xfrm flipH="1">
             <a:off x="1797840" y="2880000"/>
-            <a:ext cx="934200" cy="790200"/>
+            <a:ext cx="933840" cy="789840"/>
           </a:xfrm>
           <a:custGeom>
             <a:avLst/>
@@ -6691,7 +6695,7 @@
         <p:spPr>
           <a:xfrm>
             <a:off x="3456000" y="3096000"/>
-            <a:ext cx="360" cy="646200"/>
+            <a:ext cx="360" cy="645840"/>
           </a:xfrm>
           <a:custGeom>
             <a:avLst/>
@@ -6739,7 +6743,7 @@
         <p:spPr>
           <a:xfrm flipH="1">
             <a:off x="3964320" y="2952000"/>
-            <a:ext cx="999720" cy="719640"/>
+            <a:ext cx="999360" cy="719280"/>
           </a:xfrm>
           <a:custGeom>
             <a:avLst/>
@@ -6788,7 +6792,7 @@
         <p:spPr>
           <a:xfrm>
             <a:off x="2520000" y="3744000"/>
-            <a:ext cx="1798200" cy="454680"/>
+            <a:ext cx="1797840" cy="454680"/>
           </a:xfrm>
           <a:prstGeom prst="rect">
             <a:avLst/>
@@ -6839,7 +6843,7 @@
         <p:spPr>
           <a:xfrm>
             <a:off x="4680360" y="1656360"/>
-            <a:ext cx="1725840" cy="1509840"/>
+            <a:ext cx="1725480" cy="1509480"/>
           </a:xfrm>
           <a:prstGeom prst="ellipse">
             <a:avLst/>
@@ -6965,7 +6969,7 @@
         <p:spPr>
           <a:xfrm>
             <a:off x="4752000" y="3816000"/>
-            <a:ext cx="1582200" cy="454680"/>
+            <a:ext cx="1581840" cy="454680"/>
           </a:xfrm>
           <a:prstGeom prst="rect">
             <a:avLst/>
@@ -7015,8 +7019,8 @@
         </p:nvSpPr>
         <p:spPr>
           <a:xfrm rot="21552600">
-            <a:off x="5542200" y="3166200"/>
-            <a:ext cx="6120" cy="502200"/>
+            <a:off x="5541840" y="3165840"/>
+            <a:ext cx="5760" cy="501840"/>
           </a:xfrm>
           <a:custGeom>
             <a:avLst/>
@@ -7064,7 +7068,7 @@
         <p:spPr>
           <a:xfrm>
             <a:off x="6912000" y="2232000"/>
-            <a:ext cx="1725840" cy="1509840"/>
+            <a:ext cx="1725480" cy="1509480"/>
           </a:xfrm>
           <a:prstGeom prst="ellipse">
             <a:avLst/>
@@ -7124,7 +7128,7 @@
         <p:spPr>
           <a:xfrm>
             <a:off x="7344000" y="864000"/>
-            <a:ext cx="951120" cy="759240"/>
+            <a:ext cx="950760" cy="758880"/>
           </a:xfrm>
           <a:prstGeom prst="rect">
             <a:avLst/>
@@ -7198,7 +7202,7 @@
         <p:spPr>
           <a:xfrm flipH="1">
             <a:off x="5908320" y="2952000"/>
-            <a:ext cx="999720" cy="719640"/>
+            <a:ext cx="999360" cy="719280"/>
           </a:xfrm>
           <a:custGeom>
             <a:avLst/>
@@ -7247,7 +7251,7 @@
         <p:spPr>
           <a:xfrm flipV="1">
             <a:off x="7788960" y="1622880"/>
-            <a:ext cx="129240" cy="605160"/>
+            <a:ext cx="128880" cy="604800"/>
           </a:xfrm>
           <a:custGeom>
             <a:avLst/>
@@ -7295,7 +7299,7 @@
         <p:spPr>
           <a:xfrm>
             <a:off x="6984000" y="1754280"/>
-            <a:ext cx="840600" cy="333000"/>
+            <a:ext cx="840240" cy="333000"/>
           </a:xfrm>
           <a:prstGeom prst="rect">
             <a:avLst/>
@@ -7376,7 +7380,7 @@
         <p:spPr>
           <a:xfrm>
             <a:off x="6912000" y="85680"/>
-            <a:ext cx="2806200" cy="638280"/>
+            <a:ext cx="2805840" cy="638280"/>
           </a:xfrm>
           <a:prstGeom prst="rect">
             <a:avLst/>
@@ -7427,7 +7431,7 @@
         <p:spPr>
           <a:xfrm>
             <a:off x="471960" y="246600"/>
-            <a:ext cx="951120" cy="759240"/>
+            <a:ext cx="950760" cy="758880"/>
           </a:xfrm>
           <a:prstGeom prst="rect">
             <a:avLst/>
@@ -7501,7 +7505,7 @@
         <p:spPr>
           <a:xfrm>
             <a:off x="964080" y="997200"/>
-            <a:ext cx="114120" cy="585000"/>
+            <a:ext cx="113760" cy="584640"/>
           </a:xfrm>
           <a:custGeom>
             <a:avLst/>
@@ -7549,7 +7553,7 @@
         <p:spPr>
           <a:xfrm>
             <a:off x="2448000" y="246960"/>
-            <a:ext cx="951120" cy="759240"/>
+            <a:ext cx="950760" cy="758880"/>
           </a:xfrm>
           <a:prstGeom prst="rect">
             <a:avLst/>
@@ -7623,7 +7627,7 @@
         <p:spPr>
           <a:xfrm flipV="1">
             <a:off x="2808000" y="1005840"/>
-            <a:ext cx="129240" cy="574200"/>
+            <a:ext cx="128880" cy="573840"/>
           </a:xfrm>
           <a:custGeom>
             <a:avLst/>
@@ -7671,7 +7675,7 @@
         <p:spPr>
           <a:xfrm>
             <a:off x="3096000" y="1080000"/>
-            <a:ext cx="840600" cy="453240"/>
+            <a:ext cx="840240" cy="452880"/>
           </a:xfrm>
           <a:prstGeom prst="rect">
             <a:avLst/>
@@ -7697,7 +7701,7 @@
         <p:spPr>
           <a:xfrm>
             <a:off x="144000" y="1080000"/>
-            <a:ext cx="840600" cy="333000"/>
+            <a:ext cx="840240" cy="333000"/>
           </a:xfrm>
           <a:prstGeom prst="rect">
             <a:avLst/>
@@ -7748,7 +7752,7 @@
         <p:spPr>
           <a:xfrm>
             <a:off x="576360" y="1584000"/>
-            <a:ext cx="1149840" cy="1149840"/>
+            <a:ext cx="1149480" cy="1149480"/>
           </a:xfrm>
           <a:prstGeom prst="ellipse">
             <a:avLst/>
@@ -7808,7 +7812,7 @@
         <p:spPr>
           <a:xfrm>
             <a:off x="648000" y="3240000"/>
-            <a:ext cx="1294200" cy="272160"/>
+            <a:ext cx="1293840" cy="272160"/>
           </a:xfrm>
           <a:prstGeom prst="rect">
             <a:avLst/>
@@ -7925,7 +7929,7 @@
         <p:spPr>
           <a:xfrm>
             <a:off x="1224000" y="2735640"/>
-            <a:ext cx="114120" cy="502560"/>
+            <a:ext cx="113760" cy="502200"/>
           </a:xfrm>
           <a:custGeom>
             <a:avLst/>
@@ -7973,7 +7977,7 @@
         <p:spPr>
           <a:xfrm>
             <a:off x="2088360" y="1584000"/>
-            <a:ext cx="1293840" cy="1222200"/>
+            <a:ext cx="1293480" cy="1221840"/>
           </a:xfrm>
           <a:prstGeom prst="ellipse">
             <a:avLst/>
@@ -8033,7 +8037,7 @@
         <p:spPr>
           <a:xfrm flipH="1">
             <a:off x="1797840" y="2664000"/>
-            <a:ext cx="567720" cy="574200"/>
+            <a:ext cx="567360" cy="573840"/>
           </a:xfrm>
           <a:custGeom>
             <a:avLst/>
@@ -8082,7 +8086,7 @@
         <p:spPr>
           <a:xfrm>
             <a:off x="1872000" y="1107000"/>
-            <a:ext cx="840600" cy="333000"/>
+            <a:ext cx="840240" cy="333000"/>
           </a:xfrm>
           <a:prstGeom prst="rect">
             <a:avLst/>
@@ -8163,7 +8167,7 @@
         <p:spPr>
           <a:xfrm>
             <a:off x="6912000" y="85680"/>
-            <a:ext cx="2806200" cy="912600"/>
+            <a:ext cx="2805840" cy="912600"/>
           </a:xfrm>
           <a:prstGeom prst="rect">
             <a:avLst/>
@@ -8224,7 +8228,7 @@
         <p:spPr>
           <a:xfrm>
             <a:off x="471960" y="246600"/>
-            <a:ext cx="951120" cy="759240"/>
+            <a:ext cx="950760" cy="758880"/>
           </a:xfrm>
           <a:prstGeom prst="rect">
             <a:avLst/>
@@ -8298,7 +8302,7 @@
         <p:spPr>
           <a:xfrm>
             <a:off x="964080" y="997200"/>
-            <a:ext cx="114120" cy="585000"/>
+            <a:ext cx="113760" cy="584640"/>
           </a:xfrm>
           <a:custGeom>
             <a:avLst/>
@@ -8346,7 +8350,7 @@
         <p:spPr>
           <a:xfrm>
             <a:off x="2448000" y="246960"/>
-            <a:ext cx="951120" cy="759240"/>
+            <a:ext cx="950760" cy="758880"/>
           </a:xfrm>
           <a:prstGeom prst="rect">
             <a:avLst/>
@@ -8420,7 +8424,7 @@
         <p:spPr>
           <a:xfrm flipV="1">
             <a:off x="2808000" y="1005840"/>
-            <a:ext cx="129240" cy="574200"/>
+            <a:ext cx="128880" cy="573840"/>
           </a:xfrm>
           <a:custGeom>
             <a:avLst/>
@@ -8468,7 +8472,7 @@
         <p:spPr>
           <a:xfrm>
             <a:off x="3096000" y="1080000"/>
-            <a:ext cx="840600" cy="453240"/>
+            <a:ext cx="840240" cy="452880"/>
           </a:xfrm>
           <a:prstGeom prst="rect">
             <a:avLst/>
@@ -8494,7 +8498,7 @@
         <p:spPr>
           <a:xfrm>
             <a:off x="144000" y="1080000"/>
-            <a:ext cx="840600" cy="257040"/>
+            <a:ext cx="840240" cy="257040"/>
           </a:xfrm>
           <a:prstGeom prst="rect">
             <a:avLst/>
@@ -8545,7 +8549,7 @@
         <p:spPr>
           <a:xfrm>
             <a:off x="288000" y="1585080"/>
-            <a:ext cx="1582920" cy="1149840"/>
+            <a:ext cx="1582560" cy="1149480"/>
           </a:xfrm>
           <a:prstGeom prst="ellipse">
             <a:avLst/>
@@ -8605,7 +8609,7 @@
         <p:spPr>
           <a:xfrm>
             <a:off x="648000" y="3240000"/>
-            <a:ext cx="1294200" cy="454680"/>
+            <a:ext cx="1293840" cy="454680"/>
           </a:xfrm>
           <a:prstGeom prst="rect">
             <a:avLst/>
@@ -8722,7 +8726,7 @@
         <p:spPr>
           <a:xfrm>
             <a:off x="1224000" y="2735640"/>
-            <a:ext cx="114120" cy="502560"/>
+            <a:ext cx="113760" cy="502200"/>
           </a:xfrm>
           <a:custGeom>
             <a:avLst/>
@@ -8770,7 +8774,7 @@
         <p:spPr>
           <a:xfrm>
             <a:off x="2088360" y="1584000"/>
-            <a:ext cx="1293840" cy="1222200"/>
+            <a:ext cx="1293480" cy="1221840"/>
           </a:xfrm>
           <a:prstGeom prst="ellipse">
             <a:avLst/>
@@ -8830,7 +8834,7 @@
         <p:spPr>
           <a:xfrm flipH="1">
             <a:off x="1797840" y="2664000"/>
-            <a:ext cx="567720" cy="574200"/>
+            <a:ext cx="567360" cy="573840"/>
           </a:xfrm>
           <a:custGeom>
             <a:avLst/>
@@ -8879,7 +8883,7 @@
         <p:spPr>
           <a:xfrm>
             <a:off x="1872000" y="1107000"/>
-            <a:ext cx="840600" cy="257040"/>
+            <a:ext cx="840240" cy="257040"/>
           </a:xfrm>
           <a:prstGeom prst="rect">
             <a:avLst/>

</xml_diff>

<commit_message>
amanha  e o dia
</commit_message>
<xml_diff>
--- a/Artefatos/16-DFD Essencial para cada capacidade.pptx
+++ b/Artefatos/16-DFD Essencial para cada capacidade.pptx
@@ -68,7 +68,7 @@
         <p:spPr>
           <a:xfrm>
             <a:off x="692640" y="375120"/>
-            <a:ext cx="8688600" cy="946800"/>
+            <a:ext cx="8688240" cy="946800"/>
           </a:xfrm>
           <a:prstGeom prst="rect">
             <a:avLst/>
@@ -181,7 +181,7 @@
         <p:spPr>
           <a:xfrm>
             <a:off x="692640" y="375120"/>
-            <a:ext cx="8688600" cy="946800"/>
+            <a:ext cx="8688240" cy="946800"/>
           </a:xfrm>
           <a:prstGeom prst="rect">
             <a:avLst/>
@@ -354,7 +354,7 @@
         <p:spPr>
           <a:xfrm>
             <a:off x="692640" y="375120"/>
-            <a:ext cx="8688600" cy="946800"/>
+            <a:ext cx="8688240" cy="946800"/>
           </a:xfrm>
           <a:prstGeom prst="rect">
             <a:avLst/>
@@ -587,7 +587,7 @@
         <p:spPr>
           <a:xfrm>
             <a:off x="692640" y="375120"/>
-            <a:ext cx="8688600" cy="946800"/>
+            <a:ext cx="8688240" cy="946800"/>
           </a:xfrm>
           <a:prstGeom prst="rect">
             <a:avLst/>
@@ -671,7 +671,7 @@
         <p:spPr>
           <a:xfrm>
             <a:off x="692640" y="375120"/>
-            <a:ext cx="8688600" cy="946800"/>
+            <a:ext cx="8688240" cy="946800"/>
           </a:xfrm>
           <a:prstGeom prst="rect">
             <a:avLst/>
@@ -754,7 +754,7 @@
         <p:spPr>
           <a:xfrm>
             <a:off x="692640" y="375120"/>
-            <a:ext cx="8688600" cy="946800"/>
+            <a:ext cx="8688240" cy="946800"/>
           </a:xfrm>
           <a:prstGeom prst="rect">
             <a:avLst/>
@@ -867,7 +867,7 @@
         <p:spPr>
           <a:xfrm>
             <a:off x="692640" y="375120"/>
-            <a:ext cx="8688600" cy="946800"/>
+            <a:ext cx="8688240" cy="946800"/>
           </a:xfrm>
           <a:prstGeom prst="rect">
             <a:avLst/>
@@ -920,7 +920,7 @@
         <p:spPr>
           <a:xfrm>
             <a:off x="692640" y="375120"/>
-            <a:ext cx="8688600" cy="4390200"/>
+            <a:ext cx="8688240" cy="4390200"/>
           </a:xfrm>
           <a:prstGeom prst="rect">
             <a:avLst/>
@@ -973,7 +973,7 @@
         <p:spPr>
           <a:xfrm>
             <a:off x="692640" y="375120"/>
-            <a:ext cx="8688600" cy="946800"/>
+            <a:ext cx="8688240" cy="946800"/>
           </a:xfrm>
           <a:prstGeom prst="rect">
             <a:avLst/>
@@ -1116,7 +1116,7 @@
         <p:spPr>
           <a:xfrm>
             <a:off x="692640" y="375120"/>
-            <a:ext cx="8688600" cy="946800"/>
+            <a:ext cx="8688240" cy="946800"/>
           </a:xfrm>
           <a:prstGeom prst="rect">
             <a:avLst/>
@@ -1259,7 +1259,7 @@
         <p:spPr>
           <a:xfrm>
             <a:off x="692640" y="375120"/>
-            <a:ext cx="8688600" cy="946800"/>
+            <a:ext cx="8688240" cy="946800"/>
           </a:xfrm>
           <a:prstGeom prst="rect">
             <a:avLst/>
@@ -1409,7 +1409,7 @@
         <p:spPr>
           <a:xfrm>
             <a:off x="692640" y="375120"/>
-            <a:ext cx="8688600" cy="946800"/>
+            <a:ext cx="8688240" cy="946800"/>
           </a:xfrm>
           <a:prstGeom prst="rect">
             <a:avLst/>
@@ -1657,7 +1657,7 @@
         <p:spPr>
           <a:xfrm>
             <a:off x="471960" y="226440"/>
-            <a:ext cx="949680" cy="757800"/>
+            <a:ext cx="949320" cy="757440"/>
           </a:xfrm>
           <a:prstGeom prst="rect">
             <a:avLst/>
@@ -1731,7 +1731,7 @@
         <p:spPr>
           <a:xfrm>
             <a:off x="432000" y="1729440"/>
-            <a:ext cx="1252440" cy="1059120"/>
+            <a:ext cx="1252080" cy="1058760"/>
           </a:xfrm>
           <a:prstGeom prst="ellipse">
             <a:avLst/>
@@ -1791,7 +1791,7 @@
         <p:spPr>
           <a:xfrm>
             <a:off x="948960" y="988200"/>
-            <a:ext cx="170640" cy="737280"/>
+            <a:ext cx="170280" cy="736920"/>
           </a:xfrm>
           <a:custGeom>
             <a:avLst/>
@@ -1839,7 +1839,7 @@
         <p:spPr>
           <a:xfrm>
             <a:off x="-243360" y="1053720"/>
-            <a:ext cx="1360440" cy="394200"/>
+            <a:ext cx="1360080" cy="394200"/>
           </a:xfrm>
           <a:prstGeom prst="rect">
             <a:avLst/>
@@ -1923,7 +1923,7 @@
         <p:spPr>
           <a:xfrm>
             <a:off x="1123200" y="2792520"/>
-            <a:ext cx="360" cy="659520"/>
+            <a:ext cx="360" cy="659160"/>
           </a:xfrm>
           <a:custGeom>
             <a:avLst/>
@@ -1971,7 +1971,7 @@
         <p:spPr>
           <a:xfrm>
             <a:off x="324360" y="3565080"/>
-            <a:ext cx="1670040" cy="454680"/>
+            <a:ext cx="1669680" cy="454680"/>
           </a:xfrm>
           <a:prstGeom prst="rect">
             <a:avLst/>
@@ -2042,7 +2042,7 @@
         <p:spPr>
           <a:xfrm>
             <a:off x="6912000" y="85680"/>
-            <a:ext cx="2804760" cy="638280"/>
+            <a:ext cx="2804400" cy="638280"/>
           </a:xfrm>
           <a:prstGeom prst="rect">
             <a:avLst/>
@@ -2126,7 +2126,7 @@
         <p:spPr>
           <a:xfrm>
             <a:off x="2448000" y="1656000"/>
-            <a:ext cx="1220760" cy="1076760"/>
+            <a:ext cx="1220400" cy="1076400"/>
           </a:xfrm>
           <a:prstGeom prst="ellipse">
             <a:avLst/>
@@ -2186,7 +2186,7 @@
         <p:spPr>
           <a:xfrm flipH="1">
             <a:off x="1586880" y="2647800"/>
-            <a:ext cx="1050840" cy="788760"/>
+            <a:ext cx="1050480" cy="788400"/>
           </a:xfrm>
           <a:custGeom>
             <a:avLst/>
@@ -2235,7 +2235,7 @@
         <p:spPr>
           <a:xfrm>
             <a:off x="2088000" y="1056960"/>
-            <a:ext cx="839160" cy="454680"/>
+            <a:ext cx="838800" cy="454680"/>
           </a:xfrm>
           <a:prstGeom prst="rect">
             <a:avLst/>
@@ -2286,7 +2286,7 @@
         <p:spPr>
           <a:xfrm>
             <a:off x="2808000" y="360000"/>
-            <a:ext cx="839160" cy="788760"/>
+            <a:ext cx="838800" cy="788400"/>
           </a:xfrm>
           <a:prstGeom prst="rect">
             <a:avLst/>
@@ -2360,7 +2360,7 @@
         <p:spPr>
           <a:xfrm flipV="1">
             <a:off x="3108960" y="1148400"/>
-            <a:ext cx="127800" cy="500760"/>
+            <a:ext cx="127440" cy="500400"/>
           </a:xfrm>
           <a:custGeom>
             <a:avLst/>
@@ -2474,7 +2474,7 @@
         <p:spPr>
           <a:xfrm>
             <a:off x="2160000" y="3576960"/>
-            <a:ext cx="1670040" cy="272160"/>
+            <a:ext cx="1669680" cy="272160"/>
           </a:xfrm>
           <a:prstGeom prst="rect">
             <a:avLst/>
@@ -2524,8 +2524,8 @@
         </p:nvSpPr>
         <p:spPr>
           <a:xfrm flipH="1" flipV="1" rot="205800">
-            <a:off x="3016440" y="2752560"/>
-            <a:ext cx="44640" cy="717480"/>
+            <a:off x="3015360" y="2751480"/>
+            <a:ext cx="44280" cy="717480"/>
           </a:xfrm>
           <a:custGeom>
             <a:avLst/>
@@ -2640,7 +2640,7 @@
         <p:spPr>
           <a:xfrm>
             <a:off x="3833280" y="3600000"/>
-            <a:ext cx="1272600" cy="394200"/>
+            <a:ext cx="1272240" cy="394200"/>
           </a:xfrm>
           <a:prstGeom prst="rect">
             <a:avLst/>
@@ -2690,8 +2690,8 @@
         </p:nvSpPr>
         <p:spPr>
           <a:xfrm flipH="1">
-            <a:off x="3580200" y="936000"/>
-            <a:ext cx="1697040" cy="1295640"/>
+            <a:off x="3579480" y="936000"/>
+            <a:ext cx="1696680" cy="1295280"/>
           </a:xfrm>
           <a:custGeom>
             <a:avLst/>
@@ -2740,7 +2740,7 @@
         <p:spPr>
           <a:xfrm flipH="1" flipV="1">
             <a:off x="3527280" y="2591280"/>
-            <a:ext cx="1007640" cy="880920"/>
+            <a:ext cx="1007280" cy="880560"/>
           </a:xfrm>
           <a:custGeom>
             <a:avLst/>
@@ -2888,7 +2888,7 @@
         <p:spPr>
           <a:xfrm>
             <a:off x="5184000" y="3600000"/>
-            <a:ext cx="1272600" cy="394200"/>
+            <a:ext cx="1272240" cy="394200"/>
           </a:xfrm>
           <a:prstGeom prst="rect">
             <a:avLst/>
@@ -2939,7 +2939,7 @@
         <p:spPr>
           <a:xfrm>
             <a:off x="5277960" y="432000"/>
-            <a:ext cx="839160" cy="788760"/>
+            <a:ext cx="838800" cy="788400"/>
           </a:xfrm>
           <a:prstGeom prst="rect">
             <a:avLst/>
@@ -3013,7 +3013,7 @@
         <p:spPr>
           <a:xfrm>
             <a:off x="4344480" y="675000"/>
-            <a:ext cx="839160" cy="333000"/>
+            <a:ext cx="838800" cy="333000"/>
           </a:xfrm>
           <a:prstGeom prst="rect">
             <a:avLst/>
@@ -3064,7 +3064,7 @@
         <p:spPr>
           <a:xfrm flipH="1" flipV="1">
             <a:off x="3668400" y="2375280"/>
-            <a:ext cx="2234520" cy="1151640"/>
+            <a:ext cx="2234160" cy="1151280"/>
           </a:xfrm>
           <a:custGeom>
             <a:avLst/>
@@ -3143,7 +3143,7 @@
         <p:spPr>
           <a:xfrm>
             <a:off x="8309160" y="-74520"/>
-            <a:ext cx="2804760" cy="638280"/>
+            <a:ext cx="2804400" cy="638280"/>
           </a:xfrm>
           <a:prstGeom prst="rect">
             <a:avLst/>
@@ -3194,7 +3194,7 @@
         <p:spPr>
           <a:xfrm>
             <a:off x="471960" y="236520"/>
-            <a:ext cx="949680" cy="757800"/>
+            <a:ext cx="949320" cy="757440"/>
           </a:xfrm>
           <a:prstGeom prst="rect">
             <a:avLst/>
@@ -3268,7 +3268,7 @@
         <p:spPr>
           <a:xfrm>
             <a:off x="956520" y="997560"/>
-            <a:ext cx="170640" cy="737280"/>
+            <a:ext cx="170280" cy="736920"/>
           </a:xfrm>
           <a:custGeom>
             <a:avLst/>
@@ -3316,7 +3316,7 @@
         <p:spPr>
           <a:xfrm>
             <a:off x="76320" y="1109880"/>
-            <a:ext cx="784440" cy="394200"/>
+            <a:ext cx="784080" cy="394200"/>
           </a:xfrm>
           <a:prstGeom prst="rect">
             <a:avLst/>
@@ -3367,7 +3367,7 @@
         <p:spPr>
           <a:xfrm>
             <a:off x="576000" y="1745640"/>
-            <a:ext cx="1126800" cy="1059120"/>
+            <a:ext cx="1126440" cy="1058760"/>
           </a:xfrm>
           <a:prstGeom prst="ellipse">
             <a:avLst/>
@@ -3460,7 +3460,7 @@
         <p:spPr>
           <a:xfrm>
             <a:off x="324360" y="3520800"/>
-            <a:ext cx="1670040" cy="249480"/>
+            <a:ext cx="1669680" cy="249480"/>
           </a:xfrm>
           <a:prstGeom prst="rect">
             <a:avLst/>
@@ -3544,7 +3544,7 @@
         <p:spPr>
           <a:xfrm>
             <a:off x="1123560" y="2853360"/>
-            <a:ext cx="360" cy="571680"/>
+            <a:ext cx="360" cy="571320"/>
           </a:xfrm>
           <a:custGeom>
             <a:avLst/>
@@ -3592,7 +3592,7 @@
         <p:spPr>
           <a:xfrm>
             <a:off x="2088000" y="1800000"/>
-            <a:ext cx="1126800" cy="1059120"/>
+            <a:ext cx="1126440" cy="1058760"/>
           </a:xfrm>
           <a:prstGeom prst="ellipse">
             <a:avLst/>
@@ -3652,7 +3652,7 @@
         <p:spPr>
           <a:xfrm flipH="1">
             <a:off x="1699920" y="2794680"/>
-            <a:ext cx="570600" cy="608760"/>
+            <a:ext cx="570240" cy="608400"/>
           </a:xfrm>
           <a:custGeom>
             <a:avLst/>
@@ -3767,7 +3767,7 @@
         <p:spPr>
           <a:xfrm>
             <a:off x="1872000" y="3565080"/>
-            <a:ext cx="1670040" cy="269640"/>
+            <a:ext cx="1669680" cy="269280"/>
           </a:xfrm>
           <a:prstGeom prst="rect">
             <a:avLst/>
@@ -3793,7 +3793,7 @@
         <p:spPr>
           <a:xfrm>
             <a:off x="1926720" y="3565080"/>
-            <a:ext cx="1670040" cy="269640"/>
+            <a:ext cx="1669680" cy="269280"/>
           </a:xfrm>
           <a:prstGeom prst="rect">
             <a:avLst/>
@@ -3819,7 +3819,7 @@
         <p:spPr>
           <a:xfrm>
             <a:off x="2079720" y="3528360"/>
-            <a:ext cx="1229040" cy="454680"/>
+            <a:ext cx="1228680" cy="454680"/>
           </a:xfrm>
           <a:prstGeom prst="rect">
             <a:avLst/>
@@ -3870,7 +3870,7 @@
         <p:spPr>
           <a:xfrm>
             <a:off x="2842920" y="2901960"/>
-            <a:ext cx="131760" cy="521640"/>
+            <a:ext cx="131400" cy="521280"/>
           </a:xfrm>
           <a:custGeom>
             <a:avLst/>
@@ -3919,7 +3919,7 @@
         <p:spPr>
           <a:xfrm>
             <a:off x="3693960" y="1872000"/>
-            <a:ext cx="1126800" cy="1059120"/>
+            <a:ext cx="1126440" cy="1058760"/>
           </a:xfrm>
           <a:prstGeom prst="ellipse">
             <a:avLst/>
@@ -3979,7 +3979,7 @@
         <p:spPr>
           <a:xfrm>
             <a:off x="5040000" y="1819080"/>
-            <a:ext cx="1126800" cy="1059120"/>
+            <a:ext cx="1126440" cy="1058760"/>
           </a:xfrm>
           <a:prstGeom prst="ellipse">
             <a:avLst/>
@@ -4171,7 +4171,7 @@
         <p:spPr>
           <a:xfrm>
             <a:off x="5899320" y="3567240"/>
-            <a:ext cx="1229040" cy="454680"/>
+            <a:ext cx="1228680" cy="454680"/>
           </a:xfrm>
           <a:prstGeom prst="rect">
             <a:avLst/>
@@ -4221,8 +4221,8 @@
         </p:nvSpPr>
         <p:spPr>
           <a:xfrm flipH="1">
-            <a:off x="6645240" y="2449440"/>
-            <a:ext cx="1126800" cy="932760"/>
+            <a:off x="6644520" y="2449440"/>
+            <a:ext cx="1126440" cy="932400"/>
           </a:xfrm>
           <a:custGeom>
             <a:avLst/>
@@ -4337,7 +4337,7 @@
         <p:spPr>
           <a:xfrm>
             <a:off x="7949880" y="3491640"/>
-            <a:ext cx="1292760" cy="454680"/>
+            <a:ext cx="1292400" cy="454680"/>
           </a:xfrm>
           <a:prstGeom prst="rect">
             <a:avLst/>
@@ -4388,7 +4388,7 @@
         <p:spPr>
           <a:xfrm>
             <a:off x="8649360" y="2623320"/>
-            <a:ext cx="306720" cy="780120"/>
+            <a:ext cx="306360" cy="779760"/>
           </a:xfrm>
           <a:custGeom>
             <a:avLst/>
@@ -4470,7 +4470,7 @@
         <p:spPr>
           <a:xfrm>
             <a:off x="3796200" y="3567600"/>
-            <a:ext cx="1229040" cy="454680"/>
+            <a:ext cx="1228680" cy="454680"/>
           </a:xfrm>
           <a:prstGeom prst="rect">
             <a:avLst/>
@@ -4554,7 +4554,7 @@
         <p:spPr>
           <a:xfrm flipH="1">
             <a:off x="4485960" y="2876040"/>
-            <a:ext cx="62280" cy="575640"/>
+            <a:ext cx="61920" cy="575280"/>
           </a:xfrm>
           <a:custGeom>
             <a:avLst/>
@@ -4602,8 +4602,8 @@
         </p:nvSpPr>
         <p:spPr>
           <a:xfrm flipH="1">
-            <a:off x="4953960" y="2808000"/>
-            <a:ext cx="370800" cy="615600"/>
+            <a:off x="4953240" y="2808000"/>
+            <a:ext cx="370440" cy="615240"/>
           </a:xfrm>
           <a:custGeom>
             <a:avLst/>
@@ -4652,7 +4652,7 @@
         <p:spPr>
           <a:xfrm>
             <a:off x="5766480" y="2876040"/>
-            <a:ext cx="474480" cy="506160"/>
+            <a:ext cx="474120" cy="505800"/>
           </a:xfrm>
           <a:custGeom>
             <a:avLst/>
@@ -4701,7 +4701,7 @@
         <p:spPr>
           <a:xfrm flipH="1">
             <a:off x="3288600" y="2808000"/>
-            <a:ext cx="520200" cy="570600"/>
+            <a:ext cx="519840" cy="570240"/>
           </a:xfrm>
           <a:custGeom>
             <a:avLst/>
@@ -4750,7 +4750,7 @@
         <p:spPr>
           <a:xfrm>
             <a:off x="7755840" y="1352160"/>
-            <a:ext cx="1414800" cy="1220760"/>
+            <a:ext cx="1414440" cy="1220400"/>
           </a:xfrm>
           <a:prstGeom prst="ellipse">
             <a:avLst/>
@@ -4810,7 +4810,7 @@
         <p:spPr>
           <a:xfrm>
             <a:off x="471960" y="246600"/>
-            <a:ext cx="949680" cy="757800"/>
+            <a:ext cx="949320" cy="757440"/>
           </a:xfrm>
           <a:prstGeom prst="rect">
             <a:avLst/>
@@ -4884,7 +4884,7 @@
         <p:spPr>
           <a:xfrm>
             <a:off x="7085160" y="127800"/>
-            <a:ext cx="949680" cy="757800"/>
+            <a:ext cx="949320" cy="757440"/>
           </a:xfrm>
           <a:prstGeom prst="rect">
             <a:avLst/>
@@ -4958,7 +4958,7 @@
         <p:spPr>
           <a:xfrm flipH="1" flipV="1">
             <a:off x="7659000" y="917640"/>
-            <a:ext cx="430200" cy="502200"/>
+            <a:ext cx="429840" cy="501840"/>
           </a:xfrm>
           <a:custGeom>
             <a:avLst/>
@@ -5006,7 +5006,7 @@
         <p:spPr>
           <a:xfrm>
             <a:off x="6916320" y="1052640"/>
-            <a:ext cx="1029600" cy="454680"/>
+            <a:ext cx="1029240" cy="454680"/>
           </a:xfrm>
           <a:prstGeom prst="rect">
             <a:avLst/>
@@ -5087,7 +5087,7 @@
         <p:spPr>
           <a:xfrm>
             <a:off x="6912000" y="85680"/>
-            <a:ext cx="2804760" cy="638280"/>
+            <a:ext cx="2804400" cy="638280"/>
           </a:xfrm>
           <a:prstGeom prst="rect">
             <a:avLst/>
@@ -5138,7 +5138,7 @@
         <p:spPr>
           <a:xfrm>
             <a:off x="3096000" y="1080000"/>
-            <a:ext cx="839160" cy="451800"/>
+            <a:ext cx="838800" cy="451440"/>
           </a:xfrm>
           <a:prstGeom prst="rect">
             <a:avLst/>
@@ -5164,7 +5164,7 @@
         <p:spPr>
           <a:xfrm>
             <a:off x="2324160" y="3888000"/>
-            <a:ext cx="1364760" cy="454680"/>
+            <a:ext cx="1364400" cy="454680"/>
           </a:xfrm>
           <a:prstGeom prst="rect">
             <a:avLst/>
@@ -5281,7 +5281,7 @@
         <p:spPr>
           <a:xfrm>
             <a:off x="5137200" y="1944000"/>
-            <a:ext cx="1918800" cy="1080000"/>
+            <a:ext cx="1918440" cy="1079640"/>
           </a:xfrm>
           <a:prstGeom prst="ellipse">
             <a:avLst/>
@@ -5406,8 +5406,8 @@
         </p:nvSpPr>
         <p:spPr>
           <a:xfrm flipH="1" flipV="1">
-            <a:off x="3095280" y="3384000"/>
-            <a:ext cx="360" cy="432000"/>
+            <a:off x="3094560" y="3383280"/>
+            <a:ext cx="360" cy="431640"/>
           </a:xfrm>
           <a:custGeom>
             <a:avLst/>
@@ -5455,8 +5455,8 @@
         </p:nvSpPr>
         <p:spPr>
           <a:xfrm flipH="1">
-            <a:off x="7056000" y="2304000"/>
-            <a:ext cx="648000" cy="72000"/>
+            <a:off x="7055280" y="2304000"/>
+            <a:ext cx="647640" cy="71640"/>
           </a:xfrm>
           <a:custGeom>
             <a:avLst/>
@@ -5505,7 +5505,7 @@
         <p:spPr>
           <a:xfrm>
             <a:off x="5259600" y="3816000"/>
-            <a:ext cx="1724400" cy="454680"/>
+            <a:ext cx="1724040" cy="454680"/>
           </a:xfrm>
           <a:prstGeom prst="rect">
             <a:avLst/>
@@ -5556,7 +5556,7 @@
         <p:spPr>
           <a:xfrm>
             <a:off x="7488000" y="2091600"/>
-            <a:ext cx="1724400" cy="1508400"/>
+            <a:ext cx="1724040" cy="1508040"/>
           </a:xfrm>
           <a:prstGeom prst="ellipse">
             <a:avLst/>
@@ -5682,7 +5682,7 @@
         <p:spPr>
           <a:xfrm>
             <a:off x="7560000" y="3960000"/>
-            <a:ext cx="1580760" cy="454680"/>
+            <a:ext cx="1580400" cy="454680"/>
           </a:xfrm>
           <a:prstGeom prst="rect">
             <a:avLst/>
@@ -5733,7 +5733,7 @@
         <p:spPr>
           <a:xfrm>
             <a:off x="8064000" y="723960"/>
-            <a:ext cx="949680" cy="757800"/>
+            <a:ext cx="949320" cy="757440"/>
           </a:xfrm>
           <a:prstGeom prst="rect">
             <a:avLst/>
@@ -5806,8 +5806,8 @@
         </p:nvSpPr>
         <p:spPr>
           <a:xfrm flipH="1" flipV="1">
-            <a:off x="8495280" y="1481760"/>
-            <a:ext cx="360" cy="609840"/>
+            <a:off x="8494560" y="1481040"/>
+            <a:ext cx="360" cy="609480"/>
           </a:xfrm>
           <a:custGeom>
             <a:avLst/>
@@ -5855,7 +5855,7 @@
         <p:spPr>
           <a:xfrm>
             <a:off x="6984000" y="1152000"/>
-            <a:ext cx="839160" cy="333000"/>
+            <a:ext cx="838800" cy="333000"/>
           </a:xfrm>
           <a:prstGeom prst="rect">
             <a:avLst/>
@@ -5905,8 +5905,8 @@
         </p:nvSpPr>
         <p:spPr>
           <a:xfrm flipH="1">
-            <a:off x="6263640" y="3024000"/>
-            <a:ext cx="360" cy="576000"/>
+            <a:off x="6262920" y="3024000"/>
+            <a:ext cx="360" cy="575640"/>
           </a:xfrm>
           <a:custGeom>
             <a:avLst/>
@@ -5955,7 +5955,7 @@
         <p:spPr>
           <a:xfrm>
             <a:off x="360000" y="792000"/>
-            <a:ext cx="949680" cy="757800"/>
+            <a:ext cx="949320" cy="757440"/>
           </a:xfrm>
           <a:prstGeom prst="rect">
             <a:avLst/>
@@ -6029,7 +6029,7 @@
         <p:spPr>
           <a:xfrm>
             <a:off x="792000" y="1549800"/>
-            <a:ext cx="112680" cy="826200"/>
+            <a:ext cx="112320" cy="825840"/>
           </a:xfrm>
           <a:custGeom>
             <a:avLst/>
@@ -6077,7 +6077,7 @@
         <p:spPr>
           <a:xfrm>
             <a:off x="288000" y="2376000"/>
-            <a:ext cx="1364760" cy="932760"/>
+            <a:ext cx="1364400" cy="932400"/>
           </a:xfrm>
           <a:prstGeom prst="ellipse">
             <a:avLst/>
@@ -6137,7 +6137,7 @@
         <p:spPr>
           <a:xfrm>
             <a:off x="1008000" y="3315240"/>
-            <a:ext cx="24840" cy="428760"/>
+            <a:ext cx="24480" cy="428400"/>
           </a:xfrm>
           <a:custGeom>
             <a:avLst/>
@@ -6185,7 +6185,7 @@
         <p:spPr>
           <a:xfrm>
             <a:off x="576000" y="3865320"/>
-            <a:ext cx="1292760" cy="454680"/>
+            <a:ext cx="1292400" cy="454680"/>
           </a:xfrm>
           <a:prstGeom prst="rect">
             <a:avLst/>
@@ -6301,8 +6301,8 @@
         </p:nvSpPr>
         <p:spPr>
           <a:xfrm flipH="1">
-            <a:off x="8208000" y="3600000"/>
-            <a:ext cx="144000" cy="360000"/>
+            <a:off x="8207280" y="3600000"/>
+            <a:ext cx="143640" cy="359640"/>
           </a:xfrm>
           <a:custGeom>
             <a:avLst/>
@@ -6351,7 +6351,7 @@
         <p:spPr>
           <a:xfrm>
             <a:off x="2376000" y="2324880"/>
-            <a:ext cx="1126800" cy="1059120"/>
+            <a:ext cx="1126440" cy="1058760"/>
           </a:xfrm>
           <a:prstGeom prst="ellipse">
             <a:avLst/>
@@ -6410,8 +6410,8 @@
         </p:nvSpPr>
         <p:spPr>
           <a:xfrm flipH="1">
-            <a:off x="1440000" y="3096000"/>
-            <a:ext cx="1008000" cy="716760"/>
+            <a:off x="1439280" y="3096000"/>
+            <a:ext cx="1007640" cy="716400"/>
           </a:xfrm>
           <a:custGeom>
             <a:avLst/>
@@ -6459,8 +6459,8 @@
         </p:nvSpPr>
         <p:spPr>
           <a:xfrm flipV="1">
-            <a:off x="2880000" y="1584000"/>
-            <a:ext cx="127800" cy="740880"/>
+            <a:off x="2880000" y="1583280"/>
+            <a:ext cx="127440" cy="740520"/>
           </a:xfrm>
           <a:custGeom>
             <a:avLst/>
@@ -6508,7 +6508,7 @@
         <p:spPr>
           <a:xfrm>
             <a:off x="2578320" y="774000"/>
-            <a:ext cx="949680" cy="757800"/>
+            <a:ext cx="949320" cy="757440"/>
           </a:xfrm>
           <a:prstGeom prst="rect">
             <a:avLst/>
@@ -6582,7 +6582,7 @@
         <p:spPr>
           <a:xfrm>
             <a:off x="871560" y="1702080"/>
-            <a:ext cx="1216440" cy="241920"/>
+            <a:ext cx="1216080" cy="241920"/>
           </a:xfrm>
           <a:prstGeom prst="rect">
             <a:avLst/>
@@ -6643,7 +6643,7 @@
         <p:spPr>
           <a:xfrm>
             <a:off x="3124440" y="1910520"/>
-            <a:ext cx="2012760" cy="249480"/>
+            <a:ext cx="2012400" cy="249480"/>
           </a:xfrm>
           <a:prstGeom prst="rect">
             <a:avLst/>
@@ -6693,8 +6693,8 @@
         </p:nvSpPr>
         <p:spPr>
           <a:xfrm flipH="1">
-            <a:off x="3528000" y="2808000"/>
-            <a:ext cx="1800000" cy="1004760"/>
+            <a:off x="3527280" y="2808000"/>
+            <a:ext cx="1799640" cy="1004400"/>
           </a:xfrm>
           <a:custGeom>
             <a:avLst/>
@@ -6773,7 +6773,7 @@
         <p:spPr>
           <a:xfrm>
             <a:off x="6912000" y="85680"/>
-            <a:ext cx="2804760" cy="638280"/>
+            <a:ext cx="2804400" cy="638280"/>
           </a:xfrm>
           <a:prstGeom prst="rect">
             <a:avLst/>
@@ -6824,7 +6824,7 @@
         <p:spPr>
           <a:xfrm>
             <a:off x="471960" y="246600"/>
-            <a:ext cx="949680" cy="757800"/>
+            <a:ext cx="949320" cy="757440"/>
           </a:xfrm>
           <a:prstGeom prst="rect">
             <a:avLst/>
@@ -6898,7 +6898,7 @@
         <p:spPr>
           <a:xfrm>
             <a:off x="964080" y="997200"/>
-            <a:ext cx="112680" cy="583560"/>
+            <a:ext cx="112320" cy="583200"/>
           </a:xfrm>
           <a:custGeom>
             <a:avLst/>
@@ -6946,7 +6946,7 @@
         <p:spPr>
           <a:xfrm>
             <a:off x="2448000" y="246960"/>
-            <a:ext cx="949680" cy="757800"/>
+            <a:ext cx="949320" cy="757440"/>
           </a:xfrm>
           <a:prstGeom prst="rect">
             <a:avLst/>
@@ -7020,7 +7020,7 @@
         <p:spPr>
           <a:xfrm flipV="1">
             <a:off x="2808000" y="1004400"/>
-            <a:ext cx="127800" cy="572760"/>
+            <a:ext cx="127440" cy="572400"/>
           </a:xfrm>
           <a:custGeom>
             <a:avLst/>
@@ -7068,7 +7068,7 @@
         <p:spPr>
           <a:xfrm>
             <a:off x="3096000" y="1080000"/>
-            <a:ext cx="839160" cy="451800"/>
+            <a:ext cx="838800" cy="451440"/>
           </a:xfrm>
           <a:prstGeom prst="rect">
             <a:avLst/>
@@ -7094,7 +7094,7 @@
         <p:spPr>
           <a:xfrm>
             <a:off x="144000" y="1080000"/>
-            <a:ext cx="839160" cy="333000"/>
+            <a:ext cx="838800" cy="333000"/>
           </a:xfrm>
           <a:prstGeom prst="rect">
             <a:avLst/>
@@ -7145,7 +7145,7 @@
         <p:spPr>
           <a:xfrm>
             <a:off x="576360" y="1584000"/>
-            <a:ext cx="1148400" cy="1148400"/>
+            <a:ext cx="1148040" cy="1148040"/>
           </a:xfrm>
           <a:prstGeom prst="ellipse">
             <a:avLst/>
@@ -7205,7 +7205,7 @@
         <p:spPr>
           <a:xfrm>
             <a:off x="648000" y="3240000"/>
-            <a:ext cx="1292760" cy="272160"/>
+            <a:ext cx="1292400" cy="272160"/>
           </a:xfrm>
           <a:prstGeom prst="rect">
             <a:avLst/>
@@ -7322,7 +7322,7 @@
         <p:spPr>
           <a:xfrm>
             <a:off x="1224000" y="2735640"/>
-            <a:ext cx="112680" cy="501120"/>
+            <a:ext cx="112320" cy="500760"/>
           </a:xfrm>
           <a:custGeom>
             <a:avLst/>
@@ -7370,7 +7370,7 @@
         <p:spPr>
           <a:xfrm>
             <a:off x="2088360" y="1584000"/>
-            <a:ext cx="1292400" cy="1220760"/>
+            <a:ext cx="1292040" cy="1220400"/>
           </a:xfrm>
           <a:prstGeom prst="ellipse">
             <a:avLst/>
@@ -7430,7 +7430,7 @@
         <p:spPr>
           <a:xfrm flipH="1">
             <a:off x="1796400" y="2664000"/>
-            <a:ext cx="566280" cy="572760"/>
+            <a:ext cx="565920" cy="572400"/>
           </a:xfrm>
           <a:custGeom>
             <a:avLst/>
@@ -7479,7 +7479,7 @@
         <p:spPr>
           <a:xfrm>
             <a:off x="1872000" y="1107000"/>
-            <a:ext cx="839160" cy="333000"/>
+            <a:ext cx="838800" cy="333000"/>
           </a:xfrm>
           <a:prstGeom prst="rect">
             <a:avLst/>
@@ -7560,7 +7560,7 @@
         <p:spPr>
           <a:xfrm>
             <a:off x="6912000" y="85680"/>
-            <a:ext cx="2804760" cy="912600"/>
+            <a:ext cx="2804400" cy="912600"/>
           </a:xfrm>
           <a:prstGeom prst="rect">
             <a:avLst/>
@@ -7621,7 +7621,7 @@
         <p:spPr>
           <a:xfrm>
             <a:off x="471960" y="246600"/>
-            <a:ext cx="949680" cy="757800"/>
+            <a:ext cx="949320" cy="757440"/>
           </a:xfrm>
           <a:prstGeom prst="rect">
             <a:avLst/>
@@ -7695,7 +7695,7 @@
         <p:spPr>
           <a:xfrm>
             <a:off x="964080" y="997200"/>
-            <a:ext cx="112680" cy="583560"/>
+            <a:ext cx="112320" cy="583200"/>
           </a:xfrm>
           <a:custGeom>
             <a:avLst/>
@@ -7743,7 +7743,7 @@
         <p:spPr>
           <a:xfrm>
             <a:off x="2448000" y="246960"/>
-            <a:ext cx="949680" cy="757800"/>
+            <a:ext cx="949320" cy="757440"/>
           </a:xfrm>
           <a:prstGeom prst="rect">
             <a:avLst/>
@@ -7817,7 +7817,7 @@
         <p:spPr>
           <a:xfrm flipV="1">
             <a:off x="2808000" y="1004400"/>
-            <a:ext cx="207000" cy="572760"/>
+            <a:ext cx="206640" cy="572400"/>
           </a:xfrm>
           <a:custGeom>
             <a:avLst/>
@@ -7865,7 +7865,7 @@
         <p:spPr>
           <a:xfrm>
             <a:off x="144000" y="1080000"/>
-            <a:ext cx="872640" cy="424440"/>
+            <a:ext cx="872280" cy="424440"/>
           </a:xfrm>
           <a:prstGeom prst="rect">
             <a:avLst/>
@@ -7916,7 +7916,7 @@
         <p:spPr>
           <a:xfrm>
             <a:off x="288000" y="1585080"/>
-            <a:ext cx="1581480" cy="1148400"/>
+            <a:ext cx="1581120" cy="1148040"/>
           </a:xfrm>
           <a:prstGeom prst="ellipse">
             <a:avLst/>
@@ -7976,7 +7976,7 @@
         <p:spPr>
           <a:xfrm>
             <a:off x="648000" y="3240000"/>
-            <a:ext cx="1292760" cy="454680"/>
+            <a:ext cx="1292400" cy="454680"/>
           </a:xfrm>
           <a:prstGeom prst="rect">
             <a:avLst/>
@@ -8093,7 +8093,7 @@
         <p:spPr>
           <a:xfrm>
             <a:off x="2330640" y="1593720"/>
-            <a:ext cx="1292400" cy="1220760"/>
+            <a:ext cx="1292040" cy="1220400"/>
           </a:xfrm>
           <a:prstGeom prst="ellipse">
             <a:avLst/>
@@ -8153,7 +8153,7 @@
         <p:spPr>
           <a:xfrm flipH="1">
             <a:off x="1796400" y="2542320"/>
-            <a:ext cx="566280" cy="572760"/>
+            <a:ext cx="565920" cy="572400"/>
           </a:xfrm>
           <a:custGeom>
             <a:avLst/>
@@ -8202,7 +8202,7 @@
         <p:spPr>
           <a:xfrm>
             <a:off x="1804320" y="1031760"/>
-            <a:ext cx="949680" cy="591840"/>
+            <a:ext cx="949320" cy="591840"/>
           </a:xfrm>
           <a:prstGeom prst="rect">
             <a:avLst/>
@@ -8253,7 +8253,7 @@
         <p:spPr>
           <a:xfrm>
             <a:off x="2330640" y="3594960"/>
-            <a:ext cx="1292760" cy="424440"/>
+            <a:ext cx="1292400" cy="424440"/>
           </a:xfrm>
           <a:prstGeom prst="rect">
             <a:avLst/>
@@ -8287,7 +8287,7 @@
                 <a:latin typeface="Arial"/>
                 <a:ea typeface="DejaVu Sans"/>
               </a:rPr>
-              <a:t>Ordem de produlão</a:t>
+              <a:t>Ordem de produção</a:t>
             </a:r>
             <a:endParaRPr b="0" lang="pt-BR" sz="1100" spc="-1" strike="noStrike">
               <a:latin typeface="Arial"/>
@@ -8369,8 +8369,8 @@
         </p:nvSpPr>
         <p:spPr>
           <a:xfrm flipH="1">
-            <a:off x="2969640" y="2855160"/>
-            <a:ext cx="44640" cy="736200"/>
+            <a:off x="2968920" y="2855160"/>
+            <a:ext cx="44280" cy="735840"/>
           </a:xfrm>
           <a:custGeom>
             <a:avLst/>
@@ -8419,7 +8419,7 @@
         <p:spPr>
           <a:xfrm flipH="1">
             <a:off x="1796400" y="2542680"/>
-            <a:ext cx="566280" cy="572760"/>
+            <a:ext cx="565920" cy="572400"/>
           </a:xfrm>
           <a:custGeom>
             <a:avLst/>
@@ -8467,8 +8467,8 @@
         </p:nvSpPr>
         <p:spPr>
           <a:xfrm flipH="1">
-            <a:off x="1150920" y="2733840"/>
-            <a:ext cx="360" cy="505800"/>
+            <a:off x="1150200" y="2733840"/>
+            <a:ext cx="360" cy="505440"/>
           </a:xfrm>
           <a:custGeom>
             <a:avLst/>

</xml_diff>